<commit_message>
Add npm script and add wtfjs reference
</commit_message>
<xml_diff>
--- a/Modern JavaScript.pptx
+++ b/Modern JavaScript.pptx
@@ -5,10 +5,10 @@
     <p:sldMasterId id="2147483660" r:id="rId4"/>
   </p:sldMasterIdLst>
   <p:notesMasterIdLst>
-    <p:notesMasterId r:id="rId20"/>
+    <p:notesMasterId r:id="rId21"/>
   </p:notesMasterIdLst>
   <p:handoutMasterIdLst>
-    <p:handoutMasterId r:id="rId21"/>
+    <p:handoutMasterId r:id="rId22"/>
   </p:handoutMasterIdLst>
   <p:sldIdLst>
     <p:sldId id="257" r:id="rId5"/>
@@ -26,12 +26,13 @@
     <p:sldId id="279" r:id="rId17"/>
     <p:sldId id="280" r:id="rId18"/>
     <p:sldId id="281" r:id="rId19"/>
+    <p:sldId id="282" r:id="rId20"/>
   </p:sldIdLst>
   <p:sldSz cx="12188825" cy="6858000"/>
   <p:notesSz cx="6858000" cy="9144000"/>
   <p:defaultTextStyle>
     <a:defPPr rtl="0">
-      <a:defRPr lang="th-th"/>
+      <a:defRPr lang="th-TH"/>
     </a:defPPr>
     <a:lvl1pPr marL="0" algn="l" defTabSz="1218987" rtl="0" eaLnBrk="1" latinLnBrk="0" hangingPunct="1">
       <a:defRPr sz="2400" kern="1200">
@@ -148,6 +149,7 @@
           <p14:sldIdLst>
             <p14:sldId id="280"/>
             <p14:sldId id="281"/>
+            <p14:sldId id="282"/>
           </p14:sldIdLst>
         </p14:section>
       </p14:sectionLst>
@@ -5847,7 +5849,7 @@
           <p:cNvPr id="2050" name="Picture 2" descr="à¸à¸¥à¸à¸²à¸£à¸à¹à¸à¸«à¸²à¸£à¸¹à¸à¸ à¸²à¸à¸ªà¸³à¸«à¸£à¸±à¸ javascript logo">
             <a:extLst>
               <a:ext uri="{FF2B5EF4-FFF2-40B4-BE49-F238E27FC236}">
-                <a16:creationId xmlns:a16="http://schemas.microsoft.com/office/drawing/2014/main" id="{9C68F571-A812-48CA-96B9-412E5729A997}"/>
+                <a16:creationId xmlns:a16="http://schemas.microsoft.com/office/drawing/2014/main" xmlns="" id="{9C68F571-A812-48CA-96B9-412E5729A997}"/>
               </a:ext>
             </a:extLst>
           </p:cNvPr>
@@ -5894,7 +5896,7 @@
           <p:cNvPr id="2052" name="Picture 4" descr="à¸à¸¥à¸à¸²à¸£à¸à¹à¸à¸«à¸²à¸£à¸¹à¸à¸ à¸²à¸à¸ªà¸³à¸«à¸£à¸±à¸ javascript logo">
             <a:extLst>
               <a:ext uri="{FF2B5EF4-FFF2-40B4-BE49-F238E27FC236}">
-                <a16:creationId xmlns:a16="http://schemas.microsoft.com/office/drawing/2014/main" id="{0D792CA9-4700-40DD-B22C-E9890DCCA364}"/>
+                <a16:creationId xmlns:a16="http://schemas.microsoft.com/office/drawing/2014/main" xmlns="" id="{0D792CA9-4700-40DD-B22C-E9890DCCA364}"/>
               </a:ext>
             </a:extLst>
           </p:cNvPr>
@@ -5941,7 +5943,7 @@
           <p:cNvPr id="2054" name="Picture 6" descr="à¸à¸¥à¸à¸²à¸£à¸à¹à¸à¸«à¸²à¸£à¸¹à¸à¸ à¸²à¸à¸ªà¸³à¸«à¸£à¸±à¸ javascript logo">
             <a:extLst>
               <a:ext uri="{FF2B5EF4-FFF2-40B4-BE49-F238E27FC236}">
-                <a16:creationId xmlns:a16="http://schemas.microsoft.com/office/drawing/2014/main" id="{1FE4F484-2C61-4871-B685-AA45E5B9D7E7}"/>
+                <a16:creationId xmlns:a16="http://schemas.microsoft.com/office/drawing/2014/main" xmlns="" id="{1FE4F484-2C61-4871-B685-AA45E5B9D7E7}"/>
               </a:ext>
             </a:extLst>
           </p:cNvPr>
@@ -5988,7 +5990,7 @@
           <p:cNvPr id="2056" name="Picture 8" descr="à¸£à¸¹à¸à¸ à¸²à¸à¸à¸µà¹à¹à¸à¸µà¹à¸¢à¸§à¸à¹à¸­à¸">
             <a:extLst>
               <a:ext uri="{FF2B5EF4-FFF2-40B4-BE49-F238E27FC236}">
-                <a16:creationId xmlns:a16="http://schemas.microsoft.com/office/drawing/2014/main" id="{176B4447-7413-4095-B0DB-704624C0C853}"/>
+                <a16:creationId xmlns:a16="http://schemas.microsoft.com/office/drawing/2014/main" xmlns="" id="{176B4447-7413-4095-B0DB-704624C0C853}"/>
               </a:ext>
             </a:extLst>
           </p:cNvPr>
@@ -6035,7 +6037,7 @@
           <p:cNvPr id="2060" name="Picture 12" descr="à¸à¸¥à¸à¸²à¸£à¸à¹à¸à¸«à¸²à¸£à¸¹à¸à¸ à¸²à¸à¸ªà¸³à¸«à¸£à¸±à¸ webpack logo">
             <a:extLst>
               <a:ext uri="{FF2B5EF4-FFF2-40B4-BE49-F238E27FC236}">
-                <a16:creationId xmlns:a16="http://schemas.microsoft.com/office/drawing/2014/main" id="{E72E9812-7760-48C1-A7BB-B580297DBC78}"/>
+                <a16:creationId xmlns:a16="http://schemas.microsoft.com/office/drawing/2014/main" xmlns="" id="{E72E9812-7760-48C1-A7BB-B580297DBC78}"/>
               </a:ext>
             </a:extLst>
           </p:cNvPr>
@@ -6082,7 +6084,7 @@
           <p:cNvPr id="7" name="สี่เหลี่ยมผืนผ้า 6">
             <a:extLst>
               <a:ext uri="{FF2B5EF4-FFF2-40B4-BE49-F238E27FC236}">
-                <a16:creationId xmlns:a16="http://schemas.microsoft.com/office/drawing/2014/main" id="{FC01B4D4-F757-4ADE-8265-D9DE434B461F}"/>
+                <a16:creationId xmlns:a16="http://schemas.microsoft.com/office/drawing/2014/main" xmlns="" id="{FC01B4D4-F757-4ADE-8265-D9DE434B461F}"/>
               </a:ext>
             </a:extLst>
           </p:cNvPr>
@@ -6170,7 +6172,7 @@
           <p:cNvPr id="2" name="สี่เหลี่ยมผืนผ้า 1">
             <a:extLst>
               <a:ext uri="{FF2B5EF4-FFF2-40B4-BE49-F238E27FC236}">
-                <a16:creationId xmlns:a16="http://schemas.microsoft.com/office/drawing/2014/main" id="{16F1C6C9-1995-4CF5-87DC-A94389CA81D4}"/>
+                <a16:creationId xmlns:a16="http://schemas.microsoft.com/office/drawing/2014/main" xmlns="" id="{16F1C6C9-1995-4CF5-87DC-A94389CA81D4}"/>
               </a:ext>
             </a:extLst>
           </p:cNvPr>
@@ -6255,7 +6257,7 @@
           <p:cNvPr id="2" name="ชื่อเรื่อง 1">
             <a:extLst>
               <a:ext uri="{FF2B5EF4-FFF2-40B4-BE49-F238E27FC236}">
-                <a16:creationId xmlns:a16="http://schemas.microsoft.com/office/drawing/2014/main" id="{FA94299B-7220-46C7-A26C-0CDA556C696F}"/>
+                <a16:creationId xmlns:a16="http://schemas.microsoft.com/office/drawing/2014/main" xmlns="" id="{FA94299B-7220-46C7-A26C-0CDA556C696F}"/>
               </a:ext>
             </a:extLst>
           </p:cNvPr>
@@ -6294,7 +6296,7 @@
           <p:cNvPr id="3" name="สี่เหลี่ยมผืนผ้า 2">
             <a:extLst>
               <a:ext uri="{FF2B5EF4-FFF2-40B4-BE49-F238E27FC236}">
-                <a16:creationId xmlns:a16="http://schemas.microsoft.com/office/drawing/2014/main" id="{14BE4913-3402-4AC2-9451-7930D503034E}"/>
+                <a16:creationId xmlns:a16="http://schemas.microsoft.com/office/drawing/2014/main" xmlns="" id="{14BE4913-3402-4AC2-9451-7930D503034E}"/>
               </a:ext>
             </a:extLst>
           </p:cNvPr>
@@ -6407,7 +6409,7 @@
           <p:cNvPr id="2" name="Picture 5" descr="à¸à¸¥à¸à¸²à¸£à¸à¹à¸à¸«à¸²à¸£à¸¹à¸à¸ à¸²à¸à¸ªà¸³à¸«à¸£à¸±à¸ terminal icon">
             <a:extLst>
               <a:ext uri="{FF2B5EF4-FFF2-40B4-BE49-F238E27FC236}">
-                <a16:creationId xmlns:a16="http://schemas.microsoft.com/office/drawing/2014/main" id="{D853DDB3-659B-4A1B-8C52-CEBDEAFE07A1}"/>
+                <a16:creationId xmlns:a16="http://schemas.microsoft.com/office/drawing/2014/main" xmlns="" id="{D853DDB3-659B-4A1B-8C52-CEBDEAFE07A1}"/>
               </a:ext>
             </a:extLst>
           </p:cNvPr>
@@ -6454,7 +6456,7 @@
           <p:cNvPr id="3" name="สี่เหลี่ยมผืนผ้า 2">
             <a:extLst>
               <a:ext uri="{FF2B5EF4-FFF2-40B4-BE49-F238E27FC236}">
-                <a16:creationId xmlns:a16="http://schemas.microsoft.com/office/drawing/2014/main" id="{6E78968F-F046-4B8D-BD90-A00B08B9B1E9}"/>
+                <a16:creationId xmlns:a16="http://schemas.microsoft.com/office/drawing/2014/main" xmlns="" id="{6E78968F-F046-4B8D-BD90-A00B08B9B1E9}"/>
               </a:ext>
             </a:extLst>
           </p:cNvPr>
@@ -6501,7 +6503,7 @@
           <p:cNvPr id="4" name="สี่เหลี่ยมผืนผ้า 3">
             <a:extLst>
               <a:ext uri="{FF2B5EF4-FFF2-40B4-BE49-F238E27FC236}">
-                <a16:creationId xmlns:a16="http://schemas.microsoft.com/office/drawing/2014/main" id="{90063099-E64F-4F82-9097-B405BB8AFEE7}"/>
+                <a16:creationId xmlns:a16="http://schemas.microsoft.com/office/drawing/2014/main" xmlns="" id="{90063099-E64F-4F82-9097-B405BB8AFEE7}"/>
               </a:ext>
             </a:extLst>
           </p:cNvPr>
@@ -6587,7 +6589,7 @@
           <p:cNvPr id="2" name="ชื่อเรื่อง 1">
             <a:extLst>
               <a:ext uri="{FF2B5EF4-FFF2-40B4-BE49-F238E27FC236}">
-                <a16:creationId xmlns:a16="http://schemas.microsoft.com/office/drawing/2014/main" id="{52249569-7659-4EC0-831C-9E61531D77F0}"/>
+                <a16:creationId xmlns:a16="http://schemas.microsoft.com/office/drawing/2014/main" xmlns="" id="{52249569-7659-4EC0-831C-9E61531D77F0}"/>
               </a:ext>
             </a:extLst>
           </p:cNvPr>
@@ -6635,7 +6637,7 @@
           <p:cNvPr id="4" name="รูปภาพ 3">
             <a:extLst>
               <a:ext uri="{FF2B5EF4-FFF2-40B4-BE49-F238E27FC236}">
-                <a16:creationId xmlns:a16="http://schemas.microsoft.com/office/drawing/2014/main" id="{2E59E6B7-7262-44B6-81F8-C4C37E2C5F39}"/>
+                <a16:creationId xmlns:a16="http://schemas.microsoft.com/office/drawing/2014/main" xmlns="" id="{2E59E6B7-7262-44B6-81F8-C4C37E2C5F39}"/>
               </a:ext>
             </a:extLst>
           </p:cNvPr>
@@ -6665,7 +6667,7 @@
           <p:cNvPr id="5" name="กล่องข้อความ 4">
             <a:extLst>
               <a:ext uri="{FF2B5EF4-FFF2-40B4-BE49-F238E27FC236}">
-                <a16:creationId xmlns:a16="http://schemas.microsoft.com/office/drawing/2014/main" id="{7FAE22C3-F394-4043-BF52-23ECC0A95AC1}"/>
+                <a16:creationId xmlns:a16="http://schemas.microsoft.com/office/drawing/2014/main" xmlns="" id="{7FAE22C3-F394-4043-BF52-23ECC0A95AC1}"/>
               </a:ext>
             </a:extLst>
           </p:cNvPr>
@@ -6724,7 +6726,7 @@
           <p:cNvPr id="6" name="สี่เหลี่ยมผืนผ้า 5">
             <a:extLst>
               <a:ext uri="{FF2B5EF4-FFF2-40B4-BE49-F238E27FC236}">
-                <a16:creationId xmlns:a16="http://schemas.microsoft.com/office/drawing/2014/main" id="{D7E2646D-C2F0-42EE-8E9F-9D0866F97149}"/>
+                <a16:creationId xmlns:a16="http://schemas.microsoft.com/office/drawing/2014/main" xmlns="" id="{D7E2646D-C2F0-42EE-8E9F-9D0866F97149}"/>
               </a:ext>
             </a:extLst>
           </p:cNvPr>
@@ -6829,7 +6831,7 @@
           <p:cNvPr id="2" name="ชื่อเรื่อง 1">
             <a:extLst>
               <a:ext uri="{FF2B5EF4-FFF2-40B4-BE49-F238E27FC236}">
-                <a16:creationId xmlns:a16="http://schemas.microsoft.com/office/drawing/2014/main" id="{467002DC-AEF7-46F5-B6C6-3D5F877DF5DA}"/>
+                <a16:creationId xmlns:a16="http://schemas.microsoft.com/office/drawing/2014/main" xmlns="" id="{467002DC-AEF7-46F5-B6C6-3D5F877DF5DA}"/>
               </a:ext>
             </a:extLst>
           </p:cNvPr>
@@ -7188,6 +7190,15 @@
               </a:rPr>
               <a:t> &amp;&amp; exit 1"</a:t>
             </a:r>
+            <a:r>
+              <a:rPr lang="en-US" sz="2000" dirty="0">
+                <a:solidFill>
+                  <a:srgbClr val="B2CACD"/>
+                </a:solidFill>
+                <a:latin typeface="Fira Code" panose="020B0509050000020004" pitchFamily="49" charset="0"/>
+              </a:rPr>
+              <a:t/>
+            </a:r>
             <a:br>
               <a:rPr lang="en-US" sz="2000" dirty="0">
                 <a:solidFill>
@@ -7301,6 +7312,15 @@
                 <a:latin typeface="Fira Code" panose="020B0509050000020004" pitchFamily="49" charset="0"/>
               </a:rPr>
               <a:t>"MIT"</a:t>
+            </a:r>
+            <a:r>
+              <a:rPr lang="en-US" sz="2000" dirty="0">
+                <a:solidFill>
+                  <a:srgbClr val="B2CACD"/>
+                </a:solidFill>
+                <a:latin typeface="Fira Code" panose="020B0509050000020004" pitchFamily="49" charset="0"/>
+              </a:rPr>
+              <a:t/>
             </a:r>
             <a:br>
               <a:rPr lang="en-US" sz="2000" dirty="0">
@@ -7336,7 +7356,7 @@
           <p:cNvPr id="4" name="สี่เหลี่ยมผืนผ้า 3">
             <a:extLst>
               <a:ext uri="{FF2B5EF4-FFF2-40B4-BE49-F238E27FC236}">
-                <a16:creationId xmlns:a16="http://schemas.microsoft.com/office/drawing/2014/main" id="{CB70DCC8-FBF6-491D-BE10-4F99691438ED}"/>
+                <a16:creationId xmlns:a16="http://schemas.microsoft.com/office/drawing/2014/main" xmlns="" id="{CB70DCC8-FBF6-491D-BE10-4F99691438ED}"/>
               </a:ext>
             </a:extLst>
           </p:cNvPr>
@@ -7373,7 +7393,7 @@
           <p:cNvPr id="6" name="สี่เหลี่ยมผืนผ้า 5">
             <a:extLst>
               <a:ext uri="{FF2B5EF4-FFF2-40B4-BE49-F238E27FC236}">
-                <a16:creationId xmlns:a16="http://schemas.microsoft.com/office/drawing/2014/main" id="{4571470B-C6A2-48DC-A4D6-1476A77C0D6C}"/>
+                <a16:creationId xmlns:a16="http://schemas.microsoft.com/office/drawing/2014/main" xmlns="" id="{4571470B-C6A2-48DC-A4D6-1476A77C0D6C}"/>
               </a:ext>
             </a:extLst>
           </p:cNvPr>
@@ -7448,6 +7468,13 @@
       </p:transition>
     </mc:Fallback>
   </mc:AlternateContent>
+  <p:timing>
+    <p:tnLst>
+      <p:par>
+        <p:cTn id="1" dur="indefinite" restart="never" nodeType="tmRoot"/>
+      </p:par>
+    </p:tnLst>
+  </p:timing>
 </p:sld>
 </file>
 
@@ -7473,7 +7500,7 @@
           <p:cNvPr id="2" name="ชื่อเรื่อง 1">
             <a:extLst>
               <a:ext uri="{FF2B5EF4-FFF2-40B4-BE49-F238E27FC236}">
-                <a16:creationId xmlns:a16="http://schemas.microsoft.com/office/drawing/2014/main" id="{E6DA623B-F359-4981-B34B-7998B19781A1}"/>
+                <a16:creationId xmlns:a16="http://schemas.microsoft.com/office/drawing/2014/main" xmlns="" id="{E6DA623B-F359-4981-B34B-7998B19781A1}"/>
               </a:ext>
             </a:extLst>
           </p:cNvPr>
@@ -7506,7 +7533,7 @@
           <p:cNvPr id="4" name="Picture 5" descr="à¸à¸¥à¸à¸²à¸£à¸à¹à¸à¸«à¸²à¸£à¸¹à¸à¸ à¸²à¸à¸ªà¸³à¸«à¸£à¸±à¸ terminal icon">
             <a:extLst>
               <a:ext uri="{FF2B5EF4-FFF2-40B4-BE49-F238E27FC236}">
-                <a16:creationId xmlns:a16="http://schemas.microsoft.com/office/drawing/2014/main" id="{78FA7865-DB4F-47AE-93E4-EEC0CC12C025}"/>
+                <a16:creationId xmlns:a16="http://schemas.microsoft.com/office/drawing/2014/main" xmlns="" id="{78FA7865-DB4F-47AE-93E4-EEC0CC12C025}"/>
               </a:ext>
             </a:extLst>
           </p:cNvPr>
@@ -7553,7 +7580,7 @@
           <p:cNvPr id="5" name="สี่เหลี่ยมผืนผ้า 4">
             <a:extLst>
               <a:ext uri="{FF2B5EF4-FFF2-40B4-BE49-F238E27FC236}">
-                <a16:creationId xmlns:a16="http://schemas.microsoft.com/office/drawing/2014/main" id="{63A61EDA-5D2F-48D5-B269-8A7902C24D32}"/>
+                <a16:creationId xmlns:a16="http://schemas.microsoft.com/office/drawing/2014/main" xmlns="" id="{63A61EDA-5D2F-48D5-B269-8A7902C24D32}"/>
               </a:ext>
             </a:extLst>
           </p:cNvPr>
@@ -7679,7 +7706,7 @@
             <a:hlinkClick r:id="rId3"/>
             <a:extLst>
               <a:ext uri="{FF2B5EF4-FFF2-40B4-BE49-F238E27FC236}">
-                <a16:creationId xmlns:a16="http://schemas.microsoft.com/office/drawing/2014/main" id="{A213CAEC-C7B7-41C0-A3F9-A60489520123}"/>
+                <a16:creationId xmlns:a16="http://schemas.microsoft.com/office/drawing/2014/main" xmlns="" id="{A213CAEC-C7B7-41C0-A3F9-A60489520123}"/>
               </a:ext>
             </a:extLst>
           </p:cNvPr>
@@ -7716,6 +7743,135 @@
     <p:extLst>
       <p:ext uri="{BB962C8B-B14F-4D97-AF65-F5344CB8AC3E}">
         <p14:creationId xmlns:p14="http://schemas.microsoft.com/office/powerpoint/2010/main" val="1498300968"/>
+      </p:ext>
+    </p:extLst>
+  </p:cSld>
+  <p:clrMapOvr>
+    <a:masterClrMapping/>
+  </p:clrMapOvr>
+  <mc:AlternateContent xmlns:mc="http://schemas.openxmlformats.org/markup-compatibility/2006" xmlns:p14="http://schemas.microsoft.com/office/powerpoint/2010/main">
+    <mc:Choice Requires="p14">
+      <p:transition spd="med" p14:dur="700">
+        <p:fade/>
+      </p:transition>
+    </mc:Choice>
+    <mc:Fallback xmlns="">
+      <p:transition spd="med">
+        <p:fade/>
+      </p:transition>
+    </mc:Fallback>
+  </mc:AlternateContent>
+  <p:timing>
+    <p:tnLst>
+      <p:par>
+        <p:cTn id="1" dur="indefinite" restart="never" nodeType="tmRoot"/>
+      </p:par>
+    </p:tnLst>
+  </p:timing>
+</p:sld>
+</file>
+
+<file path=ppt/slides/slide16.xml><?xml version="1.0" encoding="utf-8"?>
+<p:sld xmlns:a="http://schemas.openxmlformats.org/drawingml/2006/main" xmlns:r="http://schemas.openxmlformats.org/officeDocument/2006/relationships" xmlns:p="http://schemas.openxmlformats.org/presentationml/2006/main">
+  <p:cSld>
+    <p:spTree>
+      <p:nvGrpSpPr>
+        <p:cNvPr id="1" name=""/>
+        <p:cNvGrpSpPr/>
+        <p:nvPr/>
+      </p:nvGrpSpPr>
+      <p:grpSpPr>
+        <a:xfrm>
+          <a:off x="0" y="0"/>
+          <a:ext cx="0" cy="0"/>
+          <a:chOff x="0" y="0"/>
+          <a:chExt cx="0" cy="0"/>
+        </a:xfrm>
+      </p:grpSpPr>
+      <p:pic>
+        <p:nvPicPr>
+          <p:cNvPr id="4" name="กราฟิก 3" descr="หนังสือที่เปิดอยู่">
+            <a:extLst>
+              <a:ext uri="{FF2B5EF4-FFF2-40B4-BE49-F238E27FC236}">
+                <a16:creationId xmlns:a16="http://schemas.microsoft.com/office/drawing/2014/main" xmlns="" id="{4BB3C191-56F3-4733-94BB-72EB31650E38}"/>
+              </a:ext>
+            </a:extLst>
+          </p:cNvPr>
+          <p:cNvPicPr>
+            <a:picLocks noChangeAspect="1"/>
+          </p:cNvPicPr>
+          <p:nvPr/>
+        </p:nvPicPr>
+        <p:blipFill>
+          <a:blip r:embed="rId2">
+            <a:extLst>
+              <a:ext uri="{28A0092B-C50C-407E-A947-70E740481C1C}">
+                <a14:useLocalDpi xmlns:a14="http://schemas.microsoft.com/office/drawing/2010/main" val="0"/>
+              </a:ext>
+              <a:ext uri="{96DAC541-7B7A-43D3-8B79-37D633B846F1}">
+                <asvg:svgBlip xmlns:asvg="http://schemas.microsoft.com/office/drawing/2016/SVG/main" xmlns="" r:embed="rId3"/>
+              </a:ext>
+            </a:extLst>
+          </a:blip>
+          <a:stretch>
+            <a:fillRect/>
+          </a:stretch>
+        </p:blipFill>
+        <p:spPr>
+          <a:xfrm>
+            <a:off x="4294212" y="476672"/>
+            <a:ext cx="3600400" cy="3600400"/>
+          </a:xfrm>
+          <a:prstGeom prst="rect">
+            <a:avLst/>
+          </a:prstGeom>
+        </p:spPr>
+      </p:pic>
+      <p:sp>
+        <p:nvSpPr>
+          <p:cNvPr id="5" name="กล่องข้อความ 4">
+            <a:extLst>
+              <a:ext uri="{FF2B5EF4-FFF2-40B4-BE49-F238E27FC236}">
+                <a16:creationId xmlns:a16="http://schemas.microsoft.com/office/drawing/2014/main" xmlns="" id="{2285EDBA-79D7-41C4-972C-261406B0AF7A}"/>
+              </a:ext>
+            </a:extLst>
+          </p:cNvPr>
+          <p:cNvSpPr txBox="1"/>
+          <p:nvPr/>
+        </p:nvSpPr>
+        <p:spPr>
+          <a:xfrm>
+            <a:off x="1665920" y="4437112"/>
+            <a:ext cx="8856984" cy="1200329"/>
+          </a:xfrm>
+          <a:prstGeom prst="rect">
+            <a:avLst/>
+          </a:prstGeom>
+          <a:noFill/>
+        </p:spPr>
+        <p:txBody>
+          <a:bodyPr wrap="square" rtlCol="0">
+            <a:spAutoFit/>
+          </a:bodyPr>
+          <a:lstStyle/>
+          <a:p>
+            <a:pPr algn="ctr"/>
+            <a:r>
+              <a:rPr lang="en-US" sz="7200" spc="600" dirty="0"/>
+              <a:t>Lab://</a:t>
+            </a:r>
+            <a:r>
+              <a:rPr lang="en-US" sz="7200" spc="600" dirty="0" smtClean="0"/>
+              <a:t>002</a:t>
+            </a:r>
+            <a:endParaRPr lang="en-US" sz="7200" spc="600" dirty="0"/>
+          </a:p>
+        </p:txBody>
+      </p:sp>
+    </p:spTree>
+    <p:extLst>
+      <p:ext uri="{BB962C8B-B14F-4D97-AF65-F5344CB8AC3E}">
+        <p14:creationId xmlns:p14="http://schemas.microsoft.com/office/powerpoint/2010/main" val="2594221774"/>
       </p:ext>
     </p:extLst>
   </p:cSld>
@@ -7900,7 +8056,7 @@
           <p:cNvPr id="6" name="Picture 4" descr="à¸à¸¥à¸à¸²à¸£à¸à¹à¸à¸«à¸²à¸£à¸¹à¸à¸ à¸²à¸à¸ªà¸³à¸«à¸£à¸±à¸ node Js logo">
             <a:extLst>
               <a:ext uri="{FF2B5EF4-FFF2-40B4-BE49-F238E27FC236}">
-                <a16:creationId xmlns:a16="http://schemas.microsoft.com/office/drawing/2014/main" id="{A8B98BAF-0B11-4B48-8A1B-08D18716A190}"/>
+                <a16:creationId xmlns:a16="http://schemas.microsoft.com/office/drawing/2014/main" xmlns="" id="{A8B98BAF-0B11-4B48-8A1B-08D18716A190}"/>
               </a:ext>
             </a:extLst>
           </p:cNvPr>
@@ -7989,7 +8145,7 @@
           <p:cNvPr id="6" name="กล่องข้อความ 5">
             <a:extLst>
               <a:ext uri="{FF2B5EF4-FFF2-40B4-BE49-F238E27FC236}">
-                <a16:creationId xmlns:a16="http://schemas.microsoft.com/office/drawing/2014/main" id="{9E065666-30B1-4AD1-9ABE-8987D18AC228}"/>
+                <a16:creationId xmlns:a16="http://schemas.microsoft.com/office/drawing/2014/main" xmlns="" id="{9E065666-30B1-4AD1-9ABE-8987D18AC228}"/>
               </a:ext>
             </a:extLst>
           </p:cNvPr>
@@ -8093,7 +8249,7 @@
           <p:cNvPr id="2" name="ชื่อเรื่อง 1">
             <a:extLst>
               <a:ext uri="{FF2B5EF4-FFF2-40B4-BE49-F238E27FC236}">
-                <a16:creationId xmlns:a16="http://schemas.microsoft.com/office/drawing/2014/main" id="{71E999A3-A3EA-4D1E-A642-76C8AF755FBC}"/>
+                <a16:creationId xmlns:a16="http://schemas.microsoft.com/office/drawing/2014/main" xmlns="" id="{71E999A3-A3EA-4D1E-A642-76C8AF755FBC}"/>
               </a:ext>
             </a:extLst>
           </p:cNvPr>
@@ -8129,7 +8285,7 @@
             <a:hlinkClick r:id="rId2"/>
             <a:extLst>
               <a:ext uri="{FF2B5EF4-FFF2-40B4-BE49-F238E27FC236}">
-                <a16:creationId xmlns:a16="http://schemas.microsoft.com/office/drawing/2014/main" id="{9FBBDCA7-99D7-438D-B898-3144067D86B8}"/>
+                <a16:creationId xmlns:a16="http://schemas.microsoft.com/office/drawing/2014/main" xmlns="" id="{9FBBDCA7-99D7-438D-B898-3144067D86B8}"/>
               </a:ext>
             </a:extLst>
           </p:cNvPr>
@@ -8164,7 +8320,7 @@
             <a:hlinkClick r:id="rId3"/>
             <a:extLst>
               <a:ext uri="{FF2B5EF4-FFF2-40B4-BE49-F238E27FC236}">
-                <a16:creationId xmlns:a16="http://schemas.microsoft.com/office/drawing/2014/main" id="{8982F81D-61A2-4104-80AB-23F9AA78EC74}"/>
+                <a16:creationId xmlns:a16="http://schemas.microsoft.com/office/drawing/2014/main" xmlns="" id="{8982F81D-61A2-4104-80AB-23F9AA78EC74}"/>
               </a:ext>
             </a:extLst>
           </p:cNvPr>
@@ -8236,7 +8392,7 @@
           <p:cNvPr id="2" name="Picture 5" descr="à¸à¸¥à¸à¸²à¸£à¸à¹à¸à¸«à¸²à¸£à¸¹à¸à¸ à¸²à¸à¸ªà¸³à¸«à¸£à¸±à¸ terminal icon">
             <a:extLst>
               <a:ext uri="{FF2B5EF4-FFF2-40B4-BE49-F238E27FC236}">
-                <a16:creationId xmlns:a16="http://schemas.microsoft.com/office/drawing/2014/main" id="{D853DDB3-659B-4A1B-8C52-CEBDEAFE07A1}"/>
+                <a16:creationId xmlns:a16="http://schemas.microsoft.com/office/drawing/2014/main" xmlns="" id="{D853DDB3-659B-4A1B-8C52-CEBDEAFE07A1}"/>
               </a:ext>
             </a:extLst>
           </p:cNvPr>
@@ -8283,7 +8439,7 @@
           <p:cNvPr id="3" name="สี่เหลี่ยมผืนผ้า 2">
             <a:extLst>
               <a:ext uri="{FF2B5EF4-FFF2-40B4-BE49-F238E27FC236}">
-                <a16:creationId xmlns:a16="http://schemas.microsoft.com/office/drawing/2014/main" id="{6E78968F-F046-4B8D-BD90-A00B08B9B1E9}"/>
+                <a16:creationId xmlns:a16="http://schemas.microsoft.com/office/drawing/2014/main" xmlns="" id="{6E78968F-F046-4B8D-BD90-A00B08B9B1E9}"/>
               </a:ext>
             </a:extLst>
           </p:cNvPr>
@@ -8330,7 +8486,7 @@
           <p:cNvPr id="4" name="สี่เหลี่ยมผืนผ้า 3">
             <a:extLst>
               <a:ext uri="{FF2B5EF4-FFF2-40B4-BE49-F238E27FC236}">
-                <a16:creationId xmlns:a16="http://schemas.microsoft.com/office/drawing/2014/main" id="{90063099-E64F-4F82-9097-B405BB8AFEE7}"/>
+                <a16:creationId xmlns:a16="http://schemas.microsoft.com/office/drawing/2014/main" xmlns="" id="{90063099-E64F-4F82-9097-B405BB8AFEE7}"/>
               </a:ext>
             </a:extLst>
           </p:cNvPr>
@@ -8479,7 +8635,7 @@
           <p:cNvPr id="5" name="สี่เหลี่ยมผืนผ้า 4">
             <a:extLst>
               <a:ext uri="{FF2B5EF4-FFF2-40B4-BE49-F238E27FC236}">
-                <a16:creationId xmlns:a16="http://schemas.microsoft.com/office/drawing/2014/main" id="{603BAC18-131C-4410-A924-191C810B906E}"/>
+                <a16:creationId xmlns:a16="http://schemas.microsoft.com/office/drawing/2014/main" xmlns="" id="{603BAC18-131C-4410-A924-191C810B906E}"/>
               </a:ext>
             </a:extLst>
           </p:cNvPr>
@@ -8584,6 +8740,15 @@
             </a:r>
           </a:p>
           <a:p>
+            <a:r>
+              <a:rPr lang="en-US" sz="1800" dirty="0">
+                <a:solidFill>
+                  <a:srgbClr val="B2CACD"/>
+                </a:solidFill>
+                <a:latin typeface="Fira Code" panose="020B0509050000020004" pitchFamily="49" charset="0"/>
+              </a:rPr>
+              <a:t/>
+            </a:r>
             <a:br>
               <a:rPr lang="en-US" sz="1800" dirty="0">
                 <a:solidFill>
@@ -8704,6 +8869,15 @@
             </a:r>
           </a:p>
           <a:p>
+            <a:r>
+              <a:rPr lang="en-US" sz="1800" dirty="0">
+                <a:solidFill>
+                  <a:srgbClr val="B2CACD"/>
+                </a:solidFill>
+                <a:latin typeface="Fira Code" panose="020B0509050000020004" pitchFamily="49" charset="0"/>
+              </a:rPr>
+              <a:t/>
+            </a:r>
             <a:br>
               <a:rPr lang="en-US" sz="1800" dirty="0">
                 <a:solidFill>
@@ -9091,6 +9265,15 @@
             </a:r>
           </a:p>
           <a:p>
+            <a:r>
+              <a:rPr lang="en-US" sz="1800" dirty="0">
+                <a:solidFill>
+                  <a:srgbClr val="B2CACD"/>
+                </a:solidFill>
+                <a:latin typeface="Fira Code" panose="020B0509050000020004" pitchFamily="49" charset="0"/>
+              </a:rPr>
+              <a:t/>
+            </a:r>
             <a:br>
               <a:rPr lang="en-US" sz="1800" dirty="0">
                 <a:solidFill>
@@ -9352,7 +9535,7 @@
           <p:cNvPr id="9" name="Picture 5" descr="à¸à¸¥à¸à¸²à¸£à¸à¹à¸à¸«à¸²à¸£à¸¹à¸à¸ à¸²à¸à¸ªà¸³à¸«à¸£à¸±à¸ terminal icon">
             <a:extLst>
               <a:ext uri="{FF2B5EF4-FFF2-40B4-BE49-F238E27FC236}">
-                <a16:creationId xmlns:a16="http://schemas.microsoft.com/office/drawing/2014/main" id="{6E349DED-16D2-4050-886C-52FE3805F204}"/>
+                <a16:creationId xmlns:a16="http://schemas.microsoft.com/office/drawing/2014/main" xmlns="" id="{6E349DED-16D2-4050-886C-52FE3805F204}"/>
               </a:ext>
             </a:extLst>
           </p:cNvPr>
@@ -9522,7 +9705,7 @@
           <p:cNvPr id="4" name="กราฟิก 3" descr="หนังสือที่เปิดอยู่">
             <a:extLst>
               <a:ext uri="{FF2B5EF4-FFF2-40B4-BE49-F238E27FC236}">
-                <a16:creationId xmlns:a16="http://schemas.microsoft.com/office/drawing/2014/main" id="{4BB3C191-56F3-4733-94BB-72EB31650E38}"/>
+                <a16:creationId xmlns:a16="http://schemas.microsoft.com/office/drawing/2014/main" xmlns="" id="{4BB3C191-56F3-4733-94BB-72EB31650E38}"/>
               </a:ext>
             </a:extLst>
           </p:cNvPr>
@@ -9538,7 +9721,7 @@
                 <a14:useLocalDpi xmlns:a14="http://schemas.microsoft.com/office/drawing/2010/main" val="0"/>
               </a:ext>
               <a:ext uri="{96DAC541-7B7A-43D3-8B79-37D633B846F1}">
-                <asvg:svgBlip xmlns:asvg="http://schemas.microsoft.com/office/drawing/2016/SVG/main" r:embed="rId3"/>
+                <asvg:svgBlip xmlns:asvg="http://schemas.microsoft.com/office/drawing/2016/SVG/main" xmlns="" r:embed="rId3"/>
               </a:ext>
             </a:extLst>
           </a:blip>
@@ -9561,7 +9744,7 @@
           <p:cNvPr id="5" name="กล่องข้อความ 4">
             <a:extLst>
               <a:ext uri="{FF2B5EF4-FFF2-40B4-BE49-F238E27FC236}">
-                <a16:creationId xmlns:a16="http://schemas.microsoft.com/office/drawing/2014/main" id="{2285EDBA-79D7-41C4-972C-261406B0AF7A}"/>
+                <a16:creationId xmlns:a16="http://schemas.microsoft.com/office/drawing/2014/main" xmlns="" id="{2285EDBA-79D7-41C4-972C-261406B0AF7A}"/>
               </a:ext>
             </a:extLst>
           </p:cNvPr>
@@ -9639,7 +9822,7 @@
           <p:cNvPr id="4098" name="Picture 2" descr="à¸à¸¥à¸à¸²à¸£à¸à¹à¸à¸«à¸²à¸£à¸¹à¸à¸ à¸²à¸à¸ªà¸³à¸«à¸£à¸±à¸ npm logo">
             <a:extLst>
               <a:ext uri="{FF2B5EF4-FFF2-40B4-BE49-F238E27FC236}">
-                <a16:creationId xmlns:a16="http://schemas.microsoft.com/office/drawing/2014/main" id="{A46E512A-A331-472B-8AED-55869CAE4316}"/>
+                <a16:creationId xmlns:a16="http://schemas.microsoft.com/office/drawing/2014/main" xmlns="" id="{A46E512A-A331-472B-8AED-55869CAE4316}"/>
               </a:ext>
             </a:extLst>
           </p:cNvPr>
@@ -9686,7 +9869,7 @@
           <p:cNvPr id="4" name="สี่เหลี่ยมผืนผ้า 3">
             <a:extLst>
               <a:ext uri="{FF2B5EF4-FFF2-40B4-BE49-F238E27FC236}">
-                <a16:creationId xmlns:a16="http://schemas.microsoft.com/office/drawing/2014/main" id="{F32BC8C0-4FC5-4BE8-955A-101855364E8B}"/>
+                <a16:creationId xmlns:a16="http://schemas.microsoft.com/office/drawing/2014/main" xmlns="" id="{F32BC8C0-4FC5-4BE8-955A-101855364E8B}"/>
               </a:ext>
             </a:extLst>
           </p:cNvPr>
@@ -10723,6 +10906,142 @@
 </file>
 
 <file path=customXml/item1.xml><?xml version="1.0" encoding="utf-8"?>
+<p:properties xmlns:p="http://schemas.microsoft.com/office/2006/metadata/properties" xmlns:xsi="http://www.w3.org/2001/XMLSchema-instance" xmlns:pc="http://schemas.microsoft.com/office/infopath/2007/PartnerControls">
+  <documentManagement>
+    <LocPublishedLinkedAssetsLookup xmlns="4873beb7-5857-4685-be1f-d57550cc96cc" xsi:nil="true"/>
+    <ApprovalStatus xmlns="4873beb7-5857-4685-be1f-d57550cc96cc">InProgress</ApprovalStatus>
+    <MarketSpecific xmlns="4873beb7-5857-4685-be1f-d57550cc96cc">false</MarketSpecific>
+    <LocComments xmlns="4873beb7-5857-4685-be1f-d57550cc96cc" xsi:nil="true"/>
+    <LocLastLocAttemptVersionTypeLookup xmlns="4873beb7-5857-4685-be1f-d57550cc96cc" xsi:nil="true"/>
+    <DirectSourceMarket xmlns="4873beb7-5857-4685-be1f-d57550cc96cc" xsi:nil="true"/>
+    <ThumbnailAssetId xmlns="4873beb7-5857-4685-be1f-d57550cc96cc" xsi:nil="true"/>
+    <PrimaryImageGen xmlns="4873beb7-5857-4685-be1f-d57550cc96cc">false</PrimaryImageGen>
+    <LocNewPublishedVersionLookup xmlns="4873beb7-5857-4685-be1f-d57550cc96cc" xsi:nil="true"/>
+    <LegacyData xmlns="4873beb7-5857-4685-be1f-d57550cc96cc" xsi:nil="true"/>
+    <LocRecommendedHandoff xmlns="4873beb7-5857-4685-be1f-d57550cc96cc" xsi:nil="true"/>
+    <BusinessGroup xmlns="4873beb7-5857-4685-be1f-d57550cc96cc" xsi:nil="true"/>
+    <BlockPublish xmlns="4873beb7-5857-4685-be1f-d57550cc96cc">false</BlockPublish>
+    <TPFriendlyName xmlns="4873beb7-5857-4685-be1f-d57550cc96cc" xsi:nil="true"/>
+    <LocOverallPublishStatusLookup xmlns="4873beb7-5857-4685-be1f-d57550cc96cc" xsi:nil="true"/>
+    <NumericId xmlns="4873beb7-5857-4685-be1f-d57550cc96cc" xsi:nil="true"/>
+    <APEditor xmlns="4873beb7-5857-4685-be1f-d57550cc96cc">
+      <UserInfo>
+        <DisplayName/>
+        <AccountId xsi:nil="true"/>
+        <AccountType/>
+      </UserInfo>
+    </APEditor>
+    <SourceTitle xmlns="4873beb7-5857-4685-be1f-d57550cc96cc" xsi:nil="true"/>
+    <OpenTemplate xmlns="4873beb7-5857-4685-be1f-d57550cc96cc">true</OpenTemplate>
+    <LocOverallLocStatusLookup xmlns="4873beb7-5857-4685-be1f-d57550cc96cc" xsi:nil="true"/>
+    <UALocComments xmlns="4873beb7-5857-4685-be1f-d57550cc96cc" xsi:nil="true"/>
+    <ParentAssetId xmlns="4873beb7-5857-4685-be1f-d57550cc96cc" xsi:nil="true"/>
+    <IntlLangReviewDate xmlns="4873beb7-5857-4685-be1f-d57550cc96cc" xsi:nil="true"/>
+    <FeatureTagsTaxHTField0 xmlns="4873beb7-5857-4685-be1f-d57550cc96cc">
+      <Terms xmlns="http://schemas.microsoft.com/office/infopath/2007/PartnerControls"/>
+    </FeatureTagsTaxHTField0>
+    <PublishStatusLookup xmlns="4873beb7-5857-4685-be1f-d57550cc96cc">
+      <Value>1345093</Value>
+    </PublishStatusLookup>
+    <Providers xmlns="4873beb7-5857-4685-be1f-d57550cc96cc" xsi:nil="true"/>
+    <MachineTranslated xmlns="4873beb7-5857-4685-be1f-d57550cc96cc">false</MachineTranslated>
+    <OriginalSourceMarket xmlns="4873beb7-5857-4685-be1f-d57550cc96cc" xsi:nil="true"/>
+    <APDescription xmlns="4873beb7-5857-4685-be1f-d57550cc96cc">This simple template design works for technology and  businesses, but it's versatile enough to use in other contexts.  It features multiple slide layouts designed for widescreen (16x9 resolution) and includes a sample SmartArt list and chart that are easily editable.</APDescription>
+    <ClipArtFilename xmlns="4873beb7-5857-4685-be1f-d57550cc96cc" xsi:nil="true"/>
+    <ContentItem xmlns="4873beb7-5857-4685-be1f-d57550cc96cc" xsi:nil="true"/>
+    <TPInstallLocation xmlns="4873beb7-5857-4685-be1f-d57550cc96cc" xsi:nil="true"/>
+    <PublishTargets xmlns="4873beb7-5857-4685-be1f-d57550cc96cc">OfficeOnlineVNext</PublishTargets>
+    <TimesCloned xmlns="4873beb7-5857-4685-be1f-d57550cc96cc" xsi:nil="true"/>
+    <AssetStart xmlns="4873beb7-5857-4685-be1f-d57550cc96cc">2011-11-26T00:30:00+00:00</AssetStart>
+    <Provider xmlns="4873beb7-5857-4685-be1f-d57550cc96cc" xsi:nil="true"/>
+    <AcquiredFrom xmlns="4873beb7-5857-4685-be1f-d57550cc96cc">Internal MS</AcquiredFrom>
+    <FriendlyTitle xmlns="4873beb7-5857-4685-be1f-d57550cc96cc" xsi:nil="true"/>
+    <LastHandOff xmlns="4873beb7-5857-4685-be1f-d57550cc96cc" xsi:nil="true"/>
+    <TPClientViewer xmlns="4873beb7-5857-4685-be1f-d57550cc96cc" xsi:nil="true"/>
+    <TemplateStatus xmlns="4873beb7-5857-4685-be1f-d57550cc96cc">Complete</TemplateStatus>
+    <Downloads xmlns="4873beb7-5857-4685-be1f-d57550cc96cc">0</Downloads>
+    <OOCacheId xmlns="4873beb7-5857-4685-be1f-d57550cc96cc" xsi:nil="true"/>
+    <IsDeleted xmlns="4873beb7-5857-4685-be1f-d57550cc96cc">false</IsDeleted>
+    <LocPublishedDependentAssetsLookup xmlns="4873beb7-5857-4685-be1f-d57550cc96cc" xsi:nil="true"/>
+    <TPExecutable xmlns="4873beb7-5857-4685-be1f-d57550cc96cc" xsi:nil="true"/>
+    <EditorialTags xmlns="4873beb7-5857-4685-be1f-d57550cc96cc" xsi:nil="true"/>
+    <SubmitterId xmlns="4873beb7-5857-4685-be1f-d57550cc96cc" xsi:nil="true"/>
+    <ApprovalLog xmlns="4873beb7-5857-4685-be1f-d57550cc96cc" xsi:nil="true"/>
+    <AssetType xmlns="4873beb7-5857-4685-be1f-d57550cc96cc">TP</AssetType>
+    <BugNumber xmlns="4873beb7-5857-4685-be1f-d57550cc96cc" xsi:nil="true"/>
+    <CSXSubmissionDate xmlns="4873beb7-5857-4685-be1f-d57550cc96cc" xsi:nil="true"/>
+    <CSXUpdate xmlns="4873beb7-5857-4685-be1f-d57550cc96cc">false</CSXUpdate>
+    <Milestone xmlns="4873beb7-5857-4685-be1f-d57550cc96cc" xsi:nil="true"/>
+    <RecommendationsModifier xmlns="4873beb7-5857-4685-be1f-d57550cc96cc" xsi:nil="true"/>
+    <OriginAsset xmlns="4873beb7-5857-4685-be1f-d57550cc96cc" xsi:nil="true"/>
+    <TPComponent xmlns="4873beb7-5857-4685-be1f-d57550cc96cc" xsi:nil="true"/>
+    <AssetId xmlns="4873beb7-5857-4685-be1f-d57550cc96cc">TP102787989</AssetId>
+    <IntlLocPriority xmlns="4873beb7-5857-4685-be1f-d57550cc96cc" xsi:nil="true"/>
+    <PolicheckWords xmlns="4873beb7-5857-4685-be1f-d57550cc96cc" xsi:nil="true"/>
+    <TPLaunchHelpLink xmlns="4873beb7-5857-4685-be1f-d57550cc96cc" xsi:nil="true"/>
+    <TPApplication xmlns="4873beb7-5857-4685-be1f-d57550cc96cc" xsi:nil="true"/>
+    <CrawlForDependencies xmlns="4873beb7-5857-4685-be1f-d57550cc96cc">false</CrawlForDependencies>
+    <HandoffToMSDN xmlns="4873beb7-5857-4685-be1f-d57550cc96cc" xsi:nil="true"/>
+    <PlannedPubDate xmlns="4873beb7-5857-4685-be1f-d57550cc96cc" xsi:nil="true"/>
+    <IntlLangReviewer xmlns="4873beb7-5857-4685-be1f-d57550cc96cc" xsi:nil="true"/>
+    <TrustLevel xmlns="4873beb7-5857-4685-be1f-d57550cc96cc">1 Microsoft Managed Content</TrustLevel>
+    <LocLastLocAttemptVersionLookup xmlns="4873beb7-5857-4685-be1f-d57550cc96cc">694266</LocLastLocAttemptVersionLookup>
+    <LocProcessedForHandoffsLookup xmlns="4873beb7-5857-4685-be1f-d57550cc96cc" xsi:nil="true"/>
+    <IsSearchable xmlns="4873beb7-5857-4685-be1f-d57550cc96cc">true</IsSearchable>
+    <TemplateTemplateType xmlns="4873beb7-5857-4685-be1f-d57550cc96cc">PowerPoint Presentation Template</TemplateTemplateType>
+    <CampaignTagsTaxHTField0 xmlns="4873beb7-5857-4685-be1f-d57550cc96cc">
+      <Terms xmlns="http://schemas.microsoft.com/office/infopath/2007/PartnerControls"/>
+    </CampaignTagsTaxHTField0>
+    <TPNamespace xmlns="4873beb7-5857-4685-be1f-d57550cc96cc" xsi:nil="true"/>
+    <LocOverallPreviewStatusLookup xmlns="4873beb7-5857-4685-be1f-d57550cc96cc" xsi:nil="true"/>
+    <TaxCatchAll xmlns="4873beb7-5857-4685-be1f-d57550cc96cc"/>
+    <Markets xmlns="4873beb7-5857-4685-be1f-d57550cc96cc"/>
+    <UAProjectedTotalWords xmlns="4873beb7-5857-4685-be1f-d57550cc96cc" xsi:nil="true"/>
+    <IntlLangReview xmlns="4873beb7-5857-4685-be1f-d57550cc96cc" xsi:nil="true"/>
+    <OutputCachingOn xmlns="4873beb7-5857-4685-be1f-d57550cc96cc">false</OutputCachingOn>
+    <AverageRating xmlns="4873beb7-5857-4685-be1f-d57550cc96cc" xsi:nil="true"/>
+    <APAuthor xmlns="4873beb7-5857-4685-be1f-d57550cc96cc">
+      <UserInfo>
+        <DisplayName>REDMOND\kristaa</DisplayName>
+        <AccountId>136</AccountId>
+        <AccountType/>
+      </UserInfo>
+    </APAuthor>
+    <LocManualTestRequired xmlns="4873beb7-5857-4685-be1f-d57550cc96cc">false</LocManualTestRequired>
+    <TPCommandLine xmlns="4873beb7-5857-4685-be1f-d57550cc96cc" xsi:nil="true"/>
+    <TPAppVersion xmlns="4873beb7-5857-4685-be1f-d57550cc96cc" xsi:nil="true"/>
+    <EditorialStatus xmlns="4873beb7-5857-4685-be1f-d57550cc96cc">Complete</EditorialStatus>
+    <LastModifiedDateTime xmlns="4873beb7-5857-4685-be1f-d57550cc96cc" xsi:nil="true"/>
+    <ScenarioTagsTaxHTField0 xmlns="4873beb7-5857-4685-be1f-d57550cc96cc">
+      <Terms xmlns="http://schemas.microsoft.com/office/infopath/2007/PartnerControls"/>
+    </ScenarioTagsTaxHTField0>
+    <LocProcessedForMarketsLookup xmlns="4873beb7-5857-4685-be1f-d57550cc96cc" xsi:nil="true"/>
+    <TPLaunchHelpLinkType xmlns="4873beb7-5857-4685-be1f-d57550cc96cc">Template</TPLaunchHelpLinkType>
+    <OriginalRelease xmlns="4873beb7-5857-4685-be1f-d57550cc96cc">15</OriginalRelease>
+    <LocalizationTagsTaxHTField0 xmlns="4873beb7-5857-4685-be1f-d57550cc96cc">
+      <Terms xmlns="http://schemas.microsoft.com/office/infopath/2007/PartnerControls"/>
+    </LocalizationTagsTaxHTField0>
+    <UACurrentWords xmlns="4873beb7-5857-4685-be1f-d57550cc96cc" xsi:nil="true"/>
+    <ArtSampleDocs xmlns="4873beb7-5857-4685-be1f-d57550cc96cc" xsi:nil="true"/>
+    <UALocRecommendation xmlns="4873beb7-5857-4685-be1f-d57550cc96cc">Localize</UALocRecommendation>
+    <Manager xmlns="4873beb7-5857-4685-be1f-d57550cc96cc" xsi:nil="true"/>
+    <LocOverallHandbackStatusLookup xmlns="4873beb7-5857-4685-be1f-d57550cc96cc" xsi:nil="true"/>
+    <ShowIn xmlns="4873beb7-5857-4685-be1f-d57550cc96cc">Show everywhere</ShowIn>
+    <UANotes xmlns="4873beb7-5857-4685-be1f-d57550cc96cc" xsi:nil="true"/>
+    <InternalTagsTaxHTField0 xmlns="4873beb7-5857-4685-be1f-d57550cc96cc">
+      <Terms xmlns="http://schemas.microsoft.com/office/infopath/2007/PartnerControls"/>
+    </InternalTagsTaxHTField0>
+    <CSXHash xmlns="4873beb7-5857-4685-be1f-d57550cc96cc" xsi:nil="true"/>
+    <VoteCount xmlns="4873beb7-5857-4685-be1f-d57550cc96cc" xsi:nil="true"/>
+    <AssetExpire xmlns="4873beb7-5857-4685-be1f-d57550cc96cc">2029-05-12T07:00:00+00:00</AssetExpire>
+    <DSATActionTaken xmlns="4873beb7-5857-4685-be1f-d57550cc96cc" xsi:nil="true"/>
+    <CSXSubmissionMarket xmlns="4873beb7-5857-4685-be1f-d57550cc96cc" xsi:nil="true"/>
+    <LocMarketGroupTiers2 xmlns="4873beb7-5857-4685-be1f-d57550cc96cc" xsi:nil="true"/>
+  </documentManagement>
+</p:properties>
+</file>
+
+<file path=customXml/item2.xml><?xml version="1.0" encoding="utf-8"?>
 <ct:contentTypeSchema xmlns:ct="http://schemas.microsoft.com/office/2006/metadata/contentType" xmlns:ma="http://schemas.microsoft.com/office/2006/metadata/properties/metaAttributes" ct:_="" ma:_="" ma:contentTypeName="TemplateFile" ma:contentTypeID="0x0101006EDDDB5EE6D98C44930B742096920B300400F5B6D36B3EF94B4E9A635CDF2A18F5B8" ma:contentTypeVersion="72" ma:contentTypeDescription="Create a new document." ma:contentTypeScope="" ma:versionID="a23e56308344d904b51738559c3d67c9">
   <xsd:schema xmlns:xsd="http://www.w3.org/2001/XMLSchema" xmlns:xs="http://www.w3.org/2001/XMLSchema" xmlns:p="http://schemas.microsoft.com/office/2006/metadata/properties" xmlns:ns2="4873beb7-5857-4685-be1f-d57550cc96cc" targetNamespace="http://schemas.microsoft.com/office/2006/metadata/properties" ma:root="true" ma:fieldsID="cd0908cc4600e77bf5da051303e00c8d" ns2:_="">
     <xsd:import namespace="4873beb7-5857-4685-be1f-d57550cc96cc"/>
@@ -11762,142 +12081,6 @@
 </ct:contentTypeSchema>
 </file>
 
-<file path=customXml/item2.xml><?xml version="1.0" encoding="utf-8"?>
-<p:properties xmlns:p="http://schemas.microsoft.com/office/2006/metadata/properties" xmlns:xsi="http://www.w3.org/2001/XMLSchema-instance" xmlns:pc="http://schemas.microsoft.com/office/infopath/2007/PartnerControls">
-  <documentManagement>
-    <LocPublishedLinkedAssetsLookup xmlns="4873beb7-5857-4685-be1f-d57550cc96cc" xsi:nil="true"/>
-    <ApprovalStatus xmlns="4873beb7-5857-4685-be1f-d57550cc96cc">InProgress</ApprovalStatus>
-    <MarketSpecific xmlns="4873beb7-5857-4685-be1f-d57550cc96cc">false</MarketSpecific>
-    <LocComments xmlns="4873beb7-5857-4685-be1f-d57550cc96cc" xsi:nil="true"/>
-    <LocLastLocAttemptVersionTypeLookup xmlns="4873beb7-5857-4685-be1f-d57550cc96cc" xsi:nil="true"/>
-    <DirectSourceMarket xmlns="4873beb7-5857-4685-be1f-d57550cc96cc" xsi:nil="true"/>
-    <ThumbnailAssetId xmlns="4873beb7-5857-4685-be1f-d57550cc96cc" xsi:nil="true"/>
-    <PrimaryImageGen xmlns="4873beb7-5857-4685-be1f-d57550cc96cc">false</PrimaryImageGen>
-    <LocNewPublishedVersionLookup xmlns="4873beb7-5857-4685-be1f-d57550cc96cc" xsi:nil="true"/>
-    <LegacyData xmlns="4873beb7-5857-4685-be1f-d57550cc96cc" xsi:nil="true"/>
-    <LocRecommendedHandoff xmlns="4873beb7-5857-4685-be1f-d57550cc96cc" xsi:nil="true"/>
-    <BusinessGroup xmlns="4873beb7-5857-4685-be1f-d57550cc96cc" xsi:nil="true"/>
-    <BlockPublish xmlns="4873beb7-5857-4685-be1f-d57550cc96cc">false</BlockPublish>
-    <TPFriendlyName xmlns="4873beb7-5857-4685-be1f-d57550cc96cc" xsi:nil="true"/>
-    <LocOverallPublishStatusLookup xmlns="4873beb7-5857-4685-be1f-d57550cc96cc" xsi:nil="true"/>
-    <NumericId xmlns="4873beb7-5857-4685-be1f-d57550cc96cc" xsi:nil="true"/>
-    <APEditor xmlns="4873beb7-5857-4685-be1f-d57550cc96cc">
-      <UserInfo>
-        <DisplayName/>
-        <AccountId xsi:nil="true"/>
-        <AccountType/>
-      </UserInfo>
-    </APEditor>
-    <SourceTitle xmlns="4873beb7-5857-4685-be1f-d57550cc96cc" xsi:nil="true"/>
-    <OpenTemplate xmlns="4873beb7-5857-4685-be1f-d57550cc96cc">true</OpenTemplate>
-    <LocOverallLocStatusLookup xmlns="4873beb7-5857-4685-be1f-d57550cc96cc" xsi:nil="true"/>
-    <UALocComments xmlns="4873beb7-5857-4685-be1f-d57550cc96cc" xsi:nil="true"/>
-    <ParentAssetId xmlns="4873beb7-5857-4685-be1f-d57550cc96cc" xsi:nil="true"/>
-    <IntlLangReviewDate xmlns="4873beb7-5857-4685-be1f-d57550cc96cc" xsi:nil="true"/>
-    <FeatureTagsTaxHTField0 xmlns="4873beb7-5857-4685-be1f-d57550cc96cc">
-      <Terms xmlns="http://schemas.microsoft.com/office/infopath/2007/PartnerControls"/>
-    </FeatureTagsTaxHTField0>
-    <PublishStatusLookup xmlns="4873beb7-5857-4685-be1f-d57550cc96cc">
-      <Value>1345093</Value>
-    </PublishStatusLookup>
-    <Providers xmlns="4873beb7-5857-4685-be1f-d57550cc96cc" xsi:nil="true"/>
-    <MachineTranslated xmlns="4873beb7-5857-4685-be1f-d57550cc96cc">false</MachineTranslated>
-    <OriginalSourceMarket xmlns="4873beb7-5857-4685-be1f-d57550cc96cc" xsi:nil="true"/>
-    <APDescription xmlns="4873beb7-5857-4685-be1f-d57550cc96cc">This simple template design works for technology and  businesses, but it's versatile enough to use in other contexts.  It features multiple slide layouts designed for widescreen (16x9 resolution) and includes a sample SmartArt list and chart that are easily editable.</APDescription>
-    <ClipArtFilename xmlns="4873beb7-5857-4685-be1f-d57550cc96cc" xsi:nil="true"/>
-    <ContentItem xmlns="4873beb7-5857-4685-be1f-d57550cc96cc" xsi:nil="true"/>
-    <TPInstallLocation xmlns="4873beb7-5857-4685-be1f-d57550cc96cc" xsi:nil="true"/>
-    <PublishTargets xmlns="4873beb7-5857-4685-be1f-d57550cc96cc">OfficeOnlineVNext</PublishTargets>
-    <TimesCloned xmlns="4873beb7-5857-4685-be1f-d57550cc96cc" xsi:nil="true"/>
-    <AssetStart xmlns="4873beb7-5857-4685-be1f-d57550cc96cc">2011-11-26T00:30:00+00:00</AssetStart>
-    <Provider xmlns="4873beb7-5857-4685-be1f-d57550cc96cc" xsi:nil="true"/>
-    <AcquiredFrom xmlns="4873beb7-5857-4685-be1f-d57550cc96cc">Internal MS</AcquiredFrom>
-    <FriendlyTitle xmlns="4873beb7-5857-4685-be1f-d57550cc96cc" xsi:nil="true"/>
-    <LastHandOff xmlns="4873beb7-5857-4685-be1f-d57550cc96cc" xsi:nil="true"/>
-    <TPClientViewer xmlns="4873beb7-5857-4685-be1f-d57550cc96cc" xsi:nil="true"/>
-    <TemplateStatus xmlns="4873beb7-5857-4685-be1f-d57550cc96cc">Complete</TemplateStatus>
-    <Downloads xmlns="4873beb7-5857-4685-be1f-d57550cc96cc">0</Downloads>
-    <OOCacheId xmlns="4873beb7-5857-4685-be1f-d57550cc96cc" xsi:nil="true"/>
-    <IsDeleted xmlns="4873beb7-5857-4685-be1f-d57550cc96cc">false</IsDeleted>
-    <LocPublishedDependentAssetsLookup xmlns="4873beb7-5857-4685-be1f-d57550cc96cc" xsi:nil="true"/>
-    <TPExecutable xmlns="4873beb7-5857-4685-be1f-d57550cc96cc" xsi:nil="true"/>
-    <EditorialTags xmlns="4873beb7-5857-4685-be1f-d57550cc96cc" xsi:nil="true"/>
-    <SubmitterId xmlns="4873beb7-5857-4685-be1f-d57550cc96cc" xsi:nil="true"/>
-    <ApprovalLog xmlns="4873beb7-5857-4685-be1f-d57550cc96cc" xsi:nil="true"/>
-    <AssetType xmlns="4873beb7-5857-4685-be1f-d57550cc96cc">TP</AssetType>
-    <BugNumber xmlns="4873beb7-5857-4685-be1f-d57550cc96cc" xsi:nil="true"/>
-    <CSXSubmissionDate xmlns="4873beb7-5857-4685-be1f-d57550cc96cc" xsi:nil="true"/>
-    <CSXUpdate xmlns="4873beb7-5857-4685-be1f-d57550cc96cc">false</CSXUpdate>
-    <Milestone xmlns="4873beb7-5857-4685-be1f-d57550cc96cc" xsi:nil="true"/>
-    <RecommendationsModifier xmlns="4873beb7-5857-4685-be1f-d57550cc96cc" xsi:nil="true"/>
-    <OriginAsset xmlns="4873beb7-5857-4685-be1f-d57550cc96cc" xsi:nil="true"/>
-    <TPComponent xmlns="4873beb7-5857-4685-be1f-d57550cc96cc" xsi:nil="true"/>
-    <AssetId xmlns="4873beb7-5857-4685-be1f-d57550cc96cc">TP102787989</AssetId>
-    <IntlLocPriority xmlns="4873beb7-5857-4685-be1f-d57550cc96cc" xsi:nil="true"/>
-    <PolicheckWords xmlns="4873beb7-5857-4685-be1f-d57550cc96cc" xsi:nil="true"/>
-    <TPLaunchHelpLink xmlns="4873beb7-5857-4685-be1f-d57550cc96cc" xsi:nil="true"/>
-    <TPApplication xmlns="4873beb7-5857-4685-be1f-d57550cc96cc" xsi:nil="true"/>
-    <CrawlForDependencies xmlns="4873beb7-5857-4685-be1f-d57550cc96cc">false</CrawlForDependencies>
-    <HandoffToMSDN xmlns="4873beb7-5857-4685-be1f-d57550cc96cc" xsi:nil="true"/>
-    <PlannedPubDate xmlns="4873beb7-5857-4685-be1f-d57550cc96cc" xsi:nil="true"/>
-    <IntlLangReviewer xmlns="4873beb7-5857-4685-be1f-d57550cc96cc" xsi:nil="true"/>
-    <TrustLevel xmlns="4873beb7-5857-4685-be1f-d57550cc96cc">1 Microsoft Managed Content</TrustLevel>
-    <LocLastLocAttemptVersionLookup xmlns="4873beb7-5857-4685-be1f-d57550cc96cc">694266</LocLastLocAttemptVersionLookup>
-    <LocProcessedForHandoffsLookup xmlns="4873beb7-5857-4685-be1f-d57550cc96cc" xsi:nil="true"/>
-    <IsSearchable xmlns="4873beb7-5857-4685-be1f-d57550cc96cc">true</IsSearchable>
-    <TemplateTemplateType xmlns="4873beb7-5857-4685-be1f-d57550cc96cc">PowerPoint Presentation Template</TemplateTemplateType>
-    <CampaignTagsTaxHTField0 xmlns="4873beb7-5857-4685-be1f-d57550cc96cc">
-      <Terms xmlns="http://schemas.microsoft.com/office/infopath/2007/PartnerControls"/>
-    </CampaignTagsTaxHTField0>
-    <TPNamespace xmlns="4873beb7-5857-4685-be1f-d57550cc96cc" xsi:nil="true"/>
-    <LocOverallPreviewStatusLookup xmlns="4873beb7-5857-4685-be1f-d57550cc96cc" xsi:nil="true"/>
-    <TaxCatchAll xmlns="4873beb7-5857-4685-be1f-d57550cc96cc"/>
-    <Markets xmlns="4873beb7-5857-4685-be1f-d57550cc96cc"/>
-    <UAProjectedTotalWords xmlns="4873beb7-5857-4685-be1f-d57550cc96cc" xsi:nil="true"/>
-    <IntlLangReview xmlns="4873beb7-5857-4685-be1f-d57550cc96cc" xsi:nil="true"/>
-    <OutputCachingOn xmlns="4873beb7-5857-4685-be1f-d57550cc96cc">false</OutputCachingOn>
-    <AverageRating xmlns="4873beb7-5857-4685-be1f-d57550cc96cc" xsi:nil="true"/>
-    <APAuthor xmlns="4873beb7-5857-4685-be1f-d57550cc96cc">
-      <UserInfo>
-        <DisplayName>REDMOND\kristaa</DisplayName>
-        <AccountId>136</AccountId>
-        <AccountType/>
-      </UserInfo>
-    </APAuthor>
-    <LocManualTestRequired xmlns="4873beb7-5857-4685-be1f-d57550cc96cc">false</LocManualTestRequired>
-    <TPCommandLine xmlns="4873beb7-5857-4685-be1f-d57550cc96cc" xsi:nil="true"/>
-    <TPAppVersion xmlns="4873beb7-5857-4685-be1f-d57550cc96cc" xsi:nil="true"/>
-    <EditorialStatus xmlns="4873beb7-5857-4685-be1f-d57550cc96cc">Complete</EditorialStatus>
-    <LastModifiedDateTime xmlns="4873beb7-5857-4685-be1f-d57550cc96cc" xsi:nil="true"/>
-    <ScenarioTagsTaxHTField0 xmlns="4873beb7-5857-4685-be1f-d57550cc96cc">
-      <Terms xmlns="http://schemas.microsoft.com/office/infopath/2007/PartnerControls"/>
-    </ScenarioTagsTaxHTField0>
-    <LocProcessedForMarketsLookup xmlns="4873beb7-5857-4685-be1f-d57550cc96cc" xsi:nil="true"/>
-    <TPLaunchHelpLinkType xmlns="4873beb7-5857-4685-be1f-d57550cc96cc">Template</TPLaunchHelpLinkType>
-    <OriginalRelease xmlns="4873beb7-5857-4685-be1f-d57550cc96cc">15</OriginalRelease>
-    <LocalizationTagsTaxHTField0 xmlns="4873beb7-5857-4685-be1f-d57550cc96cc">
-      <Terms xmlns="http://schemas.microsoft.com/office/infopath/2007/PartnerControls"/>
-    </LocalizationTagsTaxHTField0>
-    <UACurrentWords xmlns="4873beb7-5857-4685-be1f-d57550cc96cc" xsi:nil="true"/>
-    <ArtSampleDocs xmlns="4873beb7-5857-4685-be1f-d57550cc96cc" xsi:nil="true"/>
-    <UALocRecommendation xmlns="4873beb7-5857-4685-be1f-d57550cc96cc">Localize</UALocRecommendation>
-    <Manager xmlns="4873beb7-5857-4685-be1f-d57550cc96cc" xsi:nil="true"/>
-    <LocOverallHandbackStatusLookup xmlns="4873beb7-5857-4685-be1f-d57550cc96cc" xsi:nil="true"/>
-    <ShowIn xmlns="4873beb7-5857-4685-be1f-d57550cc96cc">Show everywhere</ShowIn>
-    <UANotes xmlns="4873beb7-5857-4685-be1f-d57550cc96cc" xsi:nil="true"/>
-    <InternalTagsTaxHTField0 xmlns="4873beb7-5857-4685-be1f-d57550cc96cc">
-      <Terms xmlns="http://schemas.microsoft.com/office/infopath/2007/PartnerControls"/>
-    </InternalTagsTaxHTField0>
-    <CSXHash xmlns="4873beb7-5857-4685-be1f-d57550cc96cc" xsi:nil="true"/>
-    <VoteCount xmlns="4873beb7-5857-4685-be1f-d57550cc96cc" xsi:nil="true"/>
-    <AssetExpire xmlns="4873beb7-5857-4685-be1f-d57550cc96cc">2029-05-12T07:00:00+00:00</AssetExpire>
-    <DSATActionTaken xmlns="4873beb7-5857-4685-be1f-d57550cc96cc" xsi:nil="true"/>
-    <CSXSubmissionMarket xmlns="4873beb7-5857-4685-be1f-d57550cc96cc" xsi:nil="true"/>
-    <LocMarketGroupTiers2 xmlns="4873beb7-5857-4685-be1f-d57550cc96cc" xsi:nil="true"/>
-  </documentManagement>
-</p:properties>
-</file>
-
 <file path=customXml/item3.xml><?xml version="1.0" encoding="utf-8"?>
 <?mso-contentType ?>
 <FormTemplates xmlns="http://schemas.microsoft.com/sharepoint/v3/contenttype/forms">
@@ -11908,6 +12091,22 @@
 </file>
 
 <file path=customXml/itemProps1.xml><?xml version="1.0" encoding="utf-8"?>
+<ds:datastoreItem xmlns:ds="http://schemas.openxmlformats.org/officeDocument/2006/customXml" ds:itemID="{60C67BEE-D13F-4BD2-98A5-34D8A0977F68}">
+  <ds:schemaRefs>
+    <ds:schemaRef ds:uri="http://purl.org/dc/terms/"/>
+    <ds:schemaRef ds:uri="http://schemas.openxmlformats.org/package/2006/metadata/core-properties"/>
+    <ds:schemaRef ds:uri="http://schemas.microsoft.com/office/2006/documentManagement/types"/>
+    <ds:schemaRef ds:uri="http://purl.org/dc/elements/1.1/"/>
+    <ds:schemaRef ds:uri="http://schemas.microsoft.com/office/2006/metadata/properties"/>
+    <ds:schemaRef ds:uri="4873beb7-5857-4685-be1f-d57550cc96cc"/>
+    <ds:schemaRef ds:uri="http://schemas.microsoft.com/office/infopath/2007/PartnerControls"/>
+    <ds:schemaRef ds:uri="http://www.w3.org/XML/1998/namespace"/>
+    <ds:schemaRef ds:uri="http://purl.org/dc/dcmitype/"/>
+  </ds:schemaRefs>
+</ds:datastoreItem>
+</file>
+
+<file path=customXml/itemProps2.xml><?xml version="1.0" encoding="utf-8"?>
 <ds:datastoreItem xmlns:ds="http://schemas.openxmlformats.org/officeDocument/2006/customXml" ds:itemID="{A09BF4D4-EF60-4196-BFC3-9462D607978C}">
   <ds:schemaRefs>
     <ds:schemaRef ds:uri="http://schemas.microsoft.com/office/2006/metadata/contentType"/>
@@ -11925,22 +12124,6 @@
 </ds:datastoreItem>
 </file>
 
-<file path=customXml/itemProps2.xml><?xml version="1.0" encoding="utf-8"?>
-<ds:datastoreItem xmlns:ds="http://schemas.openxmlformats.org/officeDocument/2006/customXml" ds:itemID="{60C67BEE-D13F-4BD2-98A5-34D8A0977F68}">
-  <ds:schemaRefs>
-    <ds:schemaRef ds:uri="http://purl.org/dc/terms/"/>
-    <ds:schemaRef ds:uri="http://schemas.openxmlformats.org/package/2006/metadata/core-properties"/>
-    <ds:schemaRef ds:uri="http://schemas.microsoft.com/office/2006/documentManagement/types"/>
-    <ds:schemaRef ds:uri="http://purl.org/dc/elements/1.1/"/>
-    <ds:schemaRef ds:uri="http://schemas.microsoft.com/office/2006/metadata/properties"/>
-    <ds:schemaRef ds:uri="4873beb7-5857-4685-be1f-d57550cc96cc"/>
-    <ds:schemaRef ds:uri="http://schemas.microsoft.com/office/infopath/2007/PartnerControls"/>
-    <ds:schemaRef ds:uri="http://www.w3.org/XML/1998/namespace"/>
-    <ds:schemaRef ds:uri="http://purl.org/dc/dcmitype/"/>
-  </ds:schemaRefs>
-</ds:datastoreItem>
-</file>
-
 <file path=customXml/itemProps3.xml><?xml version="1.0" encoding="utf-8"?>
 <ds:datastoreItem xmlns:ds="http://schemas.openxmlformats.org/officeDocument/2006/customXml" ds:itemID="{3836F65B-1B07-41EE-A0E8-BC6EF3855225}">
   <ds:schemaRefs>

</xml_diff>

<commit_message>
add ES6 course outline to pptx
</commit_message>
<xml_diff>
--- a/Modern JavaScript.pptx
+++ b/Modern JavaScript.pptx
@@ -5,10 +5,10 @@
     <p:sldMasterId id="2147483660" r:id="rId4"/>
   </p:sldMasterIdLst>
   <p:notesMasterIdLst>
-    <p:notesMasterId r:id="rId21"/>
+    <p:notesMasterId r:id="rId39"/>
   </p:notesMasterIdLst>
   <p:handoutMasterIdLst>
-    <p:handoutMasterId r:id="rId22"/>
+    <p:handoutMasterId r:id="rId40"/>
   </p:handoutMasterIdLst>
   <p:sldIdLst>
     <p:sldId id="257" r:id="rId5"/>
@@ -27,6 +27,24 @@
     <p:sldId id="280" r:id="rId18"/>
     <p:sldId id="281" r:id="rId19"/>
     <p:sldId id="282" r:id="rId20"/>
+    <p:sldId id="283" r:id="rId21"/>
+    <p:sldId id="284" r:id="rId22"/>
+    <p:sldId id="285" r:id="rId23"/>
+    <p:sldId id="286" r:id="rId24"/>
+    <p:sldId id="287" r:id="rId25"/>
+    <p:sldId id="288" r:id="rId26"/>
+    <p:sldId id="289" r:id="rId27"/>
+    <p:sldId id="290" r:id="rId28"/>
+    <p:sldId id="292" r:id="rId29"/>
+    <p:sldId id="293" r:id="rId30"/>
+    <p:sldId id="294" r:id="rId31"/>
+    <p:sldId id="295" r:id="rId32"/>
+    <p:sldId id="296" r:id="rId33"/>
+    <p:sldId id="297" r:id="rId34"/>
+    <p:sldId id="298" r:id="rId35"/>
+    <p:sldId id="299" r:id="rId36"/>
+    <p:sldId id="300" r:id="rId37"/>
+    <p:sldId id="301" r:id="rId38"/>
   </p:sldIdLst>
   <p:sldSz cx="12188825" cy="6858000"/>
   <p:notesSz cx="6858000" cy="9144000"/>
@@ -150,6 +168,24 @@
             <p14:sldId id="280"/>
             <p14:sldId id="281"/>
             <p14:sldId id="282"/>
+            <p14:sldId id="283"/>
+            <p14:sldId id="284"/>
+            <p14:sldId id="285"/>
+            <p14:sldId id="286"/>
+            <p14:sldId id="287"/>
+            <p14:sldId id="288"/>
+            <p14:sldId id="289"/>
+            <p14:sldId id="290"/>
+            <p14:sldId id="292"/>
+            <p14:sldId id="293"/>
+            <p14:sldId id="294"/>
+            <p14:sldId id="295"/>
+            <p14:sldId id="296"/>
+            <p14:sldId id="297"/>
+            <p14:sldId id="298"/>
+            <p14:sldId id="299"/>
+            <p14:sldId id="300"/>
+            <p14:sldId id="301"/>
           </p14:sldIdLst>
         </p14:section>
       </p14:sectionLst>
@@ -276,7 +312,7 @@
                 <a:latin typeface="Leelawadee" panose="020B0502040204020203" pitchFamily="34" charset="-34"/>
                 <a:cs typeface="Leelawadee" panose="020B0502040204020203" pitchFamily="34" charset="-34"/>
               </a:rPr>
-              <a:t>07/12/61</a:t>
+              <a:t>15/12/61</a:t>
             </a:fld>
             <a:endParaRPr lang="th-TH" dirty="0">
               <a:latin typeface="Leelawadee" panose="020B0502040204020203" pitchFamily="34" charset="-34"/>
@@ -463,7 +499,7 @@
             <a:fld id="{35DF1DDF-362D-4D18-98FF-1FECAE6E4FE2}" type="datetime1">
               <a:rPr lang="th-TH" smtClean="0"/>
               <a:pPr/>
-              <a:t>07/12/61</a:t>
+              <a:t>15/12/61</a:t>
             </a:fld>
             <a:endParaRPr lang="th-TH" dirty="0"/>
           </a:p>
@@ -1958,7 +1994,7 @@
             <a:fld id="{730796BA-1D81-4409-85E8-C6837D6AB849}" type="datetime1">
               <a:rPr lang="th-TH" smtClean="0"/>
               <a:pPr/>
-              <a:t>07/12/61</a:t>
+              <a:t>15/12/61</a:t>
             </a:fld>
             <a:endParaRPr lang="th-TH" dirty="0"/>
           </a:p>
@@ -2173,7 +2209,7 @@
             <a:fld id="{730796BA-1D81-4409-85E8-C6837D6AB849}" type="datetime1">
               <a:rPr lang="th-TH" smtClean="0"/>
               <a:pPr/>
-              <a:t>07/12/61</a:t>
+              <a:t>15/12/61</a:t>
             </a:fld>
             <a:endParaRPr lang="th-TH" dirty="0"/>
           </a:p>
@@ -2385,7 +2421,7 @@
             <a:fld id="{730796BA-1D81-4409-85E8-C6837D6AB849}" type="datetime1">
               <a:rPr lang="th-TH" smtClean="0"/>
               <a:pPr/>
-              <a:t>07/12/61</a:t>
+              <a:t>15/12/61</a:t>
             </a:fld>
             <a:endParaRPr lang="th-TH" dirty="0"/>
           </a:p>
@@ -2587,7 +2623,7 @@
             <a:fld id="{730796BA-1D81-4409-85E8-C6837D6AB849}" type="datetime1">
               <a:rPr lang="th-TH" smtClean="0"/>
               <a:pPr/>
-              <a:t>07/12/61</a:t>
+              <a:t>15/12/61</a:t>
             </a:fld>
             <a:endParaRPr lang="th-TH" dirty="0"/>
           </a:p>
@@ -3023,7 +3059,7 @@
             <a:fld id="{730796BA-1D81-4409-85E8-C6837D6AB849}" type="datetime1">
               <a:rPr lang="th-TH" smtClean="0"/>
               <a:pPr/>
-              <a:t>07/12/61</a:t>
+              <a:t>15/12/61</a:t>
             </a:fld>
             <a:endParaRPr lang="th-TH" dirty="0"/>
           </a:p>
@@ -3331,7 +3367,7 @@
             <a:fld id="{730796BA-1D81-4409-85E8-C6837D6AB849}" type="datetime1">
               <a:rPr lang="th-TH" smtClean="0"/>
               <a:pPr/>
-              <a:t>07/12/61</a:t>
+              <a:t>15/12/61</a:t>
             </a:fld>
             <a:endParaRPr lang="th-TH" dirty="0"/>
           </a:p>
@@ -3791,7 +3827,7 @@
             <a:fld id="{730796BA-1D81-4409-85E8-C6837D6AB849}" type="datetime1">
               <a:rPr lang="th-TH" smtClean="0"/>
               <a:pPr/>
-              <a:t>07/12/61</a:t>
+              <a:t>15/12/61</a:t>
             </a:fld>
             <a:endParaRPr lang="th-TH" dirty="0"/>
           </a:p>
@@ -3925,7 +3961,7 @@
             <a:fld id="{730796BA-1D81-4409-85E8-C6837D6AB849}" type="datetime1">
               <a:rPr lang="th-TH" smtClean="0"/>
               <a:pPr/>
-              <a:t>07/12/61</a:t>
+              <a:t>15/12/61</a:t>
             </a:fld>
             <a:endParaRPr lang="th-TH" dirty="0"/>
           </a:p>
@@ -4035,7 +4071,7 @@
             <a:fld id="{730796BA-1D81-4409-85E8-C6837D6AB849}" type="datetime1">
               <a:rPr lang="th-TH" smtClean="0"/>
               <a:pPr/>
-              <a:t>07/12/61</a:t>
+              <a:t>15/12/61</a:t>
             </a:fld>
             <a:endParaRPr lang="th-TH" dirty="0"/>
           </a:p>
@@ -4338,7 +4374,7 @@
             <a:fld id="{730796BA-1D81-4409-85E8-C6837D6AB849}" type="datetime1">
               <a:rPr lang="th-TH" smtClean="0"/>
               <a:pPr/>
-              <a:t>07/12/61</a:t>
+              <a:t>15/12/61</a:t>
             </a:fld>
             <a:endParaRPr lang="th-TH" dirty="0"/>
           </a:p>
@@ -4631,7 +4667,7 @@
             <a:fld id="{730796BA-1D81-4409-85E8-C6837D6AB849}" type="datetime1">
               <a:rPr lang="th-TH" smtClean="0"/>
               <a:pPr/>
-              <a:t>07/12/61</a:t>
+              <a:t>15/12/61</a:t>
             </a:fld>
             <a:endParaRPr lang="th-TH" dirty="0"/>
           </a:p>
@@ -5266,7 +5302,7 @@
             <a:fld id="{730796BA-1D81-4409-85E8-C6837D6AB849}" type="datetime1">
               <a:rPr lang="th-TH" smtClean="0"/>
               <a:pPr/>
-              <a:t>07/12/61</a:t>
+              <a:t>15/12/61</a:t>
             </a:fld>
             <a:endParaRPr lang="th-TH" dirty="0"/>
           </a:p>
@@ -5849,7 +5885,7 @@
           <p:cNvPr id="2050" name="Picture 2" descr="à¸à¸¥à¸à¸²à¸£à¸à¹à¸à¸«à¸²à¸£à¸¹à¸à¸ à¸²à¸à¸ªà¸³à¸«à¸£à¸±à¸ javascript logo">
             <a:extLst>
               <a:ext uri="{FF2B5EF4-FFF2-40B4-BE49-F238E27FC236}">
-                <a16:creationId xmlns:a16="http://schemas.microsoft.com/office/drawing/2014/main" xmlns="" id="{9C68F571-A812-48CA-96B9-412E5729A997}"/>
+                <a16:creationId xmlns:a16="http://schemas.microsoft.com/office/drawing/2014/main" id="{9C68F571-A812-48CA-96B9-412E5729A997}"/>
               </a:ext>
             </a:extLst>
           </p:cNvPr>
@@ -5896,7 +5932,7 @@
           <p:cNvPr id="2052" name="Picture 4" descr="à¸à¸¥à¸à¸²à¸£à¸à¹à¸à¸«à¸²à¸£à¸¹à¸à¸ à¸²à¸à¸ªà¸³à¸«à¸£à¸±à¸ javascript logo">
             <a:extLst>
               <a:ext uri="{FF2B5EF4-FFF2-40B4-BE49-F238E27FC236}">
-                <a16:creationId xmlns:a16="http://schemas.microsoft.com/office/drawing/2014/main" xmlns="" id="{0D792CA9-4700-40DD-B22C-E9890DCCA364}"/>
+                <a16:creationId xmlns:a16="http://schemas.microsoft.com/office/drawing/2014/main" id="{0D792CA9-4700-40DD-B22C-E9890DCCA364}"/>
               </a:ext>
             </a:extLst>
           </p:cNvPr>
@@ -5943,7 +5979,7 @@
           <p:cNvPr id="2054" name="Picture 6" descr="à¸à¸¥à¸à¸²à¸£à¸à¹à¸à¸«à¸²à¸£à¸¹à¸à¸ à¸²à¸à¸ªà¸³à¸«à¸£à¸±à¸ javascript logo">
             <a:extLst>
               <a:ext uri="{FF2B5EF4-FFF2-40B4-BE49-F238E27FC236}">
-                <a16:creationId xmlns:a16="http://schemas.microsoft.com/office/drawing/2014/main" xmlns="" id="{1FE4F484-2C61-4871-B685-AA45E5B9D7E7}"/>
+                <a16:creationId xmlns:a16="http://schemas.microsoft.com/office/drawing/2014/main" id="{1FE4F484-2C61-4871-B685-AA45E5B9D7E7}"/>
               </a:ext>
             </a:extLst>
           </p:cNvPr>
@@ -5990,7 +6026,7 @@
           <p:cNvPr id="2056" name="Picture 8" descr="à¸£à¸¹à¸à¸ à¸²à¸à¸à¸µà¹à¹à¸à¸µà¹à¸¢à¸§à¸à¹à¸­à¸">
             <a:extLst>
               <a:ext uri="{FF2B5EF4-FFF2-40B4-BE49-F238E27FC236}">
-                <a16:creationId xmlns:a16="http://schemas.microsoft.com/office/drawing/2014/main" xmlns="" id="{176B4447-7413-4095-B0DB-704624C0C853}"/>
+                <a16:creationId xmlns:a16="http://schemas.microsoft.com/office/drawing/2014/main" id="{176B4447-7413-4095-B0DB-704624C0C853}"/>
               </a:ext>
             </a:extLst>
           </p:cNvPr>
@@ -6037,7 +6073,7 @@
           <p:cNvPr id="2060" name="Picture 12" descr="à¸à¸¥à¸à¸²à¸£à¸à¹à¸à¸«à¸²à¸£à¸¹à¸à¸ à¸²à¸à¸ªà¸³à¸«à¸£à¸±à¸ webpack logo">
             <a:extLst>
               <a:ext uri="{FF2B5EF4-FFF2-40B4-BE49-F238E27FC236}">
-                <a16:creationId xmlns:a16="http://schemas.microsoft.com/office/drawing/2014/main" xmlns="" id="{E72E9812-7760-48C1-A7BB-B580297DBC78}"/>
+                <a16:creationId xmlns:a16="http://schemas.microsoft.com/office/drawing/2014/main" id="{E72E9812-7760-48C1-A7BB-B580297DBC78}"/>
               </a:ext>
             </a:extLst>
           </p:cNvPr>
@@ -6084,7 +6120,7 @@
           <p:cNvPr id="7" name="สี่เหลี่ยมผืนผ้า 6">
             <a:extLst>
               <a:ext uri="{FF2B5EF4-FFF2-40B4-BE49-F238E27FC236}">
-                <a16:creationId xmlns:a16="http://schemas.microsoft.com/office/drawing/2014/main" xmlns="" id="{FC01B4D4-F757-4ADE-8265-D9DE434B461F}"/>
+                <a16:creationId xmlns:a16="http://schemas.microsoft.com/office/drawing/2014/main" id="{FC01B4D4-F757-4ADE-8265-D9DE434B461F}"/>
               </a:ext>
             </a:extLst>
           </p:cNvPr>
@@ -6172,7 +6208,7 @@
           <p:cNvPr id="2" name="สี่เหลี่ยมผืนผ้า 1">
             <a:extLst>
               <a:ext uri="{FF2B5EF4-FFF2-40B4-BE49-F238E27FC236}">
-                <a16:creationId xmlns:a16="http://schemas.microsoft.com/office/drawing/2014/main" xmlns="" id="{16F1C6C9-1995-4CF5-87DC-A94389CA81D4}"/>
+                <a16:creationId xmlns:a16="http://schemas.microsoft.com/office/drawing/2014/main" id="{16F1C6C9-1995-4CF5-87DC-A94389CA81D4}"/>
               </a:ext>
             </a:extLst>
           </p:cNvPr>
@@ -6257,7 +6293,7 @@
           <p:cNvPr id="2" name="ชื่อเรื่อง 1">
             <a:extLst>
               <a:ext uri="{FF2B5EF4-FFF2-40B4-BE49-F238E27FC236}">
-                <a16:creationId xmlns:a16="http://schemas.microsoft.com/office/drawing/2014/main" xmlns="" id="{FA94299B-7220-46C7-A26C-0CDA556C696F}"/>
+                <a16:creationId xmlns:a16="http://schemas.microsoft.com/office/drawing/2014/main" id="{FA94299B-7220-46C7-A26C-0CDA556C696F}"/>
               </a:ext>
             </a:extLst>
           </p:cNvPr>
@@ -6296,7 +6332,7 @@
           <p:cNvPr id="3" name="สี่เหลี่ยมผืนผ้า 2">
             <a:extLst>
               <a:ext uri="{FF2B5EF4-FFF2-40B4-BE49-F238E27FC236}">
-                <a16:creationId xmlns:a16="http://schemas.microsoft.com/office/drawing/2014/main" xmlns="" id="{14BE4913-3402-4AC2-9451-7930D503034E}"/>
+                <a16:creationId xmlns:a16="http://schemas.microsoft.com/office/drawing/2014/main" id="{14BE4913-3402-4AC2-9451-7930D503034E}"/>
               </a:ext>
             </a:extLst>
           </p:cNvPr>
@@ -6409,7 +6445,7 @@
           <p:cNvPr id="2" name="Picture 5" descr="à¸à¸¥à¸à¸²à¸£à¸à¹à¸à¸«à¸²à¸£à¸¹à¸à¸ à¸²à¸à¸ªà¸³à¸«à¸£à¸±à¸ terminal icon">
             <a:extLst>
               <a:ext uri="{FF2B5EF4-FFF2-40B4-BE49-F238E27FC236}">
-                <a16:creationId xmlns:a16="http://schemas.microsoft.com/office/drawing/2014/main" xmlns="" id="{D853DDB3-659B-4A1B-8C52-CEBDEAFE07A1}"/>
+                <a16:creationId xmlns:a16="http://schemas.microsoft.com/office/drawing/2014/main" id="{D853DDB3-659B-4A1B-8C52-CEBDEAFE07A1}"/>
               </a:ext>
             </a:extLst>
           </p:cNvPr>
@@ -6456,7 +6492,7 @@
           <p:cNvPr id="3" name="สี่เหลี่ยมผืนผ้า 2">
             <a:extLst>
               <a:ext uri="{FF2B5EF4-FFF2-40B4-BE49-F238E27FC236}">
-                <a16:creationId xmlns:a16="http://schemas.microsoft.com/office/drawing/2014/main" xmlns="" id="{6E78968F-F046-4B8D-BD90-A00B08B9B1E9}"/>
+                <a16:creationId xmlns:a16="http://schemas.microsoft.com/office/drawing/2014/main" id="{6E78968F-F046-4B8D-BD90-A00B08B9B1E9}"/>
               </a:ext>
             </a:extLst>
           </p:cNvPr>
@@ -6503,7 +6539,7 @@
           <p:cNvPr id="4" name="สี่เหลี่ยมผืนผ้า 3">
             <a:extLst>
               <a:ext uri="{FF2B5EF4-FFF2-40B4-BE49-F238E27FC236}">
-                <a16:creationId xmlns:a16="http://schemas.microsoft.com/office/drawing/2014/main" xmlns="" id="{90063099-E64F-4F82-9097-B405BB8AFEE7}"/>
+                <a16:creationId xmlns:a16="http://schemas.microsoft.com/office/drawing/2014/main" id="{90063099-E64F-4F82-9097-B405BB8AFEE7}"/>
               </a:ext>
             </a:extLst>
           </p:cNvPr>
@@ -6589,7 +6625,7 @@
           <p:cNvPr id="2" name="ชื่อเรื่อง 1">
             <a:extLst>
               <a:ext uri="{FF2B5EF4-FFF2-40B4-BE49-F238E27FC236}">
-                <a16:creationId xmlns:a16="http://schemas.microsoft.com/office/drawing/2014/main" xmlns="" id="{52249569-7659-4EC0-831C-9E61531D77F0}"/>
+                <a16:creationId xmlns:a16="http://schemas.microsoft.com/office/drawing/2014/main" id="{52249569-7659-4EC0-831C-9E61531D77F0}"/>
               </a:ext>
             </a:extLst>
           </p:cNvPr>
@@ -6637,7 +6673,7 @@
           <p:cNvPr id="4" name="รูปภาพ 3">
             <a:extLst>
               <a:ext uri="{FF2B5EF4-FFF2-40B4-BE49-F238E27FC236}">
-                <a16:creationId xmlns:a16="http://schemas.microsoft.com/office/drawing/2014/main" xmlns="" id="{2E59E6B7-7262-44B6-81F8-C4C37E2C5F39}"/>
+                <a16:creationId xmlns:a16="http://schemas.microsoft.com/office/drawing/2014/main" id="{2E59E6B7-7262-44B6-81F8-C4C37E2C5F39}"/>
               </a:ext>
             </a:extLst>
           </p:cNvPr>
@@ -6667,7 +6703,7 @@
           <p:cNvPr id="5" name="กล่องข้อความ 4">
             <a:extLst>
               <a:ext uri="{FF2B5EF4-FFF2-40B4-BE49-F238E27FC236}">
-                <a16:creationId xmlns:a16="http://schemas.microsoft.com/office/drawing/2014/main" xmlns="" id="{7FAE22C3-F394-4043-BF52-23ECC0A95AC1}"/>
+                <a16:creationId xmlns:a16="http://schemas.microsoft.com/office/drawing/2014/main" id="{7FAE22C3-F394-4043-BF52-23ECC0A95AC1}"/>
               </a:ext>
             </a:extLst>
           </p:cNvPr>
@@ -6726,7 +6762,7 @@
           <p:cNvPr id="6" name="สี่เหลี่ยมผืนผ้า 5">
             <a:extLst>
               <a:ext uri="{FF2B5EF4-FFF2-40B4-BE49-F238E27FC236}">
-                <a16:creationId xmlns:a16="http://schemas.microsoft.com/office/drawing/2014/main" xmlns="" id="{D7E2646D-C2F0-42EE-8E9F-9D0866F97149}"/>
+                <a16:creationId xmlns:a16="http://schemas.microsoft.com/office/drawing/2014/main" id="{D7E2646D-C2F0-42EE-8E9F-9D0866F97149}"/>
               </a:ext>
             </a:extLst>
           </p:cNvPr>
@@ -6831,7 +6867,7 @@
           <p:cNvPr id="2" name="ชื่อเรื่อง 1">
             <a:extLst>
               <a:ext uri="{FF2B5EF4-FFF2-40B4-BE49-F238E27FC236}">
-                <a16:creationId xmlns:a16="http://schemas.microsoft.com/office/drawing/2014/main" xmlns="" id="{467002DC-AEF7-46F5-B6C6-3D5F877DF5DA}"/>
+                <a16:creationId xmlns:a16="http://schemas.microsoft.com/office/drawing/2014/main" id="{467002DC-AEF7-46F5-B6C6-3D5F877DF5DA}"/>
               </a:ext>
             </a:extLst>
           </p:cNvPr>
@@ -7190,15 +7226,6 @@
               </a:rPr>
               <a:t> &amp;&amp; exit 1"</a:t>
             </a:r>
-            <a:r>
-              <a:rPr lang="en-US" sz="2000" dirty="0">
-                <a:solidFill>
-                  <a:srgbClr val="B2CACD"/>
-                </a:solidFill>
-                <a:latin typeface="Fira Code" panose="020B0509050000020004" pitchFamily="49" charset="0"/>
-              </a:rPr>
-              <a:t/>
-            </a:r>
             <a:br>
               <a:rPr lang="en-US" sz="2000" dirty="0">
                 <a:solidFill>
@@ -7312,15 +7339,6 @@
                 <a:latin typeface="Fira Code" panose="020B0509050000020004" pitchFamily="49" charset="0"/>
               </a:rPr>
               <a:t>"MIT"</a:t>
-            </a:r>
-            <a:r>
-              <a:rPr lang="en-US" sz="2000" dirty="0">
-                <a:solidFill>
-                  <a:srgbClr val="B2CACD"/>
-                </a:solidFill>
-                <a:latin typeface="Fira Code" panose="020B0509050000020004" pitchFamily="49" charset="0"/>
-              </a:rPr>
-              <a:t/>
             </a:r>
             <a:br>
               <a:rPr lang="en-US" sz="2000" dirty="0">
@@ -7356,7 +7374,7 @@
           <p:cNvPr id="4" name="สี่เหลี่ยมผืนผ้า 3">
             <a:extLst>
               <a:ext uri="{FF2B5EF4-FFF2-40B4-BE49-F238E27FC236}">
-                <a16:creationId xmlns:a16="http://schemas.microsoft.com/office/drawing/2014/main" xmlns="" id="{CB70DCC8-FBF6-491D-BE10-4F99691438ED}"/>
+                <a16:creationId xmlns:a16="http://schemas.microsoft.com/office/drawing/2014/main" id="{CB70DCC8-FBF6-491D-BE10-4F99691438ED}"/>
               </a:ext>
             </a:extLst>
           </p:cNvPr>
@@ -7393,7 +7411,7 @@
           <p:cNvPr id="6" name="สี่เหลี่ยมผืนผ้า 5">
             <a:extLst>
               <a:ext uri="{FF2B5EF4-FFF2-40B4-BE49-F238E27FC236}">
-                <a16:creationId xmlns:a16="http://schemas.microsoft.com/office/drawing/2014/main" xmlns="" id="{4571470B-C6A2-48DC-A4D6-1476A77C0D6C}"/>
+                <a16:creationId xmlns:a16="http://schemas.microsoft.com/office/drawing/2014/main" id="{4571470B-C6A2-48DC-A4D6-1476A77C0D6C}"/>
               </a:ext>
             </a:extLst>
           </p:cNvPr>
@@ -7468,13 +7486,6 @@
       </p:transition>
     </mc:Fallback>
   </mc:AlternateContent>
-  <p:timing>
-    <p:tnLst>
-      <p:par>
-        <p:cTn id="1" dur="indefinite" restart="never" nodeType="tmRoot"/>
-      </p:par>
-    </p:tnLst>
-  </p:timing>
 </p:sld>
 </file>
 
@@ -7500,7 +7511,7 @@
           <p:cNvPr id="2" name="ชื่อเรื่อง 1">
             <a:extLst>
               <a:ext uri="{FF2B5EF4-FFF2-40B4-BE49-F238E27FC236}">
-                <a16:creationId xmlns:a16="http://schemas.microsoft.com/office/drawing/2014/main" xmlns="" id="{E6DA623B-F359-4981-B34B-7998B19781A1}"/>
+                <a16:creationId xmlns:a16="http://schemas.microsoft.com/office/drawing/2014/main" id="{E6DA623B-F359-4981-B34B-7998B19781A1}"/>
               </a:ext>
             </a:extLst>
           </p:cNvPr>
@@ -7533,7 +7544,7 @@
           <p:cNvPr id="4" name="Picture 5" descr="à¸à¸¥à¸à¸²à¸£à¸à¹à¸à¸«à¸²à¸£à¸¹à¸à¸ à¸²à¸à¸ªà¸³à¸«à¸£à¸±à¸ terminal icon">
             <a:extLst>
               <a:ext uri="{FF2B5EF4-FFF2-40B4-BE49-F238E27FC236}">
-                <a16:creationId xmlns:a16="http://schemas.microsoft.com/office/drawing/2014/main" xmlns="" id="{78FA7865-DB4F-47AE-93E4-EEC0CC12C025}"/>
+                <a16:creationId xmlns:a16="http://schemas.microsoft.com/office/drawing/2014/main" id="{78FA7865-DB4F-47AE-93E4-EEC0CC12C025}"/>
               </a:ext>
             </a:extLst>
           </p:cNvPr>
@@ -7580,7 +7591,7 @@
           <p:cNvPr id="5" name="สี่เหลี่ยมผืนผ้า 4">
             <a:extLst>
               <a:ext uri="{FF2B5EF4-FFF2-40B4-BE49-F238E27FC236}">
-                <a16:creationId xmlns:a16="http://schemas.microsoft.com/office/drawing/2014/main" xmlns="" id="{63A61EDA-5D2F-48D5-B269-8A7902C24D32}"/>
+                <a16:creationId xmlns:a16="http://schemas.microsoft.com/office/drawing/2014/main" id="{63A61EDA-5D2F-48D5-B269-8A7902C24D32}"/>
               </a:ext>
             </a:extLst>
           </p:cNvPr>
@@ -7706,7 +7717,7 @@
             <a:hlinkClick r:id="rId3"/>
             <a:extLst>
               <a:ext uri="{FF2B5EF4-FFF2-40B4-BE49-F238E27FC236}">
-                <a16:creationId xmlns:a16="http://schemas.microsoft.com/office/drawing/2014/main" xmlns="" id="{A213CAEC-C7B7-41C0-A3F9-A60489520123}"/>
+                <a16:creationId xmlns:a16="http://schemas.microsoft.com/office/drawing/2014/main" id="{A213CAEC-C7B7-41C0-A3F9-A60489520123}"/>
               </a:ext>
             </a:extLst>
           </p:cNvPr>
@@ -7761,13 +7772,6 @@
       </p:transition>
     </mc:Fallback>
   </mc:AlternateContent>
-  <p:timing>
-    <p:tnLst>
-      <p:par>
-        <p:cTn id="1" dur="indefinite" restart="never" nodeType="tmRoot"/>
-      </p:par>
-    </p:tnLst>
-  </p:timing>
 </p:sld>
 </file>
 
@@ -7793,7 +7797,7 @@
           <p:cNvPr id="4" name="กราฟิก 3" descr="หนังสือที่เปิดอยู่">
             <a:extLst>
               <a:ext uri="{FF2B5EF4-FFF2-40B4-BE49-F238E27FC236}">
-                <a16:creationId xmlns:a16="http://schemas.microsoft.com/office/drawing/2014/main" xmlns="" id="{4BB3C191-56F3-4733-94BB-72EB31650E38}"/>
+                <a16:creationId xmlns:a16="http://schemas.microsoft.com/office/drawing/2014/main" id="{4BB3C191-56F3-4733-94BB-72EB31650E38}"/>
               </a:ext>
             </a:extLst>
           </p:cNvPr>
@@ -7809,7 +7813,7 @@
                 <a14:useLocalDpi xmlns:a14="http://schemas.microsoft.com/office/drawing/2010/main" val="0"/>
               </a:ext>
               <a:ext uri="{96DAC541-7B7A-43D3-8B79-37D633B846F1}">
-                <asvg:svgBlip xmlns:asvg="http://schemas.microsoft.com/office/drawing/2016/SVG/main" xmlns="" r:embed="rId3"/>
+                <asvg:svgBlip xmlns:asvg="http://schemas.microsoft.com/office/drawing/2016/SVG/main" r:embed="rId3"/>
               </a:ext>
             </a:extLst>
           </a:blip>
@@ -7832,7 +7836,7 @@
           <p:cNvPr id="5" name="กล่องข้อความ 4">
             <a:extLst>
               <a:ext uri="{FF2B5EF4-FFF2-40B4-BE49-F238E27FC236}">
-                <a16:creationId xmlns:a16="http://schemas.microsoft.com/office/drawing/2014/main" xmlns="" id="{2285EDBA-79D7-41C4-972C-261406B0AF7A}"/>
+                <a16:creationId xmlns:a16="http://schemas.microsoft.com/office/drawing/2014/main" id="{2285EDBA-79D7-41C4-972C-261406B0AF7A}"/>
               </a:ext>
             </a:extLst>
           </p:cNvPr>
@@ -7858,13 +7862,8 @@
             <a:pPr algn="ctr"/>
             <a:r>
               <a:rPr lang="en-US" sz="7200" spc="600" dirty="0"/>
-              <a:t>Lab://</a:t>
-            </a:r>
-            <a:r>
-              <a:rPr lang="en-US" sz="7200" spc="600" dirty="0" smtClean="0"/>
-              <a:t>002</a:t>
-            </a:r>
-            <a:endParaRPr lang="en-US" sz="7200" spc="600" dirty="0"/>
+              <a:t>Lab://002</a:t>
+            </a:r>
           </a:p>
         </p:txBody>
       </p:sp>
@@ -7872,6 +7871,432 @@
     <p:extLst>
       <p:ext uri="{BB962C8B-B14F-4D97-AF65-F5344CB8AC3E}">
         <p14:creationId xmlns:p14="http://schemas.microsoft.com/office/powerpoint/2010/main" val="2594221774"/>
+      </p:ext>
+    </p:extLst>
+  </p:cSld>
+  <p:clrMapOvr>
+    <a:masterClrMapping/>
+  </p:clrMapOvr>
+  <mc:AlternateContent xmlns:mc="http://schemas.openxmlformats.org/markup-compatibility/2006" xmlns:p14="http://schemas.microsoft.com/office/powerpoint/2010/main">
+    <mc:Choice Requires="p14">
+      <p:transition spd="med" p14:dur="700">
+        <p:fade/>
+      </p:transition>
+    </mc:Choice>
+    <mc:Fallback xmlns="">
+      <p:transition spd="med">
+        <p:fade/>
+      </p:transition>
+    </mc:Fallback>
+  </mc:AlternateContent>
+</p:sld>
+</file>
+
+<file path=ppt/slides/slide17.xml><?xml version="1.0" encoding="utf-8"?>
+<p:sld xmlns:a="http://schemas.openxmlformats.org/drawingml/2006/main" xmlns:r="http://schemas.openxmlformats.org/officeDocument/2006/relationships" xmlns:p="http://schemas.openxmlformats.org/presentationml/2006/main">
+  <p:cSld>
+    <p:spTree>
+      <p:nvGrpSpPr>
+        <p:cNvPr id="1" name=""/>
+        <p:cNvGrpSpPr/>
+        <p:nvPr/>
+      </p:nvGrpSpPr>
+      <p:grpSpPr>
+        <a:xfrm>
+          <a:off x="0" y="0"/>
+          <a:ext cx="0" cy="0"/>
+          <a:chOff x="0" y="0"/>
+          <a:chExt cx="0" cy="0"/>
+        </a:xfrm>
+      </p:grpSpPr>
+      <p:pic>
+        <p:nvPicPr>
+          <p:cNvPr id="2" name="รูปภาพ 1">
+            <a:extLst>
+              <a:ext uri="{FF2B5EF4-FFF2-40B4-BE49-F238E27FC236}">
+                <a16:creationId xmlns:a16="http://schemas.microsoft.com/office/drawing/2014/main" id="{4CE16AB9-D80A-4819-87B4-8FFF6AFA6DED}"/>
+              </a:ext>
+            </a:extLst>
+          </p:cNvPr>
+          <p:cNvPicPr>
+            <a:picLocks noChangeAspect="1"/>
+          </p:cNvPicPr>
+          <p:nvPr/>
+        </p:nvPicPr>
+        <p:blipFill rotWithShape="1">
+          <a:blip r:embed="rId2"/>
+          <a:srcRect l="36652" t="56098" b="2439"/>
+          <a:stretch/>
+        </p:blipFill>
+        <p:spPr>
+          <a:xfrm>
+            <a:off x="1125860" y="332656"/>
+            <a:ext cx="2880320" cy="1491072"/>
+          </a:xfrm>
+          <a:prstGeom prst="rect">
+            <a:avLst/>
+          </a:prstGeom>
+        </p:spPr>
+      </p:pic>
+      <p:sp>
+        <p:nvSpPr>
+          <p:cNvPr id="3" name="กล่องข้อความ 2">
+            <a:extLst>
+              <a:ext uri="{FF2B5EF4-FFF2-40B4-BE49-F238E27FC236}">
+                <a16:creationId xmlns:a16="http://schemas.microsoft.com/office/drawing/2014/main" id="{AF856D22-D80C-4E52-B336-3FBD745070BC}"/>
+              </a:ext>
+            </a:extLst>
+          </p:cNvPr>
+          <p:cNvSpPr txBox="1"/>
+          <p:nvPr/>
+        </p:nvSpPr>
+        <p:spPr>
+          <a:xfrm>
+            <a:off x="693812" y="5034271"/>
+            <a:ext cx="7488832" cy="1323439"/>
+          </a:xfrm>
+          <a:prstGeom prst="rect">
+            <a:avLst/>
+          </a:prstGeom>
+          <a:noFill/>
+        </p:spPr>
+        <p:txBody>
+          <a:bodyPr wrap="square" rtlCol="0">
+            <a:spAutoFit/>
+          </a:bodyPr>
+          <a:lstStyle/>
+          <a:p>
+            <a:r>
+              <a:rPr lang="en-US" sz="8000" b="1" dirty="0">
+                <a:solidFill>
+                  <a:srgbClr val="F6E21E"/>
+                </a:solidFill>
+              </a:rPr>
+              <a:t>ECMAScript 2015</a:t>
+            </a:r>
+          </a:p>
+        </p:txBody>
+      </p:sp>
+      <p:sp>
+        <p:nvSpPr>
+          <p:cNvPr id="7" name="สี่เหลี่ยมผืนผ้า 6">
+            <a:extLst>
+              <a:ext uri="{FF2B5EF4-FFF2-40B4-BE49-F238E27FC236}">
+                <a16:creationId xmlns:a16="http://schemas.microsoft.com/office/drawing/2014/main" id="{AA4BC51E-553C-401D-8F9E-16E246DC94AA}"/>
+              </a:ext>
+            </a:extLst>
+          </p:cNvPr>
+          <p:cNvSpPr/>
+          <p:nvPr/>
+        </p:nvSpPr>
+        <p:spPr>
+          <a:xfrm>
+            <a:off x="3214092" y="2767280"/>
+            <a:ext cx="3286391" cy="1323439"/>
+          </a:xfrm>
+          <a:prstGeom prst="rect">
+            <a:avLst/>
+          </a:prstGeom>
+        </p:spPr>
+        <p:txBody>
+          <a:bodyPr wrap="square">
+            <a:spAutoFit/>
+          </a:bodyPr>
+          <a:lstStyle/>
+          <a:p>
+            <a:r>
+              <a:rPr lang="en-US" sz="8000" b="1" dirty="0">
+                <a:solidFill>
+                  <a:srgbClr val="F6E21E"/>
+                </a:solidFill>
+              </a:rPr>
+              <a:t>ES2015</a:t>
+            </a:r>
+          </a:p>
+        </p:txBody>
+      </p:sp>
+      <p:pic>
+        <p:nvPicPr>
+          <p:cNvPr id="9" name="รูปภาพ 8">
+            <a:extLst>
+              <a:ext uri="{FF2B5EF4-FFF2-40B4-BE49-F238E27FC236}">
+                <a16:creationId xmlns:a16="http://schemas.microsoft.com/office/drawing/2014/main" id="{142A4EEA-04D3-4FF5-A660-AB0E83220354}"/>
+              </a:ext>
+            </a:extLst>
+          </p:cNvPr>
+          <p:cNvPicPr>
+            <a:picLocks noChangeAspect="1"/>
+          </p:cNvPicPr>
+          <p:nvPr/>
+        </p:nvPicPr>
+        <p:blipFill>
+          <a:blip r:embed="rId3"/>
+          <a:stretch>
+            <a:fillRect/>
+          </a:stretch>
+        </p:blipFill>
+        <p:spPr>
+          <a:xfrm>
+            <a:off x="6958508" y="330986"/>
+            <a:ext cx="4705350" cy="2838450"/>
+          </a:xfrm>
+          <a:prstGeom prst="rect">
+            <a:avLst/>
+          </a:prstGeom>
+        </p:spPr>
+      </p:pic>
+    </p:spTree>
+    <p:extLst>
+      <p:ext uri="{BB962C8B-B14F-4D97-AF65-F5344CB8AC3E}">
+        <p14:creationId xmlns:p14="http://schemas.microsoft.com/office/powerpoint/2010/main" val="200745691"/>
+      </p:ext>
+    </p:extLst>
+  </p:cSld>
+  <p:clrMapOvr>
+    <a:masterClrMapping/>
+  </p:clrMapOvr>
+  <mc:AlternateContent xmlns:mc="http://schemas.openxmlformats.org/markup-compatibility/2006" xmlns:p14="http://schemas.microsoft.com/office/powerpoint/2010/main">
+    <mc:Choice Requires="p14">
+      <p:transition spd="med" p14:dur="700">
+        <p:fade/>
+      </p:transition>
+    </mc:Choice>
+    <mc:Fallback xmlns="">
+      <p:transition spd="med">
+        <p:fade/>
+      </p:transition>
+    </mc:Fallback>
+  </mc:AlternateContent>
+</p:sld>
+</file>
+
+<file path=ppt/slides/slide18.xml><?xml version="1.0" encoding="utf-8"?>
+<p:sld xmlns:a="http://schemas.openxmlformats.org/drawingml/2006/main" xmlns:r="http://schemas.openxmlformats.org/officeDocument/2006/relationships" xmlns:p="http://schemas.openxmlformats.org/presentationml/2006/main">
+  <p:cSld>
+    <p:spTree>
+      <p:nvGrpSpPr>
+        <p:cNvPr id="1" name=""/>
+        <p:cNvGrpSpPr/>
+        <p:nvPr/>
+      </p:nvGrpSpPr>
+      <p:grpSpPr>
+        <a:xfrm>
+          <a:off x="0" y="0"/>
+          <a:ext cx="0" cy="0"/>
+          <a:chOff x="0" y="0"/>
+          <a:chExt cx="0" cy="0"/>
+        </a:xfrm>
+      </p:grpSpPr>
+      <p:sp>
+        <p:nvSpPr>
+          <p:cNvPr id="2" name="ชื่อเรื่อง 1">
+            <a:extLst>
+              <a:ext uri="{FF2B5EF4-FFF2-40B4-BE49-F238E27FC236}">
+                <a16:creationId xmlns:a16="http://schemas.microsoft.com/office/drawing/2014/main" id="{508DD8D4-DBE1-46A9-B2D3-F488C2389F43}"/>
+              </a:ext>
+            </a:extLst>
+          </p:cNvPr>
+          <p:cNvSpPr>
+            <a:spLocks noGrp="1"/>
+          </p:cNvSpPr>
+          <p:nvPr>
+            <p:ph type="title"/>
+          </p:nvPr>
+        </p:nvSpPr>
+        <p:spPr/>
+        <p:txBody>
+          <a:bodyPr>
+            <a:normAutofit/>
+          </a:bodyPr>
+          <a:lstStyle/>
+          <a:p>
+            <a:pPr algn="ctr"/>
+            <a:r>
+              <a:rPr lang="en-US" sz="7200" b="1" dirty="0">
+                <a:solidFill>
+                  <a:schemeClr val="bg1"/>
+                </a:solidFill>
+                <a:highlight>
+                  <a:srgbClr val="F5DA55"/>
+                </a:highlight>
+              </a:rPr>
+              <a:t>Intro to ES6</a:t>
+            </a:r>
+          </a:p>
+        </p:txBody>
+      </p:sp>
+      <p:pic>
+        <p:nvPicPr>
+          <p:cNvPr id="3" name="รูปภาพ 2">
+            <a:extLst>
+              <a:ext uri="{FF2B5EF4-FFF2-40B4-BE49-F238E27FC236}">
+                <a16:creationId xmlns:a16="http://schemas.microsoft.com/office/drawing/2014/main" id="{6E5EEB47-B725-42D9-B7DB-9D2EFAEB0836}"/>
+              </a:ext>
+            </a:extLst>
+          </p:cNvPr>
+          <p:cNvPicPr>
+            <a:picLocks noChangeAspect="1"/>
+          </p:cNvPicPr>
+          <p:nvPr/>
+        </p:nvPicPr>
+        <p:blipFill>
+          <a:blip r:embed="rId2"/>
+          <a:stretch>
+            <a:fillRect/>
+          </a:stretch>
+        </p:blipFill>
+        <p:spPr>
+          <a:xfrm>
+            <a:off x="2627312" y="1988840"/>
+            <a:ext cx="6934200" cy="3429000"/>
+          </a:xfrm>
+          <a:prstGeom prst="rect">
+            <a:avLst/>
+          </a:prstGeom>
+        </p:spPr>
+      </p:pic>
+    </p:spTree>
+    <p:extLst>
+      <p:ext uri="{BB962C8B-B14F-4D97-AF65-F5344CB8AC3E}">
+        <p14:creationId xmlns:p14="http://schemas.microsoft.com/office/powerpoint/2010/main" val="3676423344"/>
+      </p:ext>
+    </p:extLst>
+  </p:cSld>
+  <p:clrMapOvr>
+    <a:masterClrMapping/>
+  </p:clrMapOvr>
+  <mc:AlternateContent xmlns:mc="http://schemas.openxmlformats.org/markup-compatibility/2006" xmlns:p14="http://schemas.microsoft.com/office/powerpoint/2010/main">
+    <mc:Choice Requires="p14">
+      <p:transition spd="med" p14:dur="700">
+        <p:fade/>
+      </p:transition>
+    </mc:Choice>
+    <mc:Fallback xmlns="">
+      <p:transition spd="med">
+        <p:fade/>
+      </p:transition>
+    </mc:Fallback>
+  </mc:AlternateContent>
+</p:sld>
+</file>
+
+<file path=ppt/slides/slide19.xml><?xml version="1.0" encoding="utf-8"?>
+<p:sld xmlns:a="http://schemas.openxmlformats.org/drawingml/2006/main" xmlns:r="http://schemas.openxmlformats.org/officeDocument/2006/relationships" xmlns:p="http://schemas.openxmlformats.org/presentationml/2006/main">
+  <p:cSld>
+    <p:spTree>
+      <p:nvGrpSpPr>
+        <p:cNvPr id="1" name=""/>
+        <p:cNvGrpSpPr/>
+        <p:nvPr/>
+      </p:nvGrpSpPr>
+      <p:grpSpPr>
+        <a:xfrm>
+          <a:off x="0" y="0"/>
+          <a:ext cx="0" cy="0"/>
+          <a:chOff x="0" y="0"/>
+          <a:chExt cx="0" cy="0"/>
+        </a:xfrm>
+      </p:grpSpPr>
+      <p:sp>
+        <p:nvSpPr>
+          <p:cNvPr id="2" name="ชื่อเรื่อง 1">
+            <a:extLst>
+              <a:ext uri="{FF2B5EF4-FFF2-40B4-BE49-F238E27FC236}">
+                <a16:creationId xmlns:a16="http://schemas.microsoft.com/office/drawing/2014/main" id="{949EFA09-0431-44BC-B860-0BD54B3E80AF}"/>
+              </a:ext>
+            </a:extLst>
+          </p:cNvPr>
+          <p:cNvSpPr>
+            <a:spLocks noGrp="1"/>
+          </p:cNvSpPr>
+          <p:nvPr>
+            <p:ph type="title"/>
+          </p:nvPr>
+        </p:nvSpPr>
+        <p:spPr/>
+        <p:txBody>
+          <a:bodyPr/>
+          <a:lstStyle/>
+          <a:p>
+            <a:r>
+              <a:rPr lang="en-US" dirty="0"/>
+              <a:t>1.  let var const</a:t>
+            </a:r>
+          </a:p>
+        </p:txBody>
+      </p:sp>
+      <p:sp>
+        <p:nvSpPr>
+          <p:cNvPr id="3" name="สี่เหลี่ยมผืนผ้า 2">
+            <a:extLst>
+              <a:ext uri="{FF2B5EF4-FFF2-40B4-BE49-F238E27FC236}">
+                <a16:creationId xmlns:a16="http://schemas.microsoft.com/office/drawing/2014/main" id="{E718D9C0-3CA2-41B0-8CE8-B0E9A076DEA4}"/>
+              </a:ext>
+            </a:extLst>
+          </p:cNvPr>
+          <p:cNvSpPr/>
+          <p:nvPr/>
+        </p:nvSpPr>
+        <p:spPr>
+          <a:xfrm>
+            <a:off x="1917948" y="2433661"/>
+            <a:ext cx="3456384" cy="461665"/>
+          </a:xfrm>
+          <a:prstGeom prst="rect">
+            <a:avLst/>
+          </a:prstGeom>
+        </p:spPr>
+        <p:txBody>
+          <a:bodyPr wrap="square">
+            <a:spAutoFit/>
+          </a:bodyPr>
+          <a:lstStyle/>
+          <a:p>
+            <a:r>
+              <a:rPr lang="en-US" dirty="0"/>
+              <a:t>let, const -&gt; block scope</a:t>
+            </a:r>
+          </a:p>
+        </p:txBody>
+      </p:sp>
+      <p:sp>
+        <p:nvSpPr>
+          <p:cNvPr id="4" name="สี่เหลี่ยมผืนผ้า 3">
+            <a:extLst>
+              <a:ext uri="{FF2B5EF4-FFF2-40B4-BE49-F238E27FC236}">
+                <a16:creationId xmlns:a16="http://schemas.microsoft.com/office/drawing/2014/main" id="{A727BD8F-EA76-4005-8F43-5EC60044ABB1}"/>
+              </a:ext>
+            </a:extLst>
+          </p:cNvPr>
+          <p:cNvSpPr/>
+          <p:nvPr/>
+        </p:nvSpPr>
+        <p:spPr>
+          <a:xfrm>
+            <a:off x="1845940" y="1735298"/>
+            <a:ext cx="2800126" cy="461665"/>
+          </a:xfrm>
+          <a:prstGeom prst="rect">
+            <a:avLst/>
+          </a:prstGeom>
+        </p:spPr>
+        <p:txBody>
+          <a:bodyPr wrap="none">
+            <a:spAutoFit/>
+          </a:bodyPr>
+          <a:lstStyle/>
+          <a:p>
+            <a:r>
+              <a:rPr lang="en-US" dirty="0"/>
+              <a:t>var -&gt; function scope</a:t>
+            </a:r>
+          </a:p>
+        </p:txBody>
+      </p:sp>
+    </p:spTree>
+    <p:extLst>
+      <p:ext uri="{BB962C8B-B14F-4D97-AF65-F5344CB8AC3E}">
+        <p14:creationId xmlns:p14="http://schemas.microsoft.com/office/powerpoint/2010/main" val="4100243005"/>
       </p:ext>
     </p:extLst>
   </p:cSld>
@@ -8013,6 +8438,1315 @@
     <p:extLst>
       <p:ext uri="{BB962C8B-B14F-4D97-AF65-F5344CB8AC3E}">
         <p14:creationId xmlns:p14="http://schemas.microsoft.com/office/powerpoint/2010/main" val="3529114326"/>
+      </p:ext>
+    </p:extLst>
+  </p:cSld>
+  <p:clrMapOvr>
+    <a:masterClrMapping/>
+  </p:clrMapOvr>
+  <mc:AlternateContent xmlns:mc="http://schemas.openxmlformats.org/markup-compatibility/2006" xmlns:p14="http://schemas.microsoft.com/office/powerpoint/2010/main">
+    <mc:Choice Requires="p14">
+      <p:transition spd="med" p14:dur="700">
+        <p:fade/>
+      </p:transition>
+    </mc:Choice>
+    <mc:Fallback xmlns="">
+      <p:transition spd="med">
+        <p:fade/>
+      </p:transition>
+    </mc:Fallback>
+  </mc:AlternateContent>
+</p:sld>
+</file>
+
+<file path=ppt/slides/slide20.xml><?xml version="1.0" encoding="utf-8"?>
+<p:sld xmlns:a="http://schemas.openxmlformats.org/drawingml/2006/main" xmlns:r="http://schemas.openxmlformats.org/officeDocument/2006/relationships" xmlns:p="http://schemas.openxmlformats.org/presentationml/2006/main">
+  <p:cSld>
+    <p:spTree>
+      <p:nvGrpSpPr>
+        <p:cNvPr id="1" name=""/>
+        <p:cNvGrpSpPr/>
+        <p:nvPr/>
+      </p:nvGrpSpPr>
+      <p:grpSpPr>
+        <a:xfrm>
+          <a:off x="0" y="0"/>
+          <a:ext cx="0" cy="0"/>
+          <a:chOff x="0" y="0"/>
+          <a:chExt cx="0" cy="0"/>
+        </a:xfrm>
+      </p:grpSpPr>
+      <p:sp>
+        <p:nvSpPr>
+          <p:cNvPr id="2" name="ชื่อเรื่อง 1">
+            <a:extLst>
+              <a:ext uri="{FF2B5EF4-FFF2-40B4-BE49-F238E27FC236}">
+                <a16:creationId xmlns:a16="http://schemas.microsoft.com/office/drawing/2014/main" id="{E212E76A-34D2-42F2-8AEF-A6C027753F47}"/>
+              </a:ext>
+            </a:extLst>
+          </p:cNvPr>
+          <p:cNvSpPr>
+            <a:spLocks noGrp="1"/>
+          </p:cNvSpPr>
+          <p:nvPr>
+            <p:ph type="title"/>
+          </p:nvPr>
+        </p:nvSpPr>
+        <p:spPr/>
+        <p:txBody>
+          <a:bodyPr/>
+          <a:lstStyle/>
+          <a:p>
+            <a:r>
+              <a:rPr lang="en-US" dirty="0"/>
+              <a:t>2. Template String</a:t>
+            </a:r>
+          </a:p>
+        </p:txBody>
+      </p:sp>
+      <p:sp>
+        <p:nvSpPr>
+          <p:cNvPr id="3" name="กล่องข้อความ 2">
+            <a:extLst>
+              <a:ext uri="{FF2B5EF4-FFF2-40B4-BE49-F238E27FC236}">
+                <a16:creationId xmlns:a16="http://schemas.microsoft.com/office/drawing/2014/main" id="{93F7500E-9D33-428C-975C-CB95BFB228CA}"/>
+              </a:ext>
+            </a:extLst>
+          </p:cNvPr>
+          <p:cNvSpPr txBox="1"/>
+          <p:nvPr/>
+        </p:nvSpPr>
+        <p:spPr>
+          <a:xfrm>
+            <a:off x="1701924" y="1772816"/>
+            <a:ext cx="3456384" cy="523220"/>
+          </a:xfrm>
+          <a:prstGeom prst="rect">
+            <a:avLst/>
+          </a:prstGeom>
+          <a:noFill/>
+        </p:spPr>
+        <p:txBody>
+          <a:bodyPr wrap="square" rtlCol="0">
+            <a:spAutoFit/>
+          </a:bodyPr>
+          <a:lstStyle/>
+          <a:p>
+            <a:r>
+              <a:rPr lang="en-US" sz="2800" dirty="0"/>
+              <a:t>normal string “ ” or ‘ ’</a:t>
+            </a:r>
+          </a:p>
+        </p:txBody>
+      </p:sp>
+      <p:sp>
+        <p:nvSpPr>
+          <p:cNvPr id="4" name="สี่เหลี่ยมผืนผ้า 3">
+            <a:extLst>
+              <a:ext uri="{FF2B5EF4-FFF2-40B4-BE49-F238E27FC236}">
+                <a16:creationId xmlns:a16="http://schemas.microsoft.com/office/drawing/2014/main" id="{6C9F2AD0-1DD2-4DA8-BCC5-75B28A207E79}"/>
+              </a:ext>
+            </a:extLst>
+          </p:cNvPr>
+          <p:cNvSpPr/>
+          <p:nvPr/>
+        </p:nvSpPr>
+        <p:spPr>
+          <a:xfrm>
+            <a:off x="1701924" y="2420888"/>
+            <a:ext cx="7191841" cy="461665"/>
+          </a:xfrm>
+          <a:prstGeom prst="rect">
+            <a:avLst/>
+          </a:prstGeom>
+        </p:spPr>
+        <p:txBody>
+          <a:bodyPr wrap="none">
+            <a:spAutoFit/>
+          </a:bodyPr>
+          <a:lstStyle/>
+          <a:p>
+            <a:r>
+              <a:rPr lang="en-US" dirty="0"/>
+              <a:t>Template String -&gt; ` I’m template string ${JS expression} `</a:t>
+            </a:r>
+          </a:p>
+        </p:txBody>
+      </p:sp>
+      <p:sp>
+        <p:nvSpPr>
+          <p:cNvPr id="5" name="สี่เหลี่ยมผืนผ้า 4">
+            <a:extLst>
+              <a:ext uri="{FF2B5EF4-FFF2-40B4-BE49-F238E27FC236}">
+                <a16:creationId xmlns:a16="http://schemas.microsoft.com/office/drawing/2014/main" id="{0CB8A18A-39F4-4A36-A6C8-4B3DEC785413}"/>
+              </a:ext>
+            </a:extLst>
+          </p:cNvPr>
+          <p:cNvSpPr/>
+          <p:nvPr/>
+        </p:nvSpPr>
+        <p:spPr>
+          <a:xfrm>
+            <a:off x="1701924" y="3313728"/>
+            <a:ext cx="7992888" cy="1323439"/>
+          </a:xfrm>
+          <a:prstGeom prst="rect">
+            <a:avLst/>
+          </a:prstGeom>
+        </p:spPr>
+        <p:txBody>
+          <a:bodyPr wrap="square">
+            <a:spAutoFit/>
+          </a:bodyPr>
+          <a:lstStyle/>
+          <a:p>
+            <a:r>
+              <a:rPr lang="en-US" sz="8000" dirty="0"/>
+              <a:t>` -&gt; Grave Accent </a:t>
+            </a:r>
+          </a:p>
+        </p:txBody>
+      </p:sp>
+    </p:spTree>
+    <p:extLst>
+      <p:ext uri="{BB962C8B-B14F-4D97-AF65-F5344CB8AC3E}">
+        <p14:creationId xmlns:p14="http://schemas.microsoft.com/office/powerpoint/2010/main" val="3906445698"/>
+      </p:ext>
+    </p:extLst>
+  </p:cSld>
+  <p:clrMapOvr>
+    <a:masterClrMapping/>
+  </p:clrMapOvr>
+  <mc:AlternateContent xmlns:mc="http://schemas.openxmlformats.org/markup-compatibility/2006" xmlns:p14="http://schemas.microsoft.com/office/powerpoint/2010/main">
+    <mc:Choice Requires="p14">
+      <p:transition spd="med" p14:dur="700">
+        <p:fade/>
+      </p:transition>
+    </mc:Choice>
+    <mc:Fallback xmlns="">
+      <p:transition spd="med">
+        <p:fade/>
+      </p:transition>
+    </mc:Fallback>
+  </mc:AlternateContent>
+</p:sld>
+</file>
+
+<file path=ppt/slides/slide21.xml><?xml version="1.0" encoding="utf-8"?>
+<p:sld xmlns:a="http://schemas.openxmlformats.org/drawingml/2006/main" xmlns:r="http://schemas.openxmlformats.org/officeDocument/2006/relationships" xmlns:p="http://schemas.openxmlformats.org/presentationml/2006/main">
+  <p:cSld>
+    <p:spTree>
+      <p:nvGrpSpPr>
+        <p:cNvPr id="1" name=""/>
+        <p:cNvGrpSpPr/>
+        <p:nvPr/>
+      </p:nvGrpSpPr>
+      <p:grpSpPr>
+        <a:xfrm>
+          <a:off x="0" y="0"/>
+          <a:ext cx="0" cy="0"/>
+          <a:chOff x="0" y="0"/>
+          <a:chExt cx="0" cy="0"/>
+        </a:xfrm>
+      </p:grpSpPr>
+      <p:sp>
+        <p:nvSpPr>
+          <p:cNvPr id="2" name="ชื่อเรื่อง 1">
+            <a:extLst>
+              <a:ext uri="{FF2B5EF4-FFF2-40B4-BE49-F238E27FC236}">
+                <a16:creationId xmlns:a16="http://schemas.microsoft.com/office/drawing/2014/main" id="{60687023-CCEB-4DD7-AB6F-7014777BA8F2}"/>
+              </a:ext>
+            </a:extLst>
+          </p:cNvPr>
+          <p:cNvSpPr>
+            <a:spLocks noGrp="1"/>
+          </p:cNvSpPr>
+          <p:nvPr>
+            <p:ph type="title"/>
+          </p:nvPr>
+        </p:nvSpPr>
+        <p:spPr/>
+        <p:txBody>
+          <a:bodyPr/>
+          <a:lstStyle/>
+          <a:p>
+            <a:r>
+              <a:rPr lang="en-US" dirty="0"/>
+              <a:t>3. Arrow Function =&gt; …. </a:t>
+            </a:r>
+          </a:p>
+        </p:txBody>
+      </p:sp>
+      <p:sp>
+        <p:nvSpPr>
+          <p:cNvPr id="4" name="กล่องข้อความ 3">
+            <a:extLst>
+              <a:ext uri="{FF2B5EF4-FFF2-40B4-BE49-F238E27FC236}">
+                <a16:creationId xmlns:a16="http://schemas.microsoft.com/office/drawing/2014/main" id="{50B15147-7A71-49D3-B46B-1DB03709BF91}"/>
+              </a:ext>
+            </a:extLst>
+          </p:cNvPr>
+          <p:cNvSpPr txBox="1"/>
+          <p:nvPr/>
+        </p:nvSpPr>
+        <p:spPr>
+          <a:xfrm>
+            <a:off x="1629916" y="2132856"/>
+            <a:ext cx="6840760" cy="523220"/>
+          </a:xfrm>
+          <a:prstGeom prst="rect">
+            <a:avLst/>
+          </a:prstGeom>
+          <a:noFill/>
+        </p:spPr>
+        <p:txBody>
+          <a:bodyPr wrap="square" rtlCol="0">
+            <a:spAutoFit/>
+          </a:bodyPr>
+          <a:lstStyle/>
+          <a:p>
+            <a:r>
+              <a:rPr lang="en-US" sz="2800" dirty="0"/>
+              <a:t>Traditional function syntax</a:t>
+            </a:r>
+          </a:p>
+        </p:txBody>
+      </p:sp>
+      <p:sp>
+        <p:nvSpPr>
+          <p:cNvPr id="5" name="กล่องข้อความ 4">
+            <a:extLst>
+              <a:ext uri="{FF2B5EF4-FFF2-40B4-BE49-F238E27FC236}">
+                <a16:creationId xmlns:a16="http://schemas.microsoft.com/office/drawing/2014/main" id="{623309FB-B4B2-4427-9E49-70687E06FE9D}"/>
+              </a:ext>
+            </a:extLst>
+          </p:cNvPr>
+          <p:cNvSpPr txBox="1"/>
+          <p:nvPr/>
+        </p:nvSpPr>
+        <p:spPr>
+          <a:xfrm>
+            <a:off x="1657922" y="3167390"/>
+            <a:ext cx="6840760" cy="523220"/>
+          </a:xfrm>
+          <a:prstGeom prst="rect">
+            <a:avLst/>
+          </a:prstGeom>
+          <a:noFill/>
+        </p:spPr>
+        <p:txBody>
+          <a:bodyPr wrap="square" rtlCol="0">
+            <a:spAutoFit/>
+          </a:bodyPr>
+          <a:lstStyle/>
+          <a:p>
+            <a:r>
+              <a:rPr lang="en-US" sz="2800" dirty="0"/>
+              <a:t>Arrow function syntax(s)</a:t>
+            </a:r>
+          </a:p>
+        </p:txBody>
+      </p:sp>
+    </p:spTree>
+    <p:extLst>
+      <p:ext uri="{BB962C8B-B14F-4D97-AF65-F5344CB8AC3E}">
+        <p14:creationId xmlns:p14="http://schemas.microsoft.com/office/powerpoint/2010/main" val="2511070788"/>
+      </p:ext>
+    </p:extLst>
+  </p:cSld>
+  <p:clrMapOvr>
+    <a:masterClrMapping/>
+  </p:clrMapOvr>
+  <mc:AlternateContent xmlns:mc="http://schemas.openxmlformats.org/markup-compatibility/2006" xmlns:p14="http://schemas.microsoft.com/office/powerpoint/2010/main">
+    <mc:Choice Requires="p14">
+      <p:transition spd="med" p14:dur="700">
+        <p:fade/>
+      </p:transition>
+    </mc:Choice>
+    <mc:Fallback xmlns="">
+      <p:transition spd="med">
+        <p:fade/>
+      </p:transition>
+    </mc:Fallback>
+  </mc:AlternateContent>
+</p:sld>
+</file>
+
+<file path=ppt/slides/slide22.xml><?xml version="1.0" encoding="utf-8"?>
+<p:sld xmlns:a="http://schemas.openxmlformats.org/drawingml/2006/main" xmlns:r="http://schemas.openxmlformats.org/officeDocument/2006/relationships" xmlns:p="http://schemas.openxmlformats.org/presentationml/2006/main">
+  <p:cSld>
+    <p:spTree>
+      <p:nvGrpSpPr>
+        <p:cNvPr id="1" name=""/>
+        <p:cNvGrpSpPr/>
+        <p:nvPr/>
+      </p:nvGrpSpPr>
+      <p:grpSpPr>
+        <a:xfrm>
+          <a:off x="0" y="0"/>
+          <a:ext cx="0" cy="0"/>
+          <a:chOff x="0" y="0"/>
+          <a:chExt cx="0" cy="0"/>
+        </a:xfrm>
+      </p:grpSpPr>
+      <p:sp>
+        <p:nvSpPr>
+          <p:cNvPr id="2" name="ชื่อเรื่อง 1">
+            <a:extLst>
+              <a:ext uri="{FF2B5EF4-FFF2-40B4-BE49-F238E27FC236}">
+                <a16:creationId xmlns:a16="http://schemas.microsoft.com/office/drawing/2014/main" id="{2CD5D5CB-FF9F-492A-AA05-D71913E76124}"/>
+              </a:ext>
+            </a:extLst>
+          </p:cNvPr>
+          <p:cNvSpPr>
+            <a:spLocks noGrp="1"/>
+          </p:cNvSpPr>
+          <p:nvPr>
+            <p:ph type="title"/>
+          </p:nvPr>
+        </p:nvSpPr>
+        <p:spPr/>
+        <p:txBody>
+          <a:bodyPr/>
+          <a:lstStyle/>
+          <a:p>
+            <a:r>
+              <a:rPr lang="en-US" dirty="0"/>
+              <a:t>4. rest and spread ( …variable )</a:t>
+            </a:r>
+          </a:p>
+        </p:txBody>
+      </p:sp>
+    </p:spTree>
+    <p:extLst>
+      <p:ext uri="{BB962C8B-B14F-4D97-AF65-F5344CB8AC3E}">
+        <p14:creationId xmlns:p14="http://schemas.microsoft.com/office/powerpoint/2010/main" val="2245988571"/>
+      </p:ext>
+    </p:extLst>
+  </p:cSld>
+  <p:clrMapOvr>
+    <a:masterClrMapping/>
+  </p:clrMapOvr>
+  <mc:AlternateContent xmlns:mc="http://schemas.openxmlformats.org/markup-compatibility/2006" xmlns:p14="http://schemas.microsoft.com/office/powerpoint/2010/main">
+    <mc:Choice Requires="p14">
+      <p:transition spd="med" p14:dur="700">
+        <p:fade/>
+      </p:transition>
+    </mc:Choice>
+    <mc:Fallback xmlns="">
+      <p:transition spd="med">
+        <p:fade/>
+      </p:transition>
+    </mc:Fallback>
+  </mc:AlternateContent>
+</p:sld>
+</file>
+
+<file path=ppt/slides/slide23.xml><?xml version="1.0" encoding="utf-8"?>
+<p:sld xmlns:a="http://schemas.openxmlformats.org/drawingml/2006/main" xmlns:r="http://schemas.openxmlformats.org/officeDocument/2006/relationships" xmlns:p="http://schemas.openxmlformats.org/presentationml/2006/main">
+  <p:cSld>
+    <p:spTree>
+      <p:nvGrpSpPr>
+        <p:cNvPr id="1" name=""/>
+        <p:cNvGrpSpPr/>
+        <p:nvPr/>
+      </p:nvGrpSpPr>
+      <p:grpSpPr>
+        <a:xfrm>
+          <a:off x="0" y="0"/>
+          <a:ext cx="0" cy="0"/>
+          <a:chOff x="0" y="0"/>
+          <a:chExt cx="0" cy="0"/>
+        </a:xfrm>
+      </p:grpSpPr>
+      <p:sp>
+        <p:nvSpPr>
+          <p:cNvPr id="2" name="ชื่อเรื่อง 1">
+            <a:extLst>
+              <a:ext uri="{FF2B5EF4-FFF2-40B4-BE49-F238E27FC236}">
+                <a16:creationId xmlns:a16="http://schemas.microsoft.com/office/drawing/2014/main" id="{016A26F3-C63A-4795-B10C-B5A4D14A2E66}"/>
+              </a:ext>
+            </a:extLst>
+          </p:cNvPr>
+          <p:cNvSpPr>
+            <a:spLocks noGrp="1"/>
+          </p:cNvSpPr>
+          <p:nvPr>
+            <p:ph type="title"/>
+          </p:nvPr>
+        </p:nvSpPr>
+        <p:spPr/>
+        <p:txBody>
+          <a:bodyPr/>
+          <a:lstStyle/>
+          <a:p>
+            <a:r>
+              <a:rPr lang="en-US" dirty="0"/>
+              <a:t>5. </a:t>
+            </a:r>
+            <a:r>
+              <a:rPr lang="en-US" dirty="0" err="1"/>
+              <a:t>destructuring</a:t>
+            </a:r>
+            <a:r>
+              <a:rPr lang="en-US" dirty="0"/>
+              <a:t> </a:t>
+            </a:r>
+          </a:p>
+        </p:txBody>
+      </p:sp>
+    </p:spTree>
+    <p:extLst>
+      <p:ext uri="{BB962C8B-B14F-4D97-AF65-F5344CB8AC3E}">
+        <p14:creationId xmlns:p14="http://schemas.microsoft.com/office/powerpoint/2010/main" val="2131065155"/>
+      </p:ext>
+    </p:extLst>
+  </p:cSld>
+  <p:clrMapOvr>
+    <a:masterClrMapping/>
+  </p:clrMapOvr>
+  <mc:AlternateContent xmlns:mc="http://schemas.openxmlformats.org/markup-compatibility/2006" xmlns:p14="http://schemas.microsoft.com/office/powerpoint/2010/main">
+    <mc:Choice Requires="p14">
+      <p:transition spd="med" p14:dur="700">
+        <p:fade/>
+      </p:transition>
+    </mc:Choice>
+    <mc:Fallback xmlns="">
+      <p:transition spd="med">
+        <p:fade/>
+      </p:transition>
+    </mc:Fallback>
+  </mc:AlternateContent>
+</p:sld>
+</file>
+
+<file path=ppt/slides/slide24.xml><?xml version="1.0" encoding="utf-8"?>
+<p:sld xmlns:a="http://schemas.openxmlformats.org/drawingml/2006/main" xmlns:r="http://schemas.openxmlformats.org/officeDocument/2006/relationships" xmlns:p="http://schemas.openxmlformats.org/presentationml/2006/main">
+  <p:cSld>
+    <p:spTree>
+      <p:nvGrpSpPr>
+        <p:cNvPr id="1" name=""/>
+        <p:cNvGrpSpPr/>
+        <p:nvPr/>
+      </p:nvGrpSpPr>
+      <p:grpSpPr>
+        <a:xfrm>
+          <a:off x="0" y="0"/>
+          <a:ext cx="0" cy="0"/>
+          <a:chOff x="0" y="0"/>
+          <a:chExt cx="0" cy="0"/>
+        </a:xfrm>
+      </p:grpSpPr>
+      <p:sp>
+        <p:nvSpPr>
+          <p:cNvPr id="2" name="ชื่อเรื่อง 1">
+            <a:extLst>
+              <a:ext uri="{FF2B5EF4-FFF2-40B4-BE49-F238E27FC236}">
+                <a16:creationId xmlns:a16="http://schemas.microsoft.com/office/drawing/2014/main" id="{84A2F9B6-F61D-49B6-81DC-BDF8A235C289}"/>
+              </a:ext>
+            </a:extLst>
+          </p:cNvPr>
+          <p:cNvSpPr>
+            <a:spLocks noGrp="1"/>
+          </p:cNvSpPr>
+          <p:nvPr>
+            <p:ph type="title"/>
+          </p:nvPr>
+        </p:nvSpPr>
+        <p:spPr/>
+        <p:txBody>
+          <a:bodyPr/>
+          <a:lstStyle/>
+          <a:p>
+            <a:r>
+              <a:rPr lang="en-US" dirty="0"/>
+              <a:t>6. Functional programming?? </a:t>
+            </a:r>
+          </a:p>
+        </p:txBody>
+      </p:sp>
+      <p:sp>
+        <p:nvSpPr>
+          <p:cNvPr id="3" name="กล่องข้อความ 2">
+            <a:extLst>
+              <a:ext uri="{FF2B5EF4-FFF2-40B4-BE49-F238E27FC236}">
+                <a16:creationId xmlns:a16="http://schemas.microsoft.com/office/drawing/2014/main" id="{AE513B40-E72E-4A83-9235-A6126CBB8379}"/>
+              </a:ext>
+            </a:extLst>
+          </p:cNvPr>
+          <p:cNvSpPr txBox="1"/>
+          <p:nvPr/>
+        </p:nvSpPr>
+        <p:spPr>
+          <a:xfrm>
+            <a:off x="1701924" y="1874728"/>
+            <a:ext cx="7992888" cy="3108543"/>
+          </a:xfrm>
+          <a:prstGeom prst="rect">
+            <a:avLst/>
+          </a:prstGeom>
+          <a:noFill/>
+        </p:spPr>
+        <p:txBody>
+          <a:bodyPr wrap="square" rtlCol="0">
+            <a:spAutoFit/>
+          </a:bodyPr>
+          <a:lstStyle/>
+          <a:p>
+            <a:r>
+              <a:rPr lang="en-US" sz="2800" dirty="0"/>
+              <a:t>Map</a:t>
+            </a:r>
+          </a:p>
+          <a:p>
+            <a:endParaRPr lang="en-US" sz="2800" dirty="0"/>
+          </a:p>
+          <a:p>
+            <a:r>
+              <a:rPr lang="en-US" sz="2800" dirty="0"/>
+              <a:t>Filter</a:t>
+            </a:r>
+          </a:p>
+          <a:p>
+            <a:endParaRPr lang="en-US" sz="2800" dirty="0"/>
+          </a:p>
+          <a:p>
+            <a:r>
+              <a:rPr lang="en-US" sz="2800" dirty="0"/>
+              <a:t>Reduce</a:t>
+            </a:r>
+          </a:p>
+          <a:p>
+            <a:endParaRPr lang="en-US" sz="2800" dirty="0"/>
+          </a:p>
+          <a:p>
+            <a:r>
+              <a:rPr lang="en-US" sz="2800" dirty="0"/>
+              <a:t>Find</a:t>
+            </a:r>
+          </a:p>
+        </p:txBody>
+      </p:sp>
+    </p:spTree>
+    <p:extLst>
+      <p:ext uri="{BB962C8B-B14F-4D97-AF65-F5344CB8AC3E}">
+        <p14:creationId xmlns:p14="http://schemas.microsoft.com/office/powerpoint/2010/main" val="4009146836"/>
+      </p:ext>
+    </p:extLst>
+  </p:cSld>
+  <p:clrMapOvr>
+    <a:masterClrMapping/>
+  </p:clrMapOvr>
+  <mc:AlternateContent xmlns:mc="http://schemas.openxmlformats.org/markup-compatibility/2006" xmlns:p14="http://schemas.microsoft.com/office/powerpoint/2010/main">
+    <mc:Choice Requires="p14">
+      <p:transition spd="med" p14:dur="700">
+        <p:fade/>
+      </p:transition>
+    </mc:Choice>
+    <mc:Fallback xmlns="">
+      <p:transition spd="med">
+        <p:fade/>
+      </p:transition>
+    </mc:Fallback>
+  </mc:AlternateContent>
+</p:sld>
+</file>
+
+<file path=ppt/slides/slide25.xml><?xml version="1.0" encoding="utf-8"?>
+<p:sld xmlns:a="http://schemas.openxmlformats.org/drawingml/2006/main" xmlns:r="http://schemas.openxmlformats.org/officeDocument/2006/relationships" xmlns:p="http://schemas.openxmlformats.org/presentationml/2006/main">
+  <p:cSld>
+    <p:spTree>
+      <p:nvGrpSpPr>
+        <p:cNvPr id="1" name=""/>
+        <p:cNvGrpSpPr/>
+        <p:nvPr/>
+      </p:nvGrpSpPr>
+      <p:grpSpPr>
+        <a:xfrm>
+          <a:off x="0" y="0"/>
+          <a:ext cx="0" cy="0"/>
+          <a:chOff x="0" y="0"/>
+          <a:chExt cx="0" cy="0"/>
+        </a:xfrm>
+      </p:grpSpPr>
+      <p:pic>
+        <p:nvPicPr>
+          <p:cNvPr id="4" name="กราฟิก 3" descr="หนังสือที่เปิดอยู่">
+            <a:extLst>
+              <a:ext uri="{FF2B5EF4-FFF2-40B4-BE49-F238E27FC236}">
+                <a16:creationId xmlns:a16="http://schemas.microsoft.com/office/drawing/2014/main" id="{4BB3C191-56F3-4733-94BB-72EB31650E38}"/>
+              </a:ext>
+            </a:extLst>
+          </p:cNvPr>
+          <p:cNvPicPr>
+            <a:picLocks noChangeAspect="1"/>
+          </p:cNvPicPr>
+          <p:nvPr/>
+        </p:nvPicPr>
+        <p:blipFill>
+          <a:blip r:embed="rId2">
+            <a:extLst>
+              <a:ext uri="{28A0092B-C50C-407E-A947-70E740481C1C}">
+                <a14:useLocalDpi xmlns:a14="http://schemas.microsoft.com/office/drawing/2010/main" val="0"/>
+              </a:ext>
+              <a:ext uri="{96DAC541-7B7A-43D3-8B79-37D633B846F1}">
+                <asvg:svgBlip xmlns:asvg="http://schemas.microsoft.com/office/drawing/2016/SVG/main" r:embed="rId3"/>
+              </a:ext>
+            </a:extLst>
+          </a:blip>
+          <a:stretch>
+            <a:fillRect/>
+          </a:stretch>
+        </p:blipFill>
+        <p:spPr>
+          <a:xfrm>
+            <a:off x="4294212" y="476672"/>
+            <a:ext cx="3600400" cy="3600400"/>
+          </a:xfrm>
+          <a:prstGeom prst="rect">
+            <a:avLst/>
+          </a:prstGeom>
+        </p:spPr>
+      </p:pic>
+      <p:sp>
+        <p:nvSpPr>
+          <p:cNvPr id="5" name="กล่องข้อความ 4">
+            <a:extLst>
+              <a:ext uri="{FF2B5EF4-FFF2-40B4-BE49-F238E27FC236}">
+                <a16:creationId xmlns:a16="http://schemas.microsoft.com/office/drawing/2014/main" id="{2285EDBA-79D7-41C4-972C-261406B0AF7A}"/>
+              </a:ext>
+            </a:extLst>
+          </p:cNvPr>
+          <p:cNvSpPr txBox="1"/>
+          <p:nvPr/>
+        </p:nvSpPr>
+        <p:spPr>
+          <a:xfrm>
+            <a:off x="1665920" y="4437112"/>
+            <a:ext cx="8856984" cy="1200329"/>
+          </a:xfrm>
+          <a:prstGeom prst="rect">
+            <a:avLst/>
+          </a:prstGeom>
+          <a:noFill/>
+        </p:spPr>
+        <p:txBody>
+          <a:bodyPr wrap="square" rtlCol="0">
+            <a:spAutoFit/>
+          </a:bodyPr>
+          <a:lstStyle/>
+          <a:p>
+            <a:pPr algn="ctr"/>
+            <a:r>
+              <a:rPr lang="en-US" sz="7200" spc="600" dirty="0"/>
+              <a:t>Lab://003</a:t>
+            </a:r>
+          </a:p>
+        </p:txBody>
+      </p:sp>
+    </p:spTree>
+    <p:extLst>
+      <p:ext uri="{BB962C8B-B14F-4D97-AF65-F5344CB8AC3E}">
+        <p14:creationId xmlns:p14="http://schemas.microsoft.com/office/powerpoint/2010/main" val="1057628906"/>
+      </p:ext>
+    </p:extLst>
+  </p:cSld>
+  <p:clrMapOvr>
+    <a:masterClrMapping/>
+  </p:clrMapOvr>
+  <mc:AlternateContent xmlns:mc="http://schemas.openxmlformats.org/markup-compatibility/2006" xmlns:p14="http://schemas.microsoft.com/office/powerpoint/2010/main">
+    <mc:Choice Requires="p14">
+      <p:transition spd="med" p14:dur="700">
+        <p:fade/>
+      </p:transition>
+    </mc:Choice>
+    <mc:Fallback xmlns="">
+      <p:transition spd="med">
+        <p:fade/>
+      </p:transition>
+    </mc:Fallback>
+  </mc:AlternateContent>
+</p:sld>
+</file>
+
+<file path=ppt/slides/slide26.xml><?xml version="1.0" encoding="utf-8"?>
+<p:sld xmlns:a="http://schemas.openxmlformats.org/drawingml/2006/main" xmlns:r="http://schemas.openxmlformats.org/officeDocument/2006/relationships" xmlns:p="http://schemas.openxmlformats.org/presentationml/2006/main">
+  <p:cSld>
+    <p:spTree>
+      <p:nvGrpSpPr>
+        <p:cNvPr id="1" name=""/>
+        <p:cNvGrpSpPr/>
+        <p:nvPr/>
+      </p:nvGrpSpPr>
+      <p:grpSpPr>
+        <a:xfrm>
+          <a:off x="0" y="0"/>
+          <a:ext cx="0" cy="0"/>
+          <a:chOff x="0" y="0"/>
+          <a:chExt cx="0" cy="0"/>
+        </a:xfrm>
+      </p:grpSpPr>
+      <p:sp>
+        <p:nvSpPr>
+          <p:cNvPr id="2" name="ชื่อเรื่อง 1">
+            <a:extLst>
+              <a:ext uri="{FF2B5EF4-FFF2-40B4-BE49-F238E27FC236}">
+                <a16:creationId xmlns:a16="http://schemas.microsoft.com/office/drawing/2014/main" id="{508DD8D4-DBE1-46A9-B2D3-F488C2389F43}"/>
+              </a:ext>
+            </a:extLst>
+          </p:cNvPr>
+          <p:cNvSpPr>
+            <a:spLocks noGrp="1"/>
+          </p:cNvSpPr>
+          <p:nvPr>
+            <p:ph type="title"/>
+          </p:nvPr>
+        </p:nvSpPr>
+        <p:spPr/>
+        <p:txBody>
+          <a:bodyPr>
+            <a:normAutofit/>
+          </a:bodyPr>
+          <a:lstStyle/>
+          <a:p>
+            <a:pPr algn="ctr"/>
+            <a:r>
+              <a:rPr lang="en-US" sz="7200" b="1" dirty="0">
+                <a:solidFill>
+                  <a:schemeClr val="bg1"/>
+                </a:solidFill>
+                <a:highlight>
+                  <a:srgbClr val="F5DA55"/>
+                </a:highlight>
+              </a:rPr>
+              <a:t>ES6 Advance</a:t>
+            </a:r>
+          </a:p>
+        </p:txBody>
+      </p:sp>
+      <p:pic>
+        <p:nvPicPr>
+          <p:cNvPr id="4" name="รูปภาพ 3">
+            <a:extLst>
+              <a:ext uri="{FF2B5EF4-FFF2-40B4-BE49-F238E27FC236}">
+                <a16:creationId xmlns:a16="http://schemas.microsoft.com/office/drawing/2014/main" id="{5B4942E2-CD29-4057-BE73-3A2949F5B960}"/>
+              </a:ext>
+            </a:extLst>
+          </p:cNvPr>
+          <p:cNvPicPr>
+            <a:picLocks noChangeAspect="1"/>
+          </p:cNvPicPr>
+          <p:nvPr/>
+        </p:nvPicPr>
+        <p:blipFill>
+          <a:blip r:embed="rId2"/>
+          <a:stretch>
+            <a:fillRect/>
+          </a:stretch>
+        </p:blipFill>
+        <p:spPr>
+          <a:xfrm>
+            <a:off x="2471141" y="2492896"/>
+            <a:ext cx="7246541" cy="2264544"/>
+          </a:xfrm>
+          <a:prstGeom prst="rect">
+            <a:avLst/>
+          </a:prstGeom>
+        </p:spPr>
+      </p:pic>
+    </p:spTree>
+    <p:extLst>
+      <p:ext uri="{BB962C8B-B14F-4D97-AF65-F5344CB8AC3E}">
+        <p14:creationId xmlns:p14="http://schemas.microsoft.com/office/powerpoint/2010/main" val="3775206207"/>
+      </p:ext>
+    </p:extLst>
+  </p:cSld>
+  <p:clrMapOvr>
+    <a:masterClrMapping/>
+  </p:clrMapOvr>
+  <mc:AlternateContent xmlns:mc="http://schemas.openxmlformats.org/markup-compatibility/2006" xmlns:p14="http://schemas.microsoft.com/office/powerpoint/2010/main">
+    <mc:Choice Requires="p14">
+      <p:transition spd="med" p14:dur="700">
+        <p:fade/>
+      </p:transition>
+    </mc:Choice>
+    <mc:Fallback xmlns="">
+      <p:transition spd="med">
+        <p:fade/>
+      </p:transition>
+    </mc:Fallback>
+  </mc:AlternateContent>
+</p:sld>
+</file>
+
+<file path=ppt/slides/slide27.xml><?xml version="1.0" encoding="utf-8"?>
+<p:sld xmlns:a="http://schemas.openxmlformats.org/drawingml/2006/main" xmlns:r="http://schemas.openxmlformats.org/officeDocument/2006/relationships" xmlns:p="http://schemas.openxmlformats.org/presentationml/2006/main">
+  <p:cSld>
+    <p:spTree>
+      <p:nvGrpSpPr>
+        <p:cNvPr id="1" name=""/>
+        <p:cNvGrpSpPr/>
+        <p:nvPr/>
+      </p:nvGrpSpPr>
+      <p:grpSpPr>
+        <a:xfrm>
+          <a:off x="0" y="0"/>
+          <a:ext cx="0" cy="0"/>
+          <a:chOff x="0" y="0"/>
+          <a:chExt cx="0" cy="0"/>
+        </a:xfrm>
+      </p:grpSpPr>
+      <p:sp>
+        <p:nvSpPr>
+          <p:cNvPr id="2" name="ชื่อเรื่อง 1">
+            <a:extLst>
+              <a:ext uri="{FF2B5EF4-FFF2-40B4-BE49-F238E27FC236}">
+                <a16:creationId xmlns:a16="http://schemas.microsoft.com/office/drawing/2014/main" id="{723EC13C-4C9D-4E60-A4B4-EC0DCFF816E5}"/>
+              </a:ext>
+            </a:extLst>
+          </p:cNvPr>
+          <p:cNvSpPr>
+            <a:spLocks noGrp="1"/>
+          </p:cNvSpPr>
+          <p:nvPr>
+            <p:ph type="title"/>
+          </p:nvPr>
+        </p:nvSpPr>
+        <p:spPr/>
+        <p:txBody>
+          <a:bodyPr/>
+          <a:lstStyle/>
+          <a:p>
+            <a:r>
+              <a:rPr lang="en-US" dirty="0"/>
+              <a:t>1. Callback VS Promise</a:t>
+            </a:r>
+          </a:p>
+        </p:txBody>
+      </p:sp>
+      <p:sp>
+        <p:nvSpPr>
+          <p:cNvPr id="3" name="สี่เหลี่ยมผืนผ้า 2">
+            <a:extLst>
+              <a:ext uri="{FF2B5EF4-FFF2-40B4-BE49-F238E27FC236}">
+                <a16:creationId xmlns:a16="http://schemas.microsoft.com/office/drawing/2014/main" id="{EA2F2000-EDBA-4D62-B7EC-7ABAE83AD4B6}"/>
+              </a:ext>
+            </a:extLst>
+          </p:cNvPr>
+          <p:cNvSpPr/>
+          <p:nvPr/>
+        </p:nvSpPr>
+        <p:spPr>
+          <a:xfrm>
+            <a:off x="2133972" y="3140968"/>
+            <a:ext cx="1889300" cy="461665"/>
+          </a:xfrm>
+          <a:prstGeom prst="rect">
+            <a:avLst/>
+          </a:prstGeom>
+        </p:spPr>
+        <p:txBody>
+          <a:bodyPr wrap="none">
+            <a:spAutoFit/>
+          </a:bodyPr>
+          <a:lstStyle/>
+          <a:p>
+            <a:r>
+              <a:rPr lang="en-US" dirty="0"/>
+              <a:t>Callback code</a:t>
+            </a:r>
+          </a:p>
+        </p:txBody>
+      </p:sp>
+      <p:sp>
+        <p:nvSpPr>
+          <p:cNvPr id="4" name="สี่เหลี่ยมผืนผ้า 3">
+            <a:extLst>
+              <a:ext uri="{FF2B5EF4-FFF2-40B4-BE49-F238E27FC236}">
+                <a16:creationId xmlns:a16="http://schemas.microsoft.com/office/drawing/2014/main" id="{9408A020-E43D-4305-8498-0222F011C6A2}"/>
+              </a:ext>
+            </a:extLst>
+          </p:cNvPr>
+          <p:cNvSpPr/>
+          <p:nvPr/>
+        </p:nvSpPr>
+        <p:spPr>
+          <a:xfrm>
+            <a:off x="8254652" y="3109648"/>
+            <a:ext cx="1871538" cy="461665"/>
+          </a:xfrm>
+          <a:prstGeom prst="rect">
+            <a:avLst/>
+          </a:prstGeom>
+        </p:spPr>
+        <p:txBody>
+          <a:bodyPr wrap="none">
+            <a:spAutoFit/>
+          </a:bodyPr>
+          <a:lstStyle/>
+          <a:p>
+            <a:r>
+              <a:rPr lang="en-US" dirty="0"/>
+              <a:t>Promise code</a:t>
+            </a:r>
+          </a:p>
+        </p:txBody>
+      </p:sp>
+      <p:cxnSp>
+        <p:nvCxnSpPr>
+          <p:cNvPr id="6" name="ตัวเชื่อมต่อตรง 5">
+            <a:extLst>
+              <a:ext uri="{FF2B5EF4-FFF2-40B4-BE49-F238E27FC236}">
+                <a16:creationId xmlns:a16="http://schemas.microsoft.com/office/drawing/2014/main" id="{8BBADBD7-3690-4B9F-8C2C-5EAD3FF651B1}"/>
+              </a:ext>
+            </a:extLst>
+          </p:cNvPr>
+          <p:cNvCxnSpPr/>
+          <p:nvPr/>
+        </p:nvCxnSpPr>
+        <p:spPr>
+          <a:xfrm>
+            <a:off x="6399133" y="1772816"/>
+            <a:ext cx="0" cy="4392488"/>
+          </a:xfrm>
+          <a:prstGeom prst="line">
+            <a:avLst/>
+          </a:prstGeom>
+          <a:ln w="25400"/>
+        </p:spPr>
+        <p:style>
+          <a:lnRef idx="1">
+            <a:schemeClr val="accent1"/>
+          </a:lnRef>
+          <a:fillRef idx="0">
+            <a:schemeClr val="accent1"/>
+          </a:fillRef>
+          <a:effectRef idx="0">
+            <a:schemeClr val="accent1"/>
+          </a:effectRef>
+          <a:fontRef idx="minor">
+            <a:schemeClr val="tx1"/>
+          </a:fontRef>
+        </p:style>
+      </p:cxnSp>
+    </p:spTree>
+    <p:extLst>
+      <p:ext uri="{BB962C8B-B14F-4D97-AF65-F5344CB8AC3E}">
+        <p14:creationId xmlns:p14="http://schemas.microsoft.com/office/powerpoint/2010/main" val="701325308"/>
+      </p:ext>
+    </p:extLst>
+  </p:cSld>
+  <p:clrMapOvr>
+    <a:masterClrMapping/>
+  </p:clrMapOvr>
+  <mc:AlternateContent xmlns:mc="http://schemas.openxmlformats.org/markup-compatibility/2006" xmlns:p14="http://schemas.microsoft.com/office/powerpoint/2010/main">
+    <mc:Choice Requires="p14">
+      <p:transition spd="med" p14:dur="700">
+        <p:fade/>
+      </p:transition>
+    </mc:Choice>
+    <mc:Fallback xmlns="">
+      <p:transition spd="med">
+        <p:fade/>
+      </p:transition>
+    </mc:Fallback>
+  </mc:AlternateContent>
+</p:sld>
+</file>
+
+<file path=ppt/slides/slide28.xml><?xml version="1.0" encoding="utf-8"?>
+<p:sld xmlns:a="http://schemas.openxmlformats.org/drawingml/2006/main" xmlns:r="http://schemas.openxmlformats.org/officeDocument/2006/relationships" xmlns:p="http://schemas.openxmlformats.org/presentationml/2006/main">
+  <p:cSld>
+    <p:spTree>
+      <p:nvGrpSpPr>
+        <p:cNvPr id="1" name=""/>
+        <p:cNvGrpSpPr/>
+        <p:nvPr/>
+      </p:nvGrpSpPr>
+      <p:grpSpPr>
+        <a:xfrm>
+          <a:off x="0" y="0"/>
+          <a:ext cx="0" cy="0"/>
+          <a:chOff x="0" y="0"/>
+          <a:chExt cx="0" cy="0"/>
+        </a:xfrm>
+      </p:grpSpPr>
+      <p:sp>
+        <p:nvSpPr>
+          <p:cNvPr id="2" name="ชื่อเรื่อง 1">
+            <a:extLst>
+              <a:ext uri="{FF2B5EF4-FFF2-40B4-BE49-F238E27FC236}">
+                <a16:creationId xmlns:a16="http://schemas.microsoft.com/office/drawing/2014/main" id="{BD353063-B5D1-47E7-A872-F1DDD0ACDB94}"/>
+              </a:ext>
+            </a:extLst>
+          </p:cNvPr>
+          <p:cNvSpPr>
+            <a:spLocks noGrp="1"/>
+          </p:cNvSpPr>
+          <p:nvPr>
+            <p:ph type="title"/>
+          </p:nvPr>
+        </p:nvSpPr>
+        <p:spPr/>
+        <p:txBody>
+          <a:bodyPr/>
+          <a:lstStyle/>
+          <a:p>
+            <a:r>
+              <a:rPr lang="en-US" dirty="0"/>
+              <a:t>2. Async Await</a:t>
+            </a:r>
+          </a:p>
+        </p:txBody>
+      </p:sp>
+      <p:sp>
+        <p:nvSpPr>
+          <p:cNvPr id="3" name="กล่องข้อความ 2">
+            <a:extLst>
+              <a:ext uri="{FF2B5EF4-FFF2-40B4-BE49-F238E27FC236}">
+                <a16:creationId xmlns:a16="http://schemas.microsoft.com/office/drawing/2014/main" id="{AF849E8D-811F-4B6F-BAF8-E5BB14D99C06}"/>
+              </a:ext>
+            </a:extLst>
+          </p:cNvPr>
+          <p:cNvSpPr txBox="1"/>
+          <p:nvPr/>
+        </p:nvSpPr>
+        <p:spPr>
+          <a:xfrm>
+            <a:off x="1989956" y="1988840"/>
+            <a:ext cx="2736304" cy="523220"/>
+          </a:xfrm>
+          <a:prstGeom prst="rect">
+            <a:avLst/>
+          </a:prstGeom>
+          <a:noFill/>
+        </p:spPr>
+        <p:txBody>
+          <a:bodyPr wrap="square" rtlCol="0">
+            <a:spAutoFit/>
+          </a:bodyPr>
+          <a:lstStyle/>
+          <a:p>
+            <a:r>
+              <a:rPr lang="en-US" sz="2800" dirty="0"/>
+              <a:t>Async -&gt; function</a:t>
+            </a:r>
+          </a:p>
+        </p:txBody>
+      </p:sp>
+      <p:sp>
+        <p:nvSpPr>
+          <p:cNvPr id="4" name="สี่เหลี่ยมผืนผ้า 3">
+            <a:extLst>
+              <a:ext uri="{FF2B5EF4-FFF2-40B4-BE49-F238E27FC236}">
+                <a16:creationId xmlns:a16="http://schemas.microsoft.com/office/drawing/2014/main" id="{804B9792-49CF-4FBB-A300-4E1747281BED}"/>
+              </a:ext>
+            </a:extLst>
+          </p:cNvPr>
+          <p:cNvSpPr/>
+          <p:nvPr/>
+        </p:nvSpPr>
+        <p:spPr>
+          <a:xfrm>
+            <a:off x="1989956" y="3002300"/>
+            <a:ext cx="4092082" cy="461665"/>
+          </a:xfrm>
+          <a:prstGeom prst="rect">
+            <a:avLst/>
+          </a:prstGeom>
+        </p:spPr>
+        <p:txBody>
+          <a:bodyPr wrap="none">
+            <a:spAutoFit/>
+          </a:bodyPr>
+          <a:lstStyle/>
+          <a:p>
+            <a:r>
+              <a:rPr lang="en-US" dirty="0"/>
+              <a:t>Await -&gt; statement &lt;- promise</a:t>
+            </a:r>
+          </a:p>
+        </p:txBody>
+      </p:sp>
+    </p:spTree>
+    <p:extLst>
+      <p:ext uri="{BB962C8B-B14F-4D97-AF65-F5344CB8AC3E}">
+        <p14:creationId xmlns:p14="http://schemas.microsoft.com/office/powerpoint/2010/main" val="1991154699"/>
+      </p:ext>
+    </p:extLst>
+  </p:cSld>
+  <p:clrMapOvr>
+    <a:masterClrMapping/>
+  </p:clrMapOvr>
+  <mc:AlternateContent xmlns:mc="http://schemas.openxmlformats.org/markup-compatibility/2006" xmlns:p14="http://schemas.microsoft.com/office/powerpoint/2010/main">
+    <mc:Choice Requires="p14">
+      <p:transition spd="med" p14:dur="700">
+        <p:fade/>
+      </p:transition>
+    </mc:Choice>
+    <mc:Fallback xmlns="">
+      <p:transition spd="med">
+        <p:fade/>
+      </p:transition>
+    </mc:Fallback>
+  </mc:AlternateContent>
+</p:sld>
+</file>
+
+<file path=ppt/slides/slide29.xml><?xml version="1.0" encoding="utf-8"?>
+<p:sld xmlns:a="http://schemas.openxmlformats.org/drawingml/2006/main" xmlns:r="http://schemas.openxmlformats.org/officeDocument/2006/relationships" xmlns:p="http://schemas.openxmlformats.org/presentationml/2006/main">
+  <p:cSld>
+    <p:spTree>
+      <p:nvGrpSpPr>
+        <p:cNvPr id="1" name=""/>
+        <p:cNvGrpSpPr/>
+        <p:nvPr/>
+      </p:nvGrpSpPr>
+      <p:grpSpPr>
+        <a:xfrm>
+          <a:off x="0" y="0"/>
+          <a:ext cx="0" cy="0"/>
+          <a:chOff x="0" y="0"/>
+          <a:chExt cx="0" cy="0"/>
+        </a:xfrm>
+      </p:grpSpPr>
+      <p:sp>
+        <p:nvSpPr>
+          <p:cNvPr id="2" name="ชื่อเรื่อง 1">
+            <a:extLst>
+              <a:ext uri="{FF2B5EF4-FFF2-40B4-BE49-F238E27FC236}">
+                <a16:creationId xmlns:a16="http://schemas.microsoft.com/office/drawing/2014/main" id="{5ABDAAB5-B894-40DA-851C-118212411FCB}"/>
+              </a:ext>
+            </a:extLst>
+          </p:cNvPr>
+          <p:cNvSpPr>
+            <a:spLocks noGrp="1"/>
+          </p:cNvSpPr>
+          <p:nvPr>
+            <p:ph type="title"/>
+          </p:nvPr>
+        </p:nvSpPr>
+        <p:spPr/>
+        <p:txBody>
+          <a:bodyPr/>
+          <a:lstStyle/>
+          <a:p>
+            <a:r>
+              <a:rPr lang="en-US" dirty="0"/>
+              <a:t>3. Promise to Async await</a:t>
+            </a:r>
+          </a:p>
+        </p:txBody>
+      </p:sp>
+      <p:cxnSp>
+        <p:nvCxnSpPr>
+          <p:cNvPr id="3" name="ตัวเชื่อมต่อตรง 2">
+            <a:extLst>
+              <a:ext uri="{FF2B5EF4-FFF2-40B4-BE49-F238E27FC236}">
+                <a16:creationId xmlns:a16="http://schemas.microsoft.com/office/drawing/2014/main" id="{91F8E2F9-1B0F-4A3E-A6BD-0DC8BC57ECBB}"/>
+              </a:ext>
+            </a:extLst>
+          </p:cNvPr>
+          <p:cNvCxnSpPr/>
+          <p:nvPr/>
+        </p:nvCxnSpPr>
+        <p:spPr>
+          <a:xfrm>
+            <a:off x="6399133" y="1772816"/>
+            <a:ext cx="0" cy="4392488"/>
+          </a:xfrm>
+          <a:prstGeom prst="line">
+            <a:avLst/>
+          </a:prstGeom>
+          <a:ln w="25400"/>
+        </p:spPr>
+        <p:style>
+          <a:lnRef idx="1">
+            <a:schemeClr val="accent1"/>
+          </a:lnRef>
+          <a:fillRef idx="0">
+            <a:schemeClr val="accent1"/>
+          </a:fillRef>
+          <a:effectRef idx="0">
+            <a:schemeClr val="accent1"/>
+          </a:effectRef>
+          <a:fontRef idx="minor">
+            <a:schemeClr val="tx1"/>
+          </a:fontRef>
+        </p:style>
+      </p:cxnSp>
+      <p:sp>
+        <p:nvSpPr>
+          <p:cNvPr id="4" name="สี่เหลี่ยมผืนผ้า 3">
+            <a:extLst>
+              <a:ext uri="{FF2B5EF4-FFF2-40B4-BE49-F238E27FC236}">
+                <a16:creationId xmlns:a16="http://schemas.microsoft.com/office/drawing/2014/main" id="{CFF8963E-3849-461C-B08E-4796855BEB60}"/>
+              </a:ext>
+            </a:extLst>
+          </p:cNvPr>
+          <p:cNvSpPr/>
+          <p:nvPr/>
+        </p:nvSpPr>
+        <p:spPr>
+          <a:xfrm>
+            <a:off x="2133972" y="3140968"/>
+            <a:ext cx="1871538" cy="461665"/>
+          </a:xfrm>
+          <a:prstGeom prst="rect">
+            <a:avLst/>
+          </a:prstGeom>
+        </p:spPr>
+        <p:txBody>
+          <a:bodyPr wrap="none">
+            <a:spAutoFit/>
+          </a:bodyPr>
+          <a:lstStyle/>
+          <a:p>
+            <a:r>
+              <a:rPr lang="en-US" dirty="0"/>
+              <a:t>Promise code</a:t>
+            </a:r>
+          </a:p>
+        </p:txBody>
+      </p:sp>
+      <p:sp>
+        <p:nvSpPr>
+          <p:cNvPr id="5" name="สี่เหลี่ยมผืนผ้า 4">
+            <a:extLst>
+              <a:ext uri="{FF2B5EF4-FFF2-40B4-BE49-F238E27FC236}">
+                <a16:creationId xmlns:a16="http://schemas.microsoft.com/office/drawing/2014/main" id="{23C8268A-BC09-4BEF-A7D7-BBE3B87CB2FB}"/>
+              </a:ext>
+            </a:extLst>
+          </p:cNvPr>
+          <p:cNvSpPr/>
+          <p:nvPr/>
+        </p:nvSpPr>
+        <p:spPr>
+          <a:xfrm>
+            <a:off x="8470676" y="3198167"/>
+            <a:ext cx="2333396" cy="461665"/>
+          </a:xfrm>
+          <a:prstGeom prst="rect">
+            <a:avLst/>
+          </a:prstGeom>
+        </p:spPr>
+        <p:txBody>
+          <a:bodyPr wrap="none">
+            <a:spAutoFit/>
+          </a:bodyPr>
+          <a:lstStyle/>
+          <a:p>
+            <a:r>
+              <a:rPr lang="en-US" dirty="0"/>
+              <a:t>Async await code</a:t>
+            </a:r>
+          </a:p>
+        </p:txBody>
+      </p:sp>
+    </p:spTree>
+    <p:extLst>
+      <p:ext uri="{BB962C8B-B14F-4D97-AF65-F5344CB8AC3E}">
+        <p14:creationId xmlns:p14="http://schemas.microsoft.com/office/powerpoint/2010/main" val="1028921694"/>
       </p:ext>
     </p:extLst>
   </p:cSld>
@@ -8056,7 +9790,7 @@
           <p:cNvPr id="6" name="Picture 4" descr="à¸à¸¥à¸à¸²à¸£à¸à¹à¸à¸«à¸²à¸£à¸¹à¸à¸ à¸²à¸à¸ªà¸³à¸«à¸£à¸±à¸ node Js logo">
             <a:extLst>
               <a:ext uri="{FF2B5EF4-FFF2-40B4-BE49-F238E27FC236}">
-                <a16:creationId xmlns:a16="http://schemas.microsoft.com/office/drawing/2014/main" xmlns="" id="{A8B98BAF-0B11-4B48-8A1B-08D18716A190}"/>
+                <a16:creationId xmlns:a16="http://schemas.microsoft.com/office/drawing/2014/main" id="{A8B98BAF-0B11-4B48-8A1B-08D18716A190}"/>
               </a:ext>
             </a:extLst>
           </p:cNvPr>
@@ -8102,6 +9836,568 @@
     <p:extLst>
       <p:ext uri="{BB962C8B-B14F-4D97-AF65-F5344CB8AC3E}">
         <p14:creationId xmlns:p14="http://schemas.microsoft.com/office/powerpoint/2010/main" val="4264977537"/>
+      </p:ext>
+    </p:extLst>
+  </p:cSld>
+  <p:clrMapOvr>
+    <a:masterClrMapping/>
+  </p:clrMapOvr>
+  <mc:AlternateContent xmlns:mc="http://schemas.openxmlformats.org/markup-compatibility/2006" xmlns:p14="http://schemas.microsoft.com/office/powerpoint/2010/main">
+    <mc:Choice Requires="p14">
+      <p:transition spd="med" p14:dur="700">
+        <p:fade/>
+      </p:transition>
+    </mc:Choice>
+    <mc:Fallback xmlns="">
+      <p:transition spd="med">
+        <p:fade/>
+      </p:transition>
+    </mc:Fallback>
+  </mc:AlternateContent>
+</p:sld>
+</file>
+
+<file path=ppt/slides/slide30.xml><?xml version="1.0" encoding="utf-8"?>
+<p:sld xmlns:a="http://schemas.openxmlformats.org/drawingml/2006/main" xmlns:r="http://schemas.openxmlformats.org/officeDocument/2006/relationships" xmlns:p="http://schemas.openxmlformats.org/presentationml/2006/main">
+  <p:cSld>
+    <p:spTree>
+      <p:nvGrpSpPr>
+        <p:cNvPr id="1" name=""/>
+        <p:cNvGrpSpPr/>
+        <p:nvPr/>
+      </p:nvGrpSpPr>
+      <p:grpSpPr>
+        <a:xfrm>
+          <a:off x="0" y="0"/>
+          <a:ext cx="0" cy="0"/>
+          <a:chOff x="0" y="0"/>
+          <a:chExt cx="0" cy="0"/>
+        </a:xfrm>
+      </p:grpSpPr>
+      <p:sp>
+        <p:nvSpPr>
+          <p:cNvPr id="2" name="ชื่อเรื่อง 1">
+            <a:extLst>
+              <a:ext uri="{FF2B5EF4-FFF2-40B4-BE49-F238E27FC236}">
+                <a16:creationId xmlns:a16="http://schemas.microsoft.com/office/drawing/2014/main" id="{19619FC0-7754-4C5E-BA8D-A2E3B887F639}"/>
+              </a:ext>
+            </a:extLst>
+          </p:cNvPr>
+          <p:cNvSpPr>
+            <a:spLocks noGrp="1"/>
+          </p:cNvSpPr>
+          <p:nvPr>
+            <p:ph type="title"/>
+          </p:nvPr>
+        </p:nvSpPr>
+        <p:spPr/>
+        <p:txBody>
+          <a:bodyPr/>
+          <a:lstStyle/>
+          <a:p>
+            <a:r>
+              <a:rPr lang="en-US" dirty="0"/>
+              <a:t>4. Class</a:t>
+            </a:r>
+          </a:p>
+        </p:txBody>
+      </p:sp>
+    </p:spTree>
+    <p:extLst>
+      <p:ext uri="{BB962C8B-B14F-4D97-AF65-F5344CB8AC3E}">
+        <p14:creationId xmlns:p14="http://schemas.microsoft.com/office/powerpoint/2010/main" val="2672561326"/>
+      </p:ext>
+    </p:extLst>
+  </p:cSld>
+  <p:clrMapOvr>
+    <a:masterClrMapping/>
+  </p:clrMapOvr>
+  <mc:AlternateContent xmlns:mc="http://schemas.openxmlformats.org/markup-compatibility/2006" xmlns:p14="http://schemas.microsoft.com/office/powerpoint/2010/main">
+    <mc:Choice Requires="p14">
+      <p:transition spd="med" p14:dur="700">
+        <p:fade/>
+      </p:transition>
+    </mc:Choice>
+    <mc:Fallback xmlns="">
+      <p:transition spd="med">
+        <p:fade/>
+      </p:transition>
+    </mc:Fallback>
+  </mc:AlternateContent>
+</p:sld>
+</file>
+
+<file path=ppt/slides/slide31.xml><?xml version="1.0" encoding="utf-8"?>
+<p:sld xmlns:a="http://schemas.openxmlformats.org/drawingml/2006/main" xmlns:r="http://schemas.openxmlformats.org/officeDocument/2006/relationships" xmlns:p="http://schemas.openxmlformats.org/presentationml/2006/main">
+  <p:cSld>
+    <p:spTree>
+      <p:nvGrpSpPr>
+        <p:cNvPr id="1" name=""/>
+        <p:cNvGrpSpPr/>
+        <p:nvPr/>
+      </p:nvGrpSpPr>
+      <p:grpSpPr>
+        <a:xfrm>
+          <a:off x="0" y="0"/>
+          <a:ext cx="0" cy="0"/>
+          <a:chOff x="0" y="0"/>
+          <a:chExt cx="0" cy="0"/>
+        </a:xfrm>
+      </p:grpSpPr>
+      <p:sp>
+        <p:nvSpPr>
+          <p:cNvPr id="2" name="ชื่อเรื่อง 1">
+            <a:extLst>
+              <a:ext uri="{FF2B5EF4-FFF2-40B4-BE49-F238E27FC236}">
+                <a16:creationId xmlns:a16="http://schemas.microsoft.com/office/drawing/2014/main" id="{04FF7495-40F9-458A-8514-0D9C3056EE52}"/>
+              </a:ext>
+            </a:extLst>
+          </p:cNvPr>
+          <p:cNvSpPr>
+            <a:spLocks noGrp="1"/>
+          </p:cNvSpPr>
+          <p:nvPr>
+            <p:ph type="title"/>
+          </p:nvPr>
+        </p:nvSpPr>
+        <p:spPr/>
+        <p:txBody>
+          <a:bodyPr/>
+          <a:lstStyle/>
+          <a:p>
+            <a:r>
+              <a:rPr lang="en-US" dirty="0"/>
+              <a:t>5. Import export modules </a:t>
+            </a:r>
+            <a:r>
+              <a:rPr lang="th-TH" dirty="0" err="1"/>
+              <a:t>ทำไง</a:t>
+            </a:r>
+            <a:r>
+              <a:rPr lang="th-TH" dirty="0"/>
+              <a:t>ดี</a:t>
+            </a:r>
+            <a:endParaRPr lang="en-US" dirty="0"/>
+          </a:p>
+        </p:txBody>
+      </p:sp>
+    </p:spTree>
+    <p:extLst>
+      <p:ext uri="{BB962C8B-B14F-4D97-AF65-F5344CB8AC3E}">
+        <p14:creationId xmlns:p14="http://schemas.microsoft.com/office/powerpoint/2010/main" val="2475956886"/>
+      </p:ext>
+    </p:extLst>
+  </p:cSld>
+  <p:clrMapOvr>
+    <a:masterClrMapping/>
+  </p:clrMapOvr>
+  <mc:AlternateContent xmlns:mc="http://schemas.openxmlformats.org/markup-compatibility/2006" xmlns:p14="http://schemas.microsoft.com/office/powerpoint/2010/main">
+    <mc:Choice Requires="p14">
+      <p:transition spd="med" p14:dur="700">
+        <p:fade/>
+      </p:transition>
+    </mc:Choice>
+    <mc:Fallback xmlns="">
+      <p:transition spd="med">
+        <p:fade/>
+      </p:transition>
+    </mc:Fallback>
+  </mc:AlternateContent>
+</p:sld>
+</file>
+
+<file path=ppt/slides/slide32.xml><?xml version="1.0" encoding="utf-8"?>
+<p:sld xmlns:a="http://schemas.openxmlformats.org/drawingml/2006/main" xmlns:r="http://schemas.openxmlformats.org/officeDocument/2006/relationships" xmlns:p="http://schemas.openxmlformats.org/presentationml/2006/main">
+  <p:cSld>
+    <p:spTree>
+      <p:nvGrpSpPr>
+        <p:cNvPr id="1" name=""/>
+        <p:cNvGrpSpPr/>
+        <p:nvPr/>
+      </p:nvGrpSpPr>
+      <p:grpSpPr>
+        <a:xfrm>
+          <a:off x="0" y="0"/>
+          <a:ext cx="0" cy="0"/>
+          <a:chOff x="0" y="0"/>
+          <a:chExt cx="0" cy="0"/>
+        </a:xfrm>
+      </p:grpSpPr>
+      <p:pic>
+        <p:nvPicPr>
+          <p:cNvPr id="4" name="กราฟิก 3" descr="หนังสือที่เปิดอยู่">
+            <a:extLst>
+              <a:ext uri="{FF2B5EF4-FFF2-40B4-BE49-F238E27FC236}">
+                <a16:creationId xmlns:a16="http://schemas.microsoft.com/office/drawing/2014/main" id="{4BB3C191-56F3-4733-94BB-72EB31650E38}"/>
+              </a:ext>
+            </a:extLst>
+          </p:cNvPr>
+          <p:cNvPicPr>
+            <a:picLocks noChangeAspect="1"/>
+          </p:cNvPicPr>
+          <p:nvPr/>
+        </p:nvPicPr>
+        <p:blipFill>
+          <a:blip r:embed="rId2">
+            <a:extLst>
+              <a:ext uri="{28A0092B-C50C-407E-A947-70E740481C1C}">
+                <a14:useLocalDpi xmlns:a14="http://schemas.microsoft.com/office/drawing/2010/main" val="0"/>
+              </a:ext>
+              <a:ext uri="{96DAC541-7B7A-43D3-8B79-37D633B846F1}">
+                <asvg:svgBlip xmlns:asvg="http://schemas.microsoft.com/office/drawing/2016/SVG/main" r:embed="rId3"/>
+              </a:ext>
+            </a:extLst>
+          </a:blip>
+          <a:stretch>
+            <a:fillRect/>
+          </a:stretch>
+        </p:blipFill>
+        <p:spPr>
+          <a:xfrm>
+            <a:off x="4294212" y="476672"/>
+            <a:ext cx="3600400" cy="3600400"/>
+          </a:xfrm>
+          <a:prstGeom prst="rect">
+            <a:avLst/>
+          </a:prstGeom>
+        </p:spPr>
+      </p:pic>
+      <p:sp>
+        <p:nvSpPr>
+          <p:cNvPr id="5" name="กล่องข้อความ 4">
+            <a:extLst>
+              <a:ext uri="{FF2B5EF4-FFF2-40B4-BE49-F238E27FC236}">
+                <a16:creationId xmlns:a16="http://schemas.microsoft.com/office/drawing/2014/main" id="{2285EDBA-79D7-41C4-972C-261406B0AF7A}"/>
+              </a:ext>
+            </a:extLst>
+          </p:cNvPr>
+          <p:cNvSpPr txBox="1"/>
+          <p:nvPr/>
+        </p:nvSpPr>
+        <p:spPr>
+          <a:xfrm>
+            <a:off x="1665920" y="4437112"/>
+            <a:ext cx="8856984" cy="1200329"/>
+          </a:xfrm>
+          <a:prstGeom prst="rect">
+            <a:avLst/>
+          </a:prstGeom>
+          <a:noFill/>
+        </p:spPr>
+        <p:txBody>
+          <a:bodyPr wrap="square" rtlCol="0">
+            <a:spAutoFit/>
+          </a:bodyPr>
+          <a:lstStyle/>
+          <a:p>
+            <a:pPr algn="ctr"/>
+            <a:r>
+              <a:rPr lang="en-US" sz="7200" spc="600" dirty="0"/>
+              <a:t>Lab://004</a:t>
+            </a:r>
+          </a:p>
+        </p:txBody>
+      </p:sp>
+    </p:spTree>
+    <p:extLst>
+      <p:ext uri="{BB962C8B-B14F-4D97-AF65-F5344CB8AC3E}">
+        <p14:creationId xmlns:p14="http://schemas.microsoft.com/office/powerpoint/2010/main" val="424010668"/>
+      </p:ext>
+    </p:extLst>
+  </p:cSld>
+  <p:clrMapOvr>
+    <a:masterClrMapping/>
+  </p:clrMapOvr>
+  <mc:AlternateContent xmlns:mc="http://schemas.openxmlformats.org/markup-compatibility/2006" xmlns:p14="http://schemas.microsoft.com/office/powerpoint/2010/main">
+    <mc:Choice Requires="p14">
+      <p:transition spd="med" p14:dur="700">
+        <p:fade/>
+      </p:transition>
+    </mc:Choice>
+    <mc:Fallback xmlns="">
+      <p:transition spd="med">
+        <p:fade/>
+      </p:transition>
+    </mc:Fallback>
+  </mc:AlternateContent>
+</p:sld>
+</file>
+
+<file path=ppt/slides/slide33.xml><?xml version="1.0" encoding="utf-8"?>
+<p:sld xmlns:a="http://schemas.openxmlformats.org/drawingml/2006/main" xmlns:r="http://schemas.openxmlformats.org/officeDocument/2006/relationships" xmlns:p="http://schemas.openxmlformats.org/presentationml/2006/main">
+  <p:cSld>
+    <p:spTree>
+      <p:nvGrpSpPr>
+        <p:cNvPr id="1" name=""/>
+        <p:cNvGrpSpPr/>
+        <p:nvPr/>
+      </p:nvGrpSpPr>
+      <p:grpSpPr>
+        <a:xfrm>
+          <a:off x="0" y="0"/>
+          <a:ext cx="0" cy="0"/>
+          <a:chOff x="0" y="0"/>
+          <a:chExt cx="0" cy="0"/>
+        </a:xfrm>
+      </p:grpSpPr>
+      <p:pic>
+        <p:nvPicPr>
+          <p:cNvPr id="6" name="Picture 8" descr="à¸£à¸¹à¸à¸ à¸²à¸à¸à¸µà¹à¹à¸à¸µà¹à¸¢à¸§à¸à¹à¸­à¸">
+            <a:extLst>
+              <a:ext uri="{FF2B5EF4-FFF2-40B4-BE49-F238E27FC236}">
+                <a16:creationId xmlns:a16="http://schemas.microsoft.com/office/drawing/2014/main" id="{F0B191A0-3B66-4730-BB65-9BC2F8FDCAD0}"/>
+              </a:ext>
+            </a:extLst>
+          </p:cNvPr>
+          <p:cNvPicPr>
+            <a:picLocks noChangeAspect="1" noChangeArrowheads="1"/>
+          </p:cNvPicPr>
+          <p:nvPr/>
+        </p:nvPicPr>
+        <p:blipFill>
+          <a:blip r:embed="rId2" cstate="print">
+            <a:extLst>
+              <a:ext uri="{28A0092B-C50C-407E-A947-70E740481C1C}">
+                <a14:useLocalDpi xmlns:a14="http://schemas.microsoft.com/office/drawing/2010/main" val="0"/>
+              </a:ext>
+            </a:extLst>
+          </a:blip>
+          <a:srcRect/>
+          <a:stretch>
+            <a:fillRect/>
+          </a:stretch>
+        </p:blipFill>
+        <p:spPr bwMode="auto">
+          <a:xfrm rot="19797213">
+            <a:off x="3541437" y="804018"/>
+            <a:ext cx="4932326" cy="4932326"/>
+          </a:xfrm>
+          <a:prstGeom prst="rect">
+            <a:avLst/>
+          </a:prstGeom>
+          <a:noFill/>
+          <a:extLst>
+            <a:ext uri="{909E8E84-426E-40DD-AFC4-6F175D3DCCD1}">
+              <a14:hiddenFill xmlns:a14="http://schemas.microsoft.com/office/drawing/2010/main">
+                <a:solidFill>
+                  <a:srgbClr val="FFFFFF"/>
+                </a:solidFill>
+              </a14:hiddenFill>
+            </a:ext>
+          </a:extLst>
+        </p:spPr>
+      </p:pic>
+      <p:sp>
+        <p:nvSpPr>
+          <p:cNvPr id="2" name="สี่เหลี่ยมผืนผ้า 1">
+            <a:extLst>
+              <a:ext uri="{FF2B5EF4-FFF2-40B4-BE49-F238E27FC236}">
+                <a16:creationId xmlns:a16="http://schemas.microsoft.com/office/drawing/2014/main" id="{4F6F686D-CE5F-46F5-8AD7-4A4CB2B10647}"/>
+              </a:ext>
+            </a:extLst>
+          </p:cNvPr>
+          <p:cNvSpPr/>
+          <p:nvPr/>
+        </p:nvSpPr>
+        <p:spPr>
+          <a:xfrm>
+            <a:off x="1989956" y="1340768"/>
+            <a:ext cx="1497205" cy="461665"/>
+          </a:xfrm>
+          <a:prstGeom prst="rect">
+            <a:avLst/>
+          </a:prstGeom>
+        </p:spPr>
+        <p:txBody>
+          <a:bodyPr wrap="none">
+            <a:spAutoFit/>
+          </a:bodyPr>
+          <a:lstStyle/>
+          <a:p>
+            <a:r>
+              <a:rPr lang="en-US" dirty="0" err="1"/>
+              <a:t>transpilers</a:t>
+            </a:r>
+            <a:endParaRPr lang="en-US" dirty="0"/>
+          </a:p>
+        </p:txBody>
+      </p:sp>
+      <p:sp>
+        <p:nvSpPr>
+          <p:cNvPr id="3" name="สี่เหลี่ยมผืนผ้า 2">
+            <a:extLst>
+              <a:ext uri="{FF2B5EF4-FFF2-40B4-BE49-F238E27FC236}">
+                <a16:creationId xmlns:a16="http://schemas.microsoft.com/office/drawing/2014/main" id="{7D35CA19-17BB-42B0-BEFE-2B52E2471511}"/>
+              </a:ext>
+            </a:extLst>
+          </p:cNvPr>
+          <p:cNvSpPr/>
+          <p:nvPr/>
+        </p:nvSpPr>
+        <p:spPr>
+          <a:xfrm>
+            <a:off x="8864115" y="4293096"/>
+            <a:ext cx="1026115" cy="461665"/>
+          </a:xfrm>
+          <a:prstGeom prst="rect">
+            <a:avLst/>
+          </a:prstGeom>
+        </p:spPr>
+        <p:txBody>
+          <a:bodyPr wrap="none">
+            <a:spAutoFit/>
+          </a:bodyPr>
+          <a:lstStyle/>
+          <a:p>
+            <a:r>
+              <a:rPr lang="en-US" dirty="0" err="1"/>
+              <a:t>polyfill</a:t>
+            </a:r>
+            <a:endParaRPr lang="en-US" dirty="0"/>
+          </a:p>
+        </p:txBody>
+      </p:sp>
+    </p:spTree>
+    <p:extLst>
+      <p:ext uri="{BB962C8B-B14F-4D97-AF65-F5344CB8AC3E}">
+        <p14:creationId xmlns:p14="http://schemas.microsoft.com/office/powerpoint/2010/main" val="3289215531"/>
+      </p:ext>
+    </p:extLst>
+  </p:cSld>
+  <p:clrMapOvr>
+    <a:masterClrMapping/>
+  </p:clrMapOvr>
+  <mc:AlternateContent xmlns:mc="http://schemas.openxmlformats.org/markup-compatibility/2006" xmlns:p14="http://schemas.microsoft.com/office/powerpoint/2010/main">
+    <mc:Choice Requires="p14">
+      <p:transition spd="med" p14:dur="700">
+        <p:fade/>
+      </p:transition>
+    </mc:Choice>
+    <mc:Fallback xmlns="">
+      <p:transition spd="med">
+        <p:fade/>
+      </p:transition>
+    </mc:Fallback>
+  </mc:AlternateContent>
+</p:sld>
+</file>
+
+<file path=ppt/slides/slide34.xml><?xml version="1.0" encoding="utf-8"?>
+<p:sld xmlns:a="http://schemas.openxmlformats.org/drawingml/2006/main" xmlns:r="http://schemas.openxmlformats.org/officeDocument/2006/relationships" xmlns:p="http://schemas.openxmlformats.org/presentationml/2006/main">
+  <p:cSld>
+    <p:spTree>
+      <p:nvGrpSpPr>
+        <p:cNvPr id="1" name=""/>
+        <p:cNvGrpSpPr/>
+        <p:nvPr/>
+      </p:nvGrpSpPr>
+      <p:grpSpPr>
+        <a:xfrm>
+          <a:off x="0" y="0"/>
+          <a:ext cx="0" cy="0"/>
+          <a:chOff x="0" y="0"/>
+          <a:chExt cx="0" cy="0"/>
+        </a:xfrm>
+      </p:grpSpPr>
+      <p:sp>
+        <p:nvSpPr>
+          <p:cNvPr id="2" name="ชื่อเรื่อง 1">
+            <a:extLst>
+              <a:ext uri="{FF2B5EF4-FFF2-40B4-BE49-F238E27FC236}">
+                <a16:creationId xmlns:a16="http://schemas.microsoft.com/office/drawing/2014/main" id="{69F5D888-2C37-4C84-8853-F9DA276E5966}"/>
+              </a:ext>
+            </a:extLst>
+          </p:cNvPr>
+          <p:cNvSpPr>
+            <a:spLocks noGrp="1"/>
+          </p:cNvSpPr>
+          <p:nvPr>
+            <p:ph type="title"/>
+          </p:nvPr>
+        </p:nvSpPr>
+        <p:spPr>
+          <a:xfrm>
+            <a:off x="1197868" y="260648"/>
+            <a:ext cx="10360501" cy="589880"/>
+          </a:xfrm>
+        </p:spPr>
+        <p:txBody>
+          <a:bodyPr>
+            <a:normAutofit fontScale="90000"/>
+          </a:bodyPr>
+          <a:lstStyle/>
+          <a:p>
+            <a:r>
+              <a:rPr lang="en-US" dirty="0"/>
+              <a:t>Installation with </a:t>
+            </a:r>
+            <a:r>
+              <a:rPr lang="en-US" dirty="0" err="1"/>
+              <a:t>npm</a:t>
+            </a:r>
+            <a:r>
+              <a:rPr lang="en-US" dirty="0"/>
+              <a:t> </a:t>
+            </a:r>
+            <a:r>
+              <a:rPr lang="th-TH" dirty="0"/>
+              <a:t>นะ</a:t>
+            </a:r>
+            <a:endParaRPr lang="en-US" dirty="0"/>
+          </a:p>
+        </p:txBody>
+      </p:sp>
+      <p:pic>
+        <p:nvPicPr>
+          <p:cNvPr id="4" name="Picture 5" descr="à¸à¸¥à¸à¸²à¸£à¸à¹à¸à¸«à¸²à¸£à¸¹à¸à¸ à¸²à¸à¸ªà¸³à¸«à¸£à¸±à¸ terminal icon">
+            <a:extLst>
+              <a:ext uri="{FF2B5EF4-FFF2-40B4-BE49-F238E27FC236}">
+                <a16:creationId xmlns:a16="http://schemas.microsoft.com/office/drawing/2014/main" id="{C68BA091-6F78-4F08-8B42-76B7A880C2B1}"/>
+              </a:ext>
+            </a:extLst>
+          </p:cNvPr>
+          <p:cNvPicPr>
+            <a:picLocks noChangeAspect="1" noChangeArrowheads="1"/>
+          </p:cNvPicPr>
+          <p:nvPr/>
+        </p:nvPicPr>
+        <p:blipFill>
+          <a:blip r:embed="rId2">
+            <a:extLst>
+              <a:ext uri="{28A0092B-C50C-407E-A947-70E740481C1C}">
+                <a14:useLocalDpi xmlns:a14="http://schemas.microsoft.com/office/drawing/2010/main" val="0"/>
+              </a:ext>
+            </a:extLst>
+          </a:blip>
+          <a:srcRect/>
+          <a:stretch>
+            <a:fillRect/>
+          </a:stretch>
+        </p:blipFill>
+        <p:spPr bwMode="auto">
+          <a:xfrm>
+            <a:off x="1053852" y="404664"/>
+            <a:ext cx="6696744" cy="6696744"/>
+          </a:xfrm>
+          <a:prstGeom prst="rect">
+            <a:avLst/>
+          </a:prstGeom>
+          <a:noFill/>
+          <a:extLst>
+            <a:ext uri="{909E8E84-426E-40DD-AFC4-6F175D3DCCD1}">
+              <a14:hiddenFill xmlns:a14="http://schemas.microsoft.com/office/drawing/2010/main">
+                <a:solidFill>
+                  <a:srgbClr val="FFFFFF"/>
+                </a:solidFill>
+              </a14:hiddenFill>
+            </a:ext>
+          </a:extLst>
+        </p:spPr>
+      </p:pic>
+    </p:spTree>
+    <p:extLst>
+      <p:ext uri="{BB962C8B-B14F-4D97-AF65-F5344CB8AC3E}">
+        <p14:creationId xmlns:p14="http://schemas.microsoft.com/office/powerpoint/2010/main" val="1380420001"/>
       </p:ext>
     </p:extLst>
   </p:cSld>
@@ -8145,7 +10441,7 @@
           <p:cNvPr id="6" name="กล่องข้อความ 5">
             <a:extLst>
               <a:ext uri="{FF2B5EF4-FFF2-40B4-BE49-F238E27FC236}">
-                <a16:creationId xmlns:a16="http://schemas.microsoft.com/office/drawing/2014/main" xmlns="" id="{9E065666-30B1-4AD1-9ABE-8987D18AC228}"/>
+                <a16:creationId xmlns:a16="http://schemas.microsoft.com/office/drawing/2014/main" id="{9E065666-30B1-4AD1-9ABE-8987D18AC228}"/>
               </a:ext>
             </a:extLst>
           </p:cNvPr>
@@ -8249,7 +10545,7 @@
           <p:cNvPr id="2" name="ชื่อเรื่อง 1">
             <a:extLst>
               <a:ext uri="{FF2B5EF4-FFF2-40B4-BE49-F238E27FC236}">
-                <a16:creationId xmlns:a16="http://schemas.microsoft.com/office/drawing/2014/main" xmlns="" id="{71E999A3-A3EA-4D1E-A642-76C8AF755FBC}"/>
+                <a16:creationId xmlns:a16="http://schemas.microsoft.com/office/drawing/2014/main" id="{71E999A3-A3EA-4D1E-A642-76C8AF755FBC}"/>
               </a:ext>
             </a:extLst>
           </p:cNvPr>
@@ -8285,7 +10581,7 @@
             <a:hlinkClick r:id="rId2"/>
             <a:extLst>
               <a:ext uri="{FF2B5EF4-FFF2-40B4-BE49-F238E27FC236}">
-                <a16:creationId xmlns:a16="http://schemas.microsoft.com/office/drawing/2014/main" xmlns="" id="{9FBBDCA7-99D7-438D-B898-3144067D86B8}"/>
+                <a16:creationId xmlns:a16="http://schemas.microsoft.com/office/drawing/2014/main" id="{9FBBDCA7-99D7-438D-B898-3144067D86B8}"/>
               </a:ext>
             </a:extLst>
           </p:cNvPr>
@@ -8320,7 +10616,7 @@
             <a:hlinkClick r:id="rId3"/>
             <a:extLst>
               <a:ext uri="{FF2B5EF4-FFF2-40B4-BE49-F238E27FC236}">
-                <a16:creationId xmlns:a16="http://schemas.microsoft.com/office/drawing/2014/main" xmlns="" id="{8982F81D-61A2-4104-80AB-23F9AA78EC74}"/>
+                <a16:creationId xmlns:a16="http://schemas.microsoft.com/office/drawing/2014/main" id="{8982F81D-61A2-4104-80AB-23F9AA78EC74}"/>
               </a:ext>
             </a:extLst>
           </p:cNvPr>
@@ -8392,7 +10688,7 @@
           <p:cNvPr id="2" name="Picture 5" descr="à¸à¸¥à¸à¸²à¸£à¸à¹à¸à¸«à¸²à¸£à¸¹à¸à¸ à¸²à¸à¸ªà¸³à¸«à¸£à¸±à¸ terminal icon">
             <a:extLst>
               <a:ext uri="{FF2B5EF4-FFF2-40B4-BE49-F238E27FC236}">
-                <a16:creationId xmlns:a16="http://schemas.microsoft.com/office/drawing/2014/main" xmlns="" id="{D853DDB3-659B-4A1B-8C52-CEBDEAFE07A1}"/>
+                <a16:creationId xmlns:a16="http://schemas.microsoft.com/office/drawing/2014/main" id="{D853DDB3-659B-4A1B-8C52-CEBDEAFE07A1}"/>
               </a:ext>
             </a:extLst>
           </p:cNvPr>
@@ -8439,7 +10735,7 @@
           <p:cNvPr id="3" name="สี่เหลี่ยมผืนผ้า 2">
             <a:extLst>
               <a:ext uri="{FF2B5EF4-FFF2-40B4-BE49-F238E27FC236}">
-                <a16:creationId xmlns:a16="http://schemas.microsoft.com/office/drawing/2014/main" xmlns="" id="{6E78968F-F046-4B8D-BD90-A00B08B9B1E9}"/>
+                <a16:creationId xmlns:a16="http://schemas.microsoft.com/office/drawing/2014/main" id="{6E78968F-F046-4B8D-BD90-A00B08B9B1E9}"/>
               </a:ext>
             </a:extLst>
           </p:cNvPr>
@@ -8486,7 +10782,7 @@
           <p:cNvPr id="4" name="สี่เหลี่ยมผืนผ้า 3">
             <a:extLst>
               <a:ext uri="{FF2B5EF4-FFF2-40B4-BE49-F238E27FC236}">
-                <a16:creationId xmlns:a16="http://schemas.microsoft.com/office/drawing/2014/main" xmlns="" id="{90063099-E64F-4F82-9097-B405BB8AFEE7}"/>
+                <a16:creationId xmlns:a16="http://schemas.microsoft.com/office/drawing/2014/main" id="{90063099-E64F-4F82-9097-B405BB8AFEE7}"/>
               </a:ext>
             </a:extLst>
           </p:cNvPr>
@@ -8635,7 +10931,7 @@
           <p:cNvPr id="5" name="สี่เหลี่ยมผืนผ้า 4">
             <a:extLst>
               <a:ext uri="{FF2B5EF4-FFF2-40B4-BE49-F238E27FC236}">
-                <a16:creationId xmlns:a16="http://schemas.microsoft.com/office/drawing/2014/main" xmlns="" id="{603BAC18-131C-4410-A924-191C810B906E}"/>
+                <a16:creationId xmlns:a16="http://schemas.microsoft.com/office/drawing/2014/main" id="{603BAC18-131C-4410-A924-191C810B906E}"/>
               </a:ext>
             </a:extLst>
           </p:cNvPr>
@@ -8740,15 +11036,6 @@
             </a:r>
           </a:p>
           <a:p>
-            <a:r>
-              <a:rPr lang="en-US" sz="1800" dirty="0">
-                <a:solidFill>
-                  <a:srgbClr val="B2CACD"/>
-                </a:solidFill>
-                <a:latin typeface="Fira Code" panose="020B0509050000020004" pitchFamily="49" charset="0"/>
-              </a:rPr>
-              <a:t/>
-            </a:r>
             <a:br>
               <a:rPr lang="en-US" sz="1800" dirty="0">
                 <a:solidFill>
@@ -8869,15 +11156,6 @@
             </a:r>
           </a:p>
           <a:p>
-            <a:r>
-              <a:rPr lang="en-US" sz="1800" dirty="0">
-                <a:solidFill>
-                  <a:srgbClr val="B2CACD"/>
-                </a:solidFill>
-                <a:latin typeface="Fira Code" panose="020B0509050000020004" pitchFamily="49" charset="0"/>
-              </a:rPr>
-              <a:t/>
-            </a:r>
             <a:br>
               <a:rPr lang="en-US" sz="1800" dirty="0">
                 <a:solidFill>
@@ -9265,15 +11543,6 @@
             </a:r>
           </a:p>
           <a:p>
-            <a:r>
-              <a:rPr lang="en-US" sz="1800" dirty="0">
-                <a:solidFill>
-                  <a:srgbClr val="B2CACD"/>
-                </a:solidFill>
-                <a:latin typeface="Fira Code" panose="020B0509050000020004" pitchFamily="49" charset="0"/>
-              </a:rPr>
-              <a:t/>
-            </a:r>
             <a:br>
               <a:rPr lang="en-US" sz="1800" dirty="0">
                 <a:solidFill>
@@ -9535,7 +11804,7 @@
           <p:cNvPr id="9" name="Picture 5" descr="à¸à¸¥à¸à¸²à¸£à¸à¹à¸à¸«à¸²à¸£à¸¹à¸à¸ à¸²à¸à¸ªà¸³à¸«à¸£à¸±à¸ terminal icon">
             <a:extLst>
               <a:ext uri="{FF2B5EF4-FFF2-40B4-BE49-F238E27FC236}">
-                <a16:creationId xmlns:a16="http://schemas.microsoft.com/office/drawing/2014/main" xmlns="" id="{6E349DED-16D2-4050-886C-52FE3805F204}"/>
+                <a16:creationId xmlns:a16="http://schemas.microsoft.com/office/drawing/2014/main" id="{6E349DED-16D2-4050-886C-52FE3805F204}"/>
               </a:ext>
             </a:extLst>
           </p:cNvPr>
@@ -9705,7 +11974,7 @@
           <p:cNvPr id="4" name="กราฟิก 3" descr="หนังสือที่เปิดอยู่">
             <a:extLst>
               <a:ext uri="{FF2B5EF4-FFF2-40B4-BE49-F238E27FC236}">
-                <a16:creationId xmlns:a16="http://schemas.microsoft.com/office/drawing/2014/main" xmlns="" id="{4BB3C191-56F3-4733-94BB-72EB31650E38}"/>
+                <a16:creationId xmlns:a16="http://schemas.microsoft.com/office/drawing/2014/main" id="{4BB3C191-56F3-4733-94BB-72EB31650E38}"/>
               </a:ext>
             </a:extLst>
           </p:cNvPr>
@@ -9721,7 +11990,7 @@
                 <a14:useLocalDpi xmlns:a14="http://schemas.microsoft.com/office/drawing/2010/main" val="0"/>
               </a:ext>
               <a:ext uri="{96DAC541-7B7A-43D3-8B79-37D633B846F1}">
-                <asvg:svgBlip xmlns:asvg="http://schemas.microsoft.com/office/drawing/2016/SVG/main" xmlns="" r:embed="rId3"/>
+                <asvg:svgBlip xmlns:asvg="http://schemas.microsoft.com/office/drawing/2016/SVG/main" r:embed="rId3"/>
               </a:ext>
             </a:extLst>
           </a:blip>
@@ -9744,7 +12013,7 @@
           <p:cNvPr id="5" name="กล่องข้อความ 4">
             <a:extLst>
               <a:ext uri="{FF2B5EF4-FFF2-40B4-BE49-F238E27FC236}">
-                <a16:creationId xmlns:a16="http://schemas.microsoft.com/office/drawing/2014/main" xmlns="" id="{2285EDBA-79D7-41C4-972C-261406B0AF7A}"/>
+                <a16:creationId xmlns:a16="http://schemas.microsoft.com/office/drawing/2014/main" id="{2285EDBA-79D7-41C4-972C-261406B0AF7A}"/>
               </a:ext>
             </a:extLst>
           </p:cNvPr>
@@ -9822,7 +12091,7 @@
           <p:cNvPr id="4098" name="Picture 2" descr="à¸à¸¥à¸à¸²à¸£à¸à¹à¸à¸«à¸²à¸£à¸¹à¸à¸ à¸²à¸à¸ªà¸³à¸«à¸£à¸±à¸ npm logo">
             <a:extLst>
               <a:ext uri="{FF2B5EF4-FFF2-40B4-BE49-F238E27FC236}">
-                <a16:creationId xmlns:a16="http://schemas.microsoft.com/office/drawing/2014/main" xmlns="" id="{A46E512A-A331-472B-8AED-55869CAE4316}"/>
+                <a16:creationId xmlns:a16="http://schemas.microsoft.com/office/drawing/2014/main" id="{A46E512A-A331-472B-8AED-55869CAE4316}"/>
               </a:ext>
             </a:extLst>
           </p:cNvPr>
@@ -9869,7 +12138,7 @@
           <p:cNvPr id="4" name="สี่เหลี่ยมผืนผ้า 3">
             <a:extLst>
               <a:ext uri="{FF2B5EF4-FFF2-40B4-BE49-F238E27FC236}">
-                <a16:creationId xmlns:a16="http://schemas.microsoft.com/office/drawing/2014/main" xmlns="" id="{F32BC8C0-4FC5-4BE8-955A-101855364E8B}"/>
+                <a16:creationId xmlns:a16="http://schemas.microsoft.com/office/drawing/2014/main" id="{F32BC8C0-4FC5-4BE8-955A-101855364E8B}"/>
               </a:ext>
             </a:extLst>
           </p:cNvPr>
@@ -10906,142 +13175,6 @@
 </file>
 
 <file path=customXml/item1.xml><?xml version="1.0" encoding="utf-8"?>
-<p:properties xmlns:p="http://schemas.microsoft.com/office/2006/metadata/properties" xmlns:xsi="http://www.w3.org/2001/XMLSchema-instance" xmlns:pc="http://schemas.microsoft.com/office/infopath/2007/PartnerControls">
-  <documentManagement>
-    <LocPublishedLinkedAssetsLookup xmlns="4873beb7-5857-4685-be1f-d57550cc96cc" xsi:nil="true"/>
-    <ApprovalStatus xmlns="4873beb7-5857-4685-be1f-d57550cc96cc">InProgress</ApprovalStatus>
-    <MarketSpecific xmlns="4873beb7-5857-4685-be1f-d57550cc96cc">false</MarketSpecific>
-    <LocComments xmlns="4873beb7-5857-4685-be1f-d57550cc96cc" xsi:nil="true"/>
-    <LocLastLocAttemptVersionTypeLookup xmlns="4873beb7-5857-4685-be1f-d57550cc96cc" xsi:nil="true"/>
-    <DirectSourceMarket xmlns="4873beb7-5857-4685-be1f-d57550cc96cc" xsi:nil="true"/>
-    <ThumbnailAssetId xmlns="4873beb7-5857-4685-be1f-d57550cc96cc" xsi:nil="true"/>
-    <PrimaryImageGen xmlns="4873beb7-5857-4685-be1f-d57550cc96cc">false</PrimaryImageGen>
-    <LocNewPublishedVersionLookup xmlns="4873beb7-5857-4685-be1f-d57550cc96cc" xsi:nil="true"/>
-    <LegacyData xmlns="4873beb7-5857-4685-be1f-d57550cc96cc" xsi:nil="true"/>
-    <LocRecommendedHandoff xmlns="4873beb7-5857-4685-be1f-d57550cc96cc" xsi:nil="true"/>
-    <BusinessGroup xmlns="4873beb7-5857-4685-be1f-d57550cc96cc" xsi:nil="true"/>
-    <BlockPublish xmlns="4873beb7-5857-4685-be1f-d57550cc96cc">false</BlockPublish>
-    <TPFriendlyName xmlns="4873beb7-5857-4685-be1f-d57550cc96cc" xsi:nil="true"/>
-    <LocOverallPublishStatusLookup xmlns="4873beb7-5857-4685-be1f-d57550cc96cc" xsi:nil="true"/>
-    <NumericId xmlns="4873beb7-5857-4685-be1f-d57550cc96cc" xsi:nil="true"/>
-    <APEditor xmlns="4873beb7-5857-4685-be1f-d57550cc96cc">
-      <UserInfo>
-        <DisplayName/>
-        <AccountId xsi:nil="true"/>
-        <AccountType/>
-      </UserInfo>
-    </APEditor>
-    <SourceTitle xmlns="4873beb7-5857-4685-be1f-d57550cc96cc" xsi:nil="true"/>
-    <OpenTemplate xmlns="4873beb7-5857-4685-be1f-d57550cc96cc">true</OpenTemplate>
-    <LocOverallLocStatusLookup xmlns="4873beb7-5857-4685-be1f-d57550cc96cc" xsi:nil="true"/>
-    <UALocComments xmlns="4873beb7-5857-4685-be1f-d57550cc96cc" xsi:nil="true"/>
-    <ParentAssetId xmlns="4873beb7-5857-4685-be1f-d57550cc96cc" xsi:nil="true"/>
-    <IntlLangReviewDate xmlns="4873beb7-5857-4685-be1f-d57550cc96cc" xsi:nil="true"/>
-    <FeatureTagsTaxHTField0 xmlns="4873beb7-5857-4685-be1f-d57550cc96cc">
-      <Terms xmlns="http://schemas.microsoft.com/office/infopath/2007/PartnerControls"/>
-    </FeatureTagsTaxHTField0>
-    <PublishStatusLookup xmlns="4873beb7-5857-4685-be1f-d57550cc96cc">
-      <Value>1345093</Value>
-    </PublishStatusLookup>
-    <Providers xmlns="4873beb7-5857-4685-be1f-d57550cc96cc" xsi:nil="true"/>
-    <MachineTranslated xmlns="4873beb7-5857-4685-be1f-d57550cc96cc">false</MachineTranslated>
-    <OriginalSourceMarket xmlns="4873beb7-5857-4685-be1f-d57550cc96cc" xsi:nil="true"/>
-    <APDescription xmlns="4873beb7-5857-4685-be1f-d57550cc96cc">This simple template design works for technology and  businesses, but it's versatile enough to use in other contexts.  It features multiple slide layouts designed for widescreen (16x9 resolution) and includes a sample SmartArt list and chart that are easily editable.</APDescription>
-    <ClipArtFilename xmlns="4873beb7-5857-4685-be1f-d57550cc96cc" xsi:nil="true"/>
-    <ContentItem xmlns="4873beb7-5857-4685-be1f-d57550cc96cc" xsi:nil="true"/>
-    <TPInstallLocation xmlns="4873beb7-5857-4685-be1f-d57550cc96cc" xsi:nil="true"/>
-    <PublishTargets xmlns="4873beb7-5857-4685-be1f-d57550cc96cc">OfficeOnlineVNext</PublishTargets>
-    <TimesCloned xmlns="4873beb7-5857-4685-be1f-d57550cc96cc" xsi:nil="true"/>
-    <AssetStart xmlns="4873beb7-5857-4685-be1f-d57550cc96cc">2011-11-26T00:30:00+00:00</AssetStart>
-    <Provider xmlns="4873beb7-5857-4685-be1f-d57550cc96cc" xsi:nil="true"/>
-    <AcquiredFrom xmlns="4873beb7-5857-4685-be1f-d57550cc96cc">Internal MS</AcquiredFrom>
-    <FriendlyTitle xmlns="4873beb7-5857-4685-be1f-d57550cc96cc" xsi:nil="true"/>
-    <LastHandOff xmlns="4873beb7-5857-4685-be1f-d57550cc96cc" xsi:nil="true"/>
-    <TPClientViewer xmlns="4873beb7-5857-4685-be1f-d57550cc96cc" xsi:nil="true"/>
-    <TemplateStatus xmlns="4873beb7-5857-4685-be1f-d57550cc96cc">Complete</TemplateStatus>
-    <Downloads xmlns="4873beb7-5857-4685-be1f-d57550cc96cc">0</Downloads>
-    <OOCacheId xmlns="4873beb7-5857-4685-be1f-d57550cc96cc" xsi:nil="true"/>
-    <IsDeleted xmlns="4873beb7-5857-4685-be1f-d57550cc96cc">false</IsDeleted>
-    <LocPublishedDependentAssetsLookup xmlns="4873beb7-5857-4685-be1f-d57550cc96cc" xsi:nil="true"/>
-    <TPExecutable xmlns="4873beb7-5857-4685-be1f-d57550cc96cc" xsi:nil="true"/>
-    <EditorialTags xmlns="4873beb7-5857-4685-be1f-d57550cc96cc" xsi:nil="true"/>
-    <SubmitterId xmlns="4873beb7-5857-4685-be1f-d57550cc96cc" xsi:nil="true"/>
-    <ApprovalLog xmlns="4873beb7-5857-4685-be1f-d57550cc96cc" xsi:nil="true"/>
-    <AssetType xmlns="4873beb7-5857-4685-be1f-d57550cc96cc">TP</AssetType>
-    <BugNumber xmlns="4873beb7-5857-4685-be1f-d57550cc96cc" xsi:nil="true"/>
-    <CSXSubmissionDate xmlns="4873beb7-5857-4685-be1f-d57550cc96cc" xsi:nil="true"/>
-    <CSXUpdate xmlns="4873beb7-5857-4685-be1f-d57550cc96cc">false</CSXUpdate>
-    <Milestone xmlns="4873beb7-5857-4685-be1f-d57550cc96cc" xsi:nil="true"/>
-    <RecommendationsModifier xmlns="4873beb7-5857-4685-be1f-d57550cc96cc" xsi:nil="true"/>
-    <OriginAsset xmlns="4873beb7-5857-4685-be1f-d57550cc96cc" xsi:nil="true"/>
-    <TPComponent xmlns="4873beb7-5857-4685-be1f-d57550cc96cc" xsi:nil="true"/>
-    <AssetId xmlns="4873beb7-5857-4685-be1f-d57550cc96cc">TP102787989</AssetId>
-    <IntlLocPriority xmlns="4873beb7-5857-4685-be1f-d57550cc96cc" xsi:nil="true"/>
-    <PolicheckWords xmlns="4873beb7-5857-4685-be1f-d57550cc96cc" xsi:nil="true"/>
-    <TPLaunchHelpLink xmlns="4873beb7-5857-4685-be1f-d57550cc96cc" xsi:nil="true"/>
-    <TPApplication xmlns="4873beb7-5857-4685-be1f-d57550cc96cc" xsi:nil="true"/>
-    <CrawlForDependencies xmlns="4873beb7-5857-4685-be1f-d57550cc96cc">false</CrawlForDependencies>
-    <HandoffToMSDN xmlns="4873beb7-5857-4685-be1f-d57550cc96cc" xsi:nil="true"/>
-    <PlannedPubDate xmlns="4873beb7-5857-4685-be1f-d57550cc96cc" xsi:nil="true"/>
-    <IntlLangReviewer xmlns="4873beb7-5857-4685-be1f-d57550cc96cc" xsi:nil="true"/>
-    <TrustLevel xmlns="4873beb7-5857-4685-be1f-d57550cc96cc">1 Microsoft Managed Content</TrustLevel>
-    <LocLastLocAttemptVersionLookup xmlns="4873beb7-5857-4685-be1f-d57550cc96cc">694266</LocLastLocAttemptVersionLookup>
-    <LocProcessedForHandoffsLookup xmlns="4873beb7-5857-4685-be1f-d57550cc96cc" xsi:nil="true"/>
-    <IsSearchable xmlns="4873beb7-5857-4685-be1f-d57550cc96cc">true</IsSearchable>
-    <TemplateTemplateType xmlns="4873beb7-5857-4685-be1f-d57550cc96cc">PowerPoint Presentation Template</TemplateTemplateType>
-    <CampaignTagsTaxHTField0 xmlns="4873beb7-5857-4685-be1f-d57550cc96cc">
-      <Terms xmlns="http://schemas.microsoft.com/office/infopath/2007/PartnerControls"/>
-    </CampaignTagsTaxHTField0>
-    <TPNamespace xmlns="4873beb7-5857-4685-be1f-d57550cc96cc" xsi:nil="true"/>
-    <LocOverallPreviewStatusLookup xmlns="4873beb7-5857-4685-be1f-d57550cc96cc" xsi:nil="true"/>
-    <TaxCatchAll xmlns="4873beb7-5857-4685-be1f-d57550cc96cc"/>
-    <Markets xmlns="4873beb7-5857-4685-be1f-d57550cc96cc"/>
-    <UAProjectedTotalWords xmlns="4873beb7-5857-4685-be1f-d57550cc96cc" xsi:nil="true"/>
-    <IntlLangReview xmlns="4873beb7-5857-4685-be1f-d57550cc96cc" xsi:nil="true"/>
-    <OutputCachingOn xmlns="4873beb7-5857-4685-be1f-d57550cc96cc">false</OutputCachingOn>
-    <AverageRating xmlns="4873beb7-5857-4685-be1f-d57550cc96cc" xsi:nil="true"/>
-    <APAuthor xmlns="4873beb7-5857-4685-be1f-d57550cc96cc">
-      <UserInfo>
-        <DisplayName>REDMOND\kristaa</DisplayName>
-        <AccountId>136</AccountId>
-        <AccountType/>
-      </UserInfo>
-    </APAuthor>
-    <LocManualTestRequired xmlns="4873beb7-5857-4685-be1f-d57550cc96cc">false</LocManualTestRequired>
-    <TPCommandLine xmlns="4873beb7-5857-4685-be1f-d57550cc96cc" xsi:nil="true"/>
-    <TPAppVersion xmlns="4873beb7-5857-4685-be1f-d57550cc96cc" xsi:nil="true"/>
-    <EditorialStatus xmlns="4873beb7-5857-4685-be1f-d57550cc96cc">Complete</EditorialStatus>
-    <LastModifiedDateTime xmlns="4873beb7-5857-4685-be1f-d57550cc96cc" xsi:nil="true"/>
-    <ScenarioTagsTaxHTField0 xmlns="4873beb7-5857-4685-be1f-d57550cc96cc">
-      <Terms xmlns="http://schemas.microsoft.com/office/infopath/2007/PartnerControls"/>
-    </ScenarioTagsTaxHTField0>
-    <LocProcessedForMarketsLookup xmlns="4873beb7-5857-4685-be1f-d57550cc96cc" xsi:nil="true"/>
-    <TPLaunchHelpLinkType xmlns="4873beb7-5857-4685-be1f-d57550cc96cc">Template</TPLaunchHelpLinkType>
-    <OriginalRelease xmlns="4873beb7-5857-4685-be1f-d57550cc96cc">15</OriginalRelease>
-    <LocalizationTagsTaxHTField0 xmlns="4873beb7-5857-4685-be1f-d57550cc96cc">
-      <Terms xmlns="http://schemas.microsoft.com/office/infopath/2007/PartnerControls"/>
-    </LocalizationTagsTaxHTField0>
-    <UACurrentWords xmlns="4873beb7-5857-4685-be1f-d57550cc96cc" xsi:nil="true"/>
-    <ArtSampleDocs xmlns="4873beb7-5857-4685-be1f-d57550cc96cc" xsi:nil="true"/>
-    <UALocRecommendation xmlns="4873beb7-5857-4685-be1f-d57550cc96cc">Localize</UALocRecommendation>
-    <Manager xmlns="4873beb7-5857-4685-be1f-d57550cc96cc" xsi:nil="true"/>
-    <LocOverallHandbackStatusLookup xmlns="4873beb7-5857-4685-be1f-d57550cc96cc" xsi:nil="true"/>
-    <ShowIn xmlns="4873beb7-5857-4685-be1f-d57550cc96cc">Show everywhere</ShowIn>
-    <UANotes xmlns="4873beb7-5857-4685-be1f-d57550cc96cc" xsi:nil="true"/>
-    <InternalTagsTaxHTField0 xmlns="4873beb7-5857-4685-be1f-d57550cc96cc">
-      <Terms xmlns="http://schemas.microsoft.com/office/infopath/2007/PartnerControls"/>
-    </InternalTagsTaxHTField0>
-    <CSXHash xmlns="4873beb7-5857-4685-be1f-d57550cc96cc" xsi:nil="true"/>
-    <VoteCount xmlns="4873beb7-5857-4685-be1f-d57550cc96cc" xsi:nil="true"/>
-    <AssetExpire xmlns="4873beb7-5857-4685-be1f-d57550cc96cc">2029-05-12T07:00:00+00:00</AssetExpire>
-    <DSATActionTaken xmlns="4873beb7-5857-4685-be1f-d57550cc96cc" xsi:nil="true"/>
-    <CSXSubmissionMarket xmlns="4873beb7-5857-4685-be1f-d57550cc96cc" xsi:nil="true"/>
-    <LocMarketGroupTiers2 xmlns="4873beb7-5857-4685-be1f-d57550cc96cc" xsi:nil="true"/>
-  </documentManagement>
-</p:properties>
-</file>
-
-<file path=customXml/item2.xml><?xml version="1.0" encoding="utf-8"?>
 <ct:contentTypeSchema xmlns:ct="http://schemas.microsoft.com/office/2006/metadata/contentType" xmlns:ma="http://schemas.microsoft.com/office/2006/metadata/properties/metaAttributes" ct:_="" ma:_="" ma:contentTypeName="TemplateFile" ma:contentTypeID="0x0101006EDDDB5EE6D98C44930B742096920B300400F5B6D36B3EF94B4E9A635CDF2A18F5B8" ma:contentTypeVersion="72" ma:contentTypeDescription="Create a new document." ma:contentTypeScope="" ma:versionID="a23e56308344d904b51738559c3d67c9">
   <xsd:schema xmlns:xsd="http://www.w3.org/2001/XMLSchema" xmlns:xs="http://www.w3.org/2001/XMLSchema" xmlns:p="http://schemas.microsoft.com/office/2006/metadata/properties" xmlns:ns2="4873beb7-5857-4685-be1f-d57550cc96cc" targetNamespace="http://schemas.microsoft.com/office/2006/metadata/properties" ma:root="true" ma:fieldsID="cd0908cc4600e77bf5da051303e00c8d" ns2:_="">
     <xsd:import namespace="4873beb7-5857-4685-be1f-d57550cc96cc"/>
@@ -12081,6 +14214,142 @@
 </ct:contentTypeSchema>
 </file>
 
+<file path=customXml/item2.xml><?xml version="1.0" encoding="utf-8"?>
+<p:properties xmlns:p="http://schemas.microsoft.com/office/2006/metadata/properties" xmlns:xsi="http://www.w3.org/2001/XMLSchema-instance" xmlns:pc="http://schemas.microsoft.com/office/infopath/2007/PartnerControls">
+  <documentManagement>
+    <LocPublishedLinkedAssetsLookup xmlns="4873beb7-5857-4685-be1f-d57550cc96cc" xsi:nil="true"/>
+    <ApprovalStatus xmlns="4873beb7-5857-4685-be1f-d57550cc96cc">InProgress</ApprovalStatus>
+    <MarketSpecific xmlns="4873beb7-5857-4685-be1f-d57550cc96cc">false</MarketSpecific>
+    <LocComments xmlns="4873beb7-5857-4685-be1f-d57550cc96cc" xsi:nil="true"/>
+    <LocLastLocAttemptVersionTypeLookup xmlns="4873beb7-5857-4685-be1f-d57550cc96cc" xsi:nil="true"/>
+    <DirectSourceMarket xmlns="4873beb7-5857-4685-be1f-d57550cc96cc" xsi:nil="true"/>
+    <ThumbnailAssetId xmlns="4873beb7-5857-4685-be1f-d57550cc96cc" xsi:nil="true"/>
+    <PrimaryImageGen xmlns="4873beb7-5857-4685-be1f-d57550cc96cc">false</PrimaryImageGen>
+    <LocNewPublishedVersionLookup xmlns="4873beb7-5857-4685-be1f-d57550cc96cc" xsi:nil="true"/>
+    <LegacyData xmlns="4873beb7-5857-4685-be1f-d57550cc96cc" xsi:nil="true"/>
+    <LocRecommendedHandoff xmlns="4873beb7-5857-4685-be1f-d57550cc96cc" xsi:nil="true"/>
+    <BusinessGroup xmlns="4873beb7-5857-4685-be1f-d57550cc96cc" xsi:nil="true"/>
+    <BlockPublish xmlns="4873beb7-5857-4685-be1f-d57550cc96cc">false</BlockPublish>
+    <TPFriendlyName xmlns="4873beb7-5857-4685-be1f-d57550cc96cc" xsi:nil="true"/>
+    <LocOverallPublishStatusLookup xmlns="4873beb7-5857-4685-be1f-d57550cc96cc" xsi:nil="true"/>
+    <NumericId xmlns="4873beb7-5857-4685-be1f-d57550cc96cc" xsi:nil="true"/>
+    <APEditor xmlns="4873beb7-5857-4685-be1f-d57550cc96cc">
+      <UserInfo>
+        <DisplayName/>
+        <AccountId xsi:nil="true"/>
+        <AccountType/>
+      </UserInfo>
+    </APEditor>
+    <SourceTitle xmlns="4873beb7-5857-4685-be1f-d57550cc96cc" xsi:nil="true"/>
+    <OpenTemplate xmlns="4873beb7-5857-4685-be1f-d57550cc96cc">true</OpenTemplate>
+    <LocOverallLocStatusLookup xmlns="4873beb7-5857-4685-be1f-d57550cc96cc" xsi:nil="true"/>
+    <UALocComments xmlns="4873beb7-5857-4685-be1f-d57550cc96cc" xsi:nil="true"/>
+    <ParentAssetId xmlns="4873beb7-5857-4685-be1f-d57550cc96cc" xsi:nil="true"/>
+    <IntlLangReviewDate xmlns="4873beb7-5857-4685-be1f-d57550cc96cc" xsi:nil="true"/>
+    <FeatureTagsTaxHTField0 xmlns="4873beb7-5857-4685-be1f-d57550cc96cc">
+      <Terms xmlns="http://schemas.microsoft.com/office/infopath/2007/PartnerControls"/>
+    </FeatureTagsTaxHTField0>
+    <PublishStatusLookup xmlns="4873beb7-5857-4685-be1f-d57550cc96cc">
+      <Value>1345093</Value>
+    </PublishStatusLookup>
+    <Providers xmlns="4873beb7-5857-4685-be1f-d57550cc96cc" xsi:nil="true"/>
+    <MachineTranslated xmlns="4873beb7-5857-4685-be1f-d57550cc96cc">false</MachineTranslated>
+    <OriginalSourceMarket xmlns="4873beb7-5857-4685-be1f-d57550cc96cc" xsi:nil="true"/>
+    <APDescription xmlns="4873beb7-5857-4685-be1f-d57550cc96cc">This simple template design works for technology and  businesses, but it's versatile enough to use in other contexts.  It features multiple slide layouts designed for widescreen (16x9 resolution) and includes a sample SmartArt list and chart that are easily editable.</APDescription>
+    <ClipArtFilename xmlns="4873beb7-5857-4685-be1f-d57550cc96cc" xsi:nil="true"/>
+    <ContentItem xmlns="4873beb7-5857-4685-be1f-d57550cc96cc" xsi:nil="true"/>
+    <TPInstallLocation xmlns="4873beb7-5857-4685-be1f-d57550cc96cc" xsi:nil="true"/>
+    <PublishTargets xmlns="4873beb7-5857-4685-be1f-d57550cc96cc">OfficeOnlineVNext</PublishTargets>
+    <TimesCloned xmlns="4873beb7-5857-4685-be1f-d57550cc96cc" xsi:nil="true"/>
+    <AssetStart xmlns="4873beb7-5857-4685-be1f-d57550cc96cc">2011-11-26T00:30:00+00:00</AssetStart>
+    <Provider xmlns="4873beb7-5857-4685-be1f-d57550cc96cc" xsi:nil="true"/>
+    <AcquiredFrom xmlns="4873beb7-5857-4685-be1f-d57550cc96cc">Internal MS</AcquiredFrom>
+    <FriendlyTitle xmlns="4873beb7-5857-4685-be1f-d57550cc96cc" xsi:nil="true"/>
+    <LastHandOff xmlns="4873beb7-5857-4685-be1f-d57550cc96cc" xsi:nil="true"/>
+    <TPClientViewer xmlns="4873beb7-5857-4685-be1f-d57550cc96cc" xsi:nil="true"/>
+    <TemplateStatus xmlns="4873beb7-5857-4685-be1f-d57550cc96cc">Complete</TemplateStatus>
+    <Downloads xmlns="4873beb7-5857-4685-be1f-d57550cc96cc">0</Downloads>
+    <OOCacheId xmlns="4873beb7-5857-4685-be1f-d57550cc96cc" xsi:nil="true"/>
+    <IsDeleted xmlns="4873beb7-5857-4685-be1f-d57550cc96cc">false</IsDeleted>
+    <LocPublishedDependentAssetsLookup xmlns="4873beb7-5857-4685-be1f-d57550cc96cc" xsi:nil="true"/>
+    <TPExecutable xmlns="4873beb7-5857-4685-be1f-d57550cc96cc" xsi:nil="true"/>
+    <EditorialTags xmlns="4873beb7-5857-4685-be1f-d57550cc96cc" xsi:nil="true"/>
+    <SubmitterId xmlns="4873beb7-5857-4685-be1f-d57550cc96cc" xsi:nil="true"/>
+    <ApprovalLog xmlns="4873beb7-5857-4685-be1f-d57550cc96cc" xsi:nil="true"/>
+    <AssetType xmlns="4873beb7-5857-4685-be1f-d57550cc96cc">TP</AssetType>
+    <BugNumber xmlns="4873beb7-5857-4685-be1f-d57550cc96cc" xsi:nil="true"/>
+    <CSXSubmissionDate xmlns="4873beb7-5857-4685-be1f-d57550cc96cc" xsi:nil="true"/>
+    <CSXUpdate xmlns="4873beb7-5857-4685-be1f-d57550cc96cc">false</CSXUpdate>
+    <Milestone xmlns="4873beb7-5857-4685-be1f-d57550cc96cc" xsi:nil="true"/>
+    <RecommendationsModifier xmlns="4873beb7-5857-4685-be1f-d57550cc96cc" xsi:nil="true"/>
+    <OriginAsset xmlns="4873beb7-5857-4685-be1f-d57550cc96cc" xsi:nil="true"/>
+    <TPComponent xmlns="4873beb7-5857-4685-be1f-d57550cc96cc" xsi:nil="true"/>
+    <AssetId xmlns="4873beb7-5857-4685-be1f-d57550cc96cc">TP102787989</AssetId>
+    <IntlLocPriority xmlns="4873beb7-5857-4685-be1f-d57550cc96cc" xsi:nil="true"/>
+    <PolicheckWords xmlns="4873beb7-5857-4685-be1f-d57550cc96cc" xsi:nil="true"/>
+    <TPLaunchHelpLink xmlns="4873beb7-5857-4685-be1f-d57550cc96cc" xsi:nil="true"/>
+    <TPApplication xmlns="4873beb7-5857-4685-be1f-d57550cc96cc" xsi:nil="true"/>
+    <CrawlForDependencies xmlns="4873beb7-5857-4685-be1f-d57550cc96cc">false</CrawlForDependencies>
+    <HandoffToMSDN xmlns="4873beb7-5857-4685-be1f-d57550cc96cc" xsi:nil="true"/>
+    <PlannedPubDate xmlns="4873beb7-5857-4685-be1f-d57550cc96cc" xsi:nil="true"/>
+    <IntlLangReviewer xmlns="4873beb7-5857-4685-be1f-d57550cc96cc" xsi:nil="true"/>
+    <TrustLevel xmlns="4873beb7-5857-4685-be1f-d57550cc96cc">1 Microsoft Managed Content</TrustLevel>
+    <LocLastLocAttemptVersionLookup xmlns="4873beb7-5857-4685-be1f-d57550cc96cc">694266</LocLastLocAttemptVersionLookup>
+    <LocProcessedForHandoffsLookup xmlns="4873beb7-5857-4685-be1f-d57550cc96cc" xsi:nil="true"/>
+    <IsSearchable xmlns="4873beb7-5857-4685-be1f-d57550cc96cc">true</IsSearchable>
+    <TemplateTemplateType xmlns="4873beb7-5857-4685-be1f-d57550cc96cc">PowerPoint Presentation Template</TemplateTemplateType>
+    <CampaignTagsTaxHTField0 xmlns="4873beb7-5857-4685-be1f-d57550cc96cc">
+      <Terms xmlns="http://schemas.microsoft.com/office/infopath/2007/PartnerControls"/>
+    </CampaignTagsTaxHTField0>
+    <TPNamespace xmlns="4873beb7-5857-4685-be1f-d57550cc96cc" xsi:nil="true"/>
+    <LocOverallPreviewStatusLookup xmlns="4873beb7-5857-4685-be1f-d57550cc96cc" xsi:nil="true"/>
+    <TaxCatchAll xmlns="4873beb7-5857-4685-be1f-d57550cc96cc"/>
+    <Markets xmlns="4873beb7-5857-4685-be1f-d57550cc96cc"/>
+    <UAProjectedTotalWords xmlns="4873beb7-5857-4685-be1f-d57550cc96cc" xsi:nil="true"/>
+    <IntlLangReview xmlns="4873beb7-5857-4685-be1f-d57550cc96cc" xsi:nil="true"/>
+    <OutputCachingOn xmlns="4873beb7-5857-4685-be1f-d57550cc96cc">false</OutputCachingOn>
+    <AverageRating xmlns="4873beb7-5857-4685-be1f-d57550cc96cc" xsi:nil="true"/>
+    <APAuthor xmlns="4873beb7-5857-4685-be1f-d57550cc96cc">
+      <UserInfo>
+        <DisplayName>REDMOND\kristaa</DisplayName>
+        <AccountId>136</AccountId>
+        <AccountType/>
+      </UserInfo>
+    </APAuthor>
+    <LocManualTestRequired xmlns="4873beb7-5857-4685-be1f-d57550cc96cc">false</LocManualTestRequired>
+    <TPCommandLine xmlns="4873beb7-5857-4685-be1f-d57550cc96cc" xsi:nil="true"/>
+    <TPAppVersion xmlns="4873beb7-5857-4685-be1f-d57550cc96cc" xsi:nil="true"/>
+    <EditorialStatus xmlns="4873beb7-5857-4685-be1f-d57550cc96cc">Complete</EditorialStatus>
+    <LastModifiedDateTime xmlns="4873beb7-5857-4685-be1f-d57550cc96cc" xsi:nil="true"/>
+    <ScenarioTagsTaxHTField0 xmlns="4873beb7-5857-4685-be1f-d57550cc96cc">
+      <Terms xmlns="http://schemas.microsoft.com/office/infopath/2007/PartnerControls"/>
+    </ScenarioTagsTaxHTField0>
+    <LocProcessedForMarketsLookup xmlns="4873beb7-5857-4685-be1f-d57550cc96cc" xsi:nil="true"/>
+    <TPLaunchHelpLinkType xmlns="4873beb7-5857-4685-be1f-d57550cc96cc">Template</TPLaunchHelpLinkType>
+    <OriginalRelease xmlns="4873beb7-5857-4685-be1f-d57550cc96cc">15</OriginalRelease>
+    <LocalizationTagsTaxHTField0 xmlns="4873beb7-5857-4685-be1f-d57550cc96cc">
+      <Terms xmlns="http://schemas.microsoft.com/office/infopath/2007/PartnerControls"/>
+    </LocalizationTagsTaxHTField0>
+    <UACurrentWords xmlns="4873beb7-5857-4685-be1f-d57550cc96cc" xsi:nil="true"/>
+    <ArtSampleDocs xmlns="4873beb7-5857-4685-be1f-d57550cc96cc" xsi:nil="true"/>
+    <UALocRecommendation xmlns="4873beb7-5857-4685-be1f-d57550cc96cc">Localize</UALocRecommendation>
+    <Manager xmlns="4873beb7-5857-4685-be1f-d57550cc96cc" xsi:nil="true"/>
+    <LocOverallHandbackStatusLookup xmlns="4873beb7-5857-4685-be1f-d57550cc96cc" xsi:nil="true"/>
+    <ShowIn xmlns="4873beb7-5857-4685-be1f-d57550cc96cc">Show everywhere</ShowIn>
+    <UANotes xmlns="4873beb7-5857-4685-be1f-d57550cc96cc" xsi:nil="true"/>
+    <InternalTagsTaxHTField0 xmlns="4873beb7-5857-4685-be1f-d57550cc96cc">
+      <Terms xmlns="http://schemas.microsoft.com/office/infopath/2007/PartnerControls"/>
+    </InternalTagsTaxHTField0>
+    <CSXHash xmlns="4873beb7-5857-4685-be1f-d57550cc96cc" xsi:nil="true"/>
+    <VoteCount xmlns="4873beb7-5857-4685-be1f-d57550cc96cc" xsi:nil="true"/>
+    <AssetExpire xmlns="4873beb7-5857-4685-be1f-d57550cc96cc">2029-05-12T07:00:00+00:00</AssetExpire>
+    <DSATActionTaken xmlns="4873beb7-5857-4685-be1f-d57550cc96cc" xsi:nil="true"/>
+    <CSXSubmissionMarket xmlns="4873beb7-5857-4685-be1f-d57550cc96cc" xsi:nil="true"/>
+    <LocMarketGroupTiers2 xmlns="4873beb7-5857-4685-be1f-d57550cc96cc" xsi:nil="true"/>
+  </documentManagement>
+</p:properties>
+</file>
+
 <file path=customXml/item3.xml><?xml version="1.0" encoding="utf-8"?>
 <?mso-contentType ?>
 <FormTemplates xmlns="http://schemas.microsoft.com/sharepoint/v3/contenttype/forms">
@@ -12091,22 +14360,6 @@
 </file>
 
 <file path=customXml/itemProps1.xml><?xml version="1.0" encoding="utf-8"?>
-<ds:datastoreItem xmlns:ds="http://schemas.openxmlformats.org/officeDocument/2006/customXml" ds:itemID="{60C67BEE-D13F-4BD2-98A5-34D8A0977F68}">
-  <ds:schemaRefs>
-    <ds:schemaRef ds:uri="http://purl.org/dc/terms/"/>
-    <ds:schemaRef ds:uri="http://schemas.openxmlformats.org/package/2006/metadata/core-properties"/>
-    <ds:schemaRef ds:uri="http://schemas.microsoft.com/office/2006/documentManagement/types"/>
-    <ds:schemaRef ds:uri="http://purl.org/dc/elements/1.1/"/>
-    <ds:schemaRef ds:uri="http://schemas.microsoft.com/office/2006/metadata/properties"/>
-    <ds:schemaRef ds:uri="4873beb7-5857-4685-be1f-d57550cc96cc"/>
-    <ds:schemaRef ds:uri="http://schemas.microsoft.com/office/infopath/2007/PartnerControls"/>
-    <ds:schemaRef ds:uri="http://www.w3.org/XML/1998/namespace"/>
-    <ds:schemaRef ds:uri="http://purl.org/dc/dcmitype/"/>
-  </ds:schemaRefs>
-</ds:datastoreItem>
-</file>
-
-<file path=customXml/itemProps2.xml><?xml version="1.0" encoding="utf-8"?>
 <ds:datastoreItem xmlns:ds="http://schemas.openxmlformats.org/officeDocument/2006/customXml" ds:itemID="{A09BF4D4-EF60-4196-BFC3-9462D607978C}">
   <ds:schemaRefs>
     <ds:schemaRef ds:uri="http://schemas.microsoft.com/office/2006/metadata/contentType"/>
@@ -12124,6 +14377,22 @@
 </ds:datastoreItem>
 </file>
 
+<file path=customXml/itemProps2.xml><?xml version="1.0" encoding="utf-8"?>
+<ds:datastoreItem xmlns:ds="http://schemas.openxmlformats.org/officeDocument/2006/customXml" ds:itemID="{60C67BEE-D13F-4BD2-98A5-34D8A0977F68}">
+  <ds:schemaRefs>
+    <ds:schemaRef ds:uri="http://purl.org/dc/terms/"/>
+    <ds:schemaRef ds:uri="http://schemas.openxmlformats.org/package/2006/metadata/core-properties"/>
+    <ds:schemaRef ds:uri="http://schemas.microsoft.com/office/2006/documentManagement/types"/>
+    <ds:schemaRef ds:uri="http://purl.org/dc/elements/1.1/"/>
+    <ds:schemaRef ds:uri="http://schemas.microsoft.com/office/2006/metadata/properties"/>
+    <ds:schemaRef ds:uri="4873beb7-5857-4685-be1f-d57550cc96cc"/>
+    <ds:schemaRef ds:uri="http://schemas.microsoft.com/office/infopath/2007/PartnerControls"/>
+    <ds:schemaRef ds:uri="http://www.w3.org/XML/1998/namespace"/>
+    <ds:schemaRef ds:uri="http://purl.org/dc/dcmitype/"/>
+  </ds:schemaRefs>
+</ds:datastoreItem>
+</file>
+
 <file path=customXml/itemProps3.xml><?xml version="1.0" encoding="utf-8"?>
 <ds:datastoreItem xmlns:ds="http://schemas.openxmlformats.org/officeDocument/2006/customXml" ds:itemID="{3836F65B-1B07-41EE-A0E8-BC6EF3855225}">
   <ds:schemaRefs>

</xml_diff>